<commit_message>
cleaned repo and updated slides
</commit_message>
<xml_diff>
--- a/doc/Final_presentation_v1.pptx
+++ b/doc/Final_presentation_v1.pptx
@@ -5,17 +5,25 @@
     <p:sldMasterId id="2147483648" r:id="rId1"/>
   </p:sldMasterIdLst>
   <p:notesMasterIdLst>
-    <p:notesMasterId r:id="rId10"/>
+    <p:notesMasterId r:id="rId18"/>
   </p:notesMasterIdLst>
   <p:sldIdLst>
     <p:sldId id="257" r:id="rId2"/>
-    <p:sldId id="265" r:id="rId3"/>
-    <p:sldId id="266" r:id="rId4"/>
+    <p:sldId id="270" r:id="rId3"/>
+    <p:sldId id="265" r:id="rId4"/>
     <p:sldId id="267" r:id="rId5"/>
-    <p:sldId id="268" r:id="rId6"/>
-    <p:sldId id="263" r:id="rId7"/>
-    <p:sldId id="264" r:id="rId8"/>
-    <p:sldId id="269" r:id="rId9"/>
+    <p:sldId id="266" r:id="rId6"/>
+    <p:sldId id="271" r:id="rId7"/>
+    <p:sldId id="278" r:id="rId8"/>
+    <p:sldId id="272" r:id="rId9"/>
+    <p:sldId id="274" r:id="rId10"/>
+    <p:sldId id="275" r:id="rId11"/>
+    <p:sldId id="276" r:id="rId12"/>
+    <p:sldId id="277" r:id="rId13"/>
+    <p:sldId id="268" r:id="rId14"/>
+    <p:sldId id="273" r:id="rId15"/>
+    <p:sldId id="269" r:id="rId16"/>
+    <p:sldId id="263" r:id="rId17"/>
   </p:sldIdLst>
   <p:sldSz cx="12192000" cy="6858000"/>
   <p:notesSz cx="6858000" cy="9144000"/>
@@ -531,7 +539,7 @@
           <a:p>
             <a:fld id="{AF7CA6D5-71D9-4D77-8733-A082675BD640}" type="slidenum">
               <a:rPr lang="en-US" smtClean="0"/>
-              <a:t>6</a:t>
+              <a:t>16</a:t>
             </a:fld>
             <a:endParaRPr lang="en-US"/>
           </a:p>
@@ -572,7 +580,7 @@
           <p:cNvPr id="2" name="Title 1">
             <a:extLst>
               <a:ext uri="{FF2B5EF4-FFF2-40B4-BE49-F238E27FC236}">
-                <a16:creationId xmlns:a16="http://schemas.microsoft.com/office/drawing/2014/main" id="{970B977A-BBCB-2740-BDA1-D1C3E7F134DA}"/>
+                <a16:creationId xmlns:a16="http://schemas.microsoft.com/office/drawing/2014/main" xmlns="" id="{970B977A-BBCB-2740-BDA1-D1C3E7F134DA}"/>
               </a:ext>
             </a:extLst>
           </p:cNvPr>
@@ -609,7 +617,7 @@
           <p:cNvPr id="3" name="Subtitle 2">
             <a:extLst>
               <a:ext uri="{FF2B5EF4-FFF2-40B4-BE49-F238E27FC236}">
-                <a16:creationId xmlns:a16="http://schemas.microsoft.com/office/drawing/2014/main" id="{DAF9E1A8-315E-3E45-9BFB-304C9BCE3996}"/>
+                <a16:creationId xmlns:a16="http://schemas.microsoft.com/office/drawing/2014/main" xmlns="" id="{DAF9E1A8-315E-3E45-9BFB-304C9BCE3996}"/>
               </a:ext>
             </a:extLst>
           </p:cNvPr>
@@ -679,7 +687,7 @@
           <p:cNvPr id="4" name="Date Placeholder 3">
             <a:extLst>
               <a:ext uri="{FF2B5EF4-FFF2-40B4-BE49-F238E27FC236}">
-                <a16:creationId xmlns:a16="http://schemas.microsoft.com/office/drawing/2014/main" id="{7CDCCAF5-5DB9-314A-8C45-E88CA4695A37}"/>
+                <a16:creationId xmlns:a16="http://schemas.microsoft.com/office/drawing/2014/main" xmlns="" id="{7CDCCAF5-5DB9-314A-8C45-E88CA4695A37}"/>
               </a:ext>
             </a:extLst>
           </p:cNvPr>
@@ -708,7 +716,7 @@
           <p:cNvPr id="5" name="Footer Placeholder 4">
             <a:extLst>
               <a:ext uri="{FF2B5EF4-FFF2-40B4-BE49-F238E27FC236}">
-                <a16:creationId xmlns:a16="http://schemas.microsoft.com/office/drawing/2014/main" id="{519AFEA6-2A01-5B42-A055-4D0059C7FFDA}"/>
+                <a16:creationId xmlns:a16="http://schemas.microsoft.com/office/drawing/2014/main" xmlns="" id="{519AFEA6-2A01-5B42-A055-4D0059C7FFDA}"/>
               </a:ext>
             </a:extLst>
           </p:cNvPr>
@@ -733,7 +741,7 @@
           <p:cNvPr id="6" name="Slide Number Placeholder 5">
             <a:extLst>
               <a:ext uri="{FF2B5EF4-FFF2-40B4-BE49-F238E27FC236}">
-                <a16:creationId xmlns:a16="http://schemas.microsoft.com/office/drawing/2014/main" id="{63A5BF5B-28E0-DA44-8094-4775D29ACD5C}"/>
+                <a16:creationId xmlns:a16="http://schemas.microsoft.com/office/drawing/2014/main" xmlns="" id="{63A5BF5B-28E0-DA44-8094-4775D29ACD5C}"/>
               </a:ext>
             </a:extLst>
           </p:cNvPr>
@@ -792,7 +800,7 @@
           <p:cNvPr id="2" name="Title 1">
             <a:extLst>
               <a:ext uri="{FF2B5EF4-FFF2-40B4-BE49-F238E27FC236}">
-                <a16:creationId xmlns:a16="http://schemas.microsoft.com/office/drawing/2014/main" id="{6107B688-6366-0C4D-892B-D13E6797986A}"/>
+                <a16:creationId xmlns:a16="http://schemas.microsoft.com/office/drawing/2014/main" xmlns="" id="{6107B688-6366-0C4D-892B-D13E6797986A}"/>
               </a:ext>
             </a:extLst>
           </p:cNvPr>
@@ -820,7 +828,7 @@
           <p:cNvPr id="3" name="Vertical Text Placeholder 2">
             <a:extLst>
               <a:ext uri="{FF2B5EF4-FFF2-40B4-BE49-F238E27FC236}">
-                <a16:creationId xmlns:a16="http://schemas.microsoft.com/office/drawing/2014/main" id="{DAF89A2C-2113-A549-8232-59E3F02C3B88}"/>
+                <a16:creationId xmlns:a16="http://schemas.microsoft.com/office/drawing/2014/main" xmlns="" id="{DAF89A2C-2113-A549-8232-59E3F02C3B88}"/>
               </a:ext>
             </a:extLst>
           </p:cNvPr>
@@ -877,7 +885,7 @@
           <p:cNvPr id="4" name="Date Placeholder 3">
             <a:extLst>
               <a:ext uri="{FF2B5EF4-FFF2-40B4-BE49-F238E27FC236}">
-                <a16:creationId xmlns:a16="http://schemas.microsoft.com/office/drawing/2014/main" id="{EBF5E4EA-9848-8C4D-97A7-210D72FADA52}"/>
+                <a16:creationId xmlns:a16="http://schemas.microsoft.com/office/drawing/2014/main" xmlns="" id="{EBF5E4EA-9848-8C4D-97A7-210D72FADA52}"/>
               </a:ext>
             </a:extLst>
           </p:cNvPr>
@@ -906,7 +914,7 @@
           <p:cNvPr id="5" name="Footer Placeholder 4">
             <a:extLst>
               <a:ext uri="{FF2B5EF4-FFF2-40B4-BE49-F238E27FC236}">
-                <a16:creationId xmlns:a16="http://schemas.microsoft.com/office/drawing/2014/main" id="{F7AF995B-690A-0F43-9664-76B5FD4DB2C5}"/>
+                <a16:creationId xmlns:a16="http://schemas.microsoft.com/office/drawing/2014/main" xmlns="" id="{F7AF995B-690A-0F43-9664-76B5FD4DB2C5}"/>
               </a:ext>
             </a:extLst>
           </p:cNvPr>
@@ -931,7 +939,7 @@
           <p:cNvPr id="6" name="Slide Number Placeholder 5">
             <a:extLst>
               <a:ext uri="{FF2B5EF4-FFF2-40B4-BE49-F238E27FC236}">
-                <a16:creationId xmlns:a16="http://schemas.microsoft.com/office/drawing/2014/main" id="{B2610026-2448-A744-87B5-30F2C35E563E}"/>
+                <a16:creationId xmlns:a16="http://schemas.microsoft.com/office/drawing/2014/main" xmlns="" id="{B2610026-2448-A744-87B5-30F2C35E563E}"/>
               </a:ext>
             </a:extLst>
           </p:cNvPr>
@@ -990,7 +998,7 @@
           <p:cNvPr id="2" name="Vertical Title 1">
             <a:extLst>
               <a:ext uri="{FF2B5EF4-FFF2-40B4-BE49-F238E27FC236}">
-                <a16:creationId xmlns:a16="http://schemas.microsoft.com/office/drawing/2014/main" id="{F052D21A-ED7E-A848-B62C-1EFC78330443}"/>
+                <a16:creationId xmlns:a16="http://schemas.microsoft.com/office/drawing/2014/main" xmlns="" id="{F052D21A-ED7E-A848-B62C-1EFC78330443}"/>
               </a:ext>
             </a:extLst>
           </p:cNvPr>
@@ -1023,7 +1031,7 @@
           <p:cNvPr id="3" name="Vertical Text Placeholder 2">
             <a:extLst>
               <a:ext uri="{FF2B5EF4-FFF2-40B4-BE49-F238E27FC236}">
-                <a16:creationId xmlns:a16="http://schemas.microsoft.com/office/drawing/2014/main" id="{D2D70CDB-DF03-EB47-B2EF-5332829AE0DC}"/>
+                <a16:creationId xmlns:a16="http://schemas.microsoft.com/office/drawing/2014/main" xmlns="" id="{D2D70CDB-DF03-EB47-B2EF-5332829AE0DC}"/>
               </a:ext>
             </a:extLst>
           </p:cNvPr>
@@ -1085,7 +1093,7 @@
           <p:cNvPr id="4" name="Date Placeholder 3">
             <a:extLst>
               <a:ext uri="{FF2B5EF4-FFF2-40B4-BE49-F238E27FC236}">
-                <a16:creationId xmlns:a16="http://schemas.microsoft.com/office/drawing/2014/main" id="{8D3F2C62-3B35-F847-8DC4-0444742DC521}"/>
+                <a16:creationId xmlns:a16="http://schemas.microsoft.com/office/drawing/2014/main" xmlns="" id="{8D3F2C62-3B35-F847-8DC4-0444742DC521}"/>
               </a:ext>
             </a:extLst>
           </p:cNvPr>
@@ -1114,7 +1122,7 @@
           <p:cNvPr id="5" name="Footer Placeholder 4">
             <a:extLst>
               <a:ext uri="{FF2B5EF4-FFF2-40B4-BE49-F238E27FC236}">
-                <a16:creationId xmlns:a16="http://schemas.microsoft.com/office/drawing/2014/main" id="{83006349-84E5-E044-9975-403321B6A6FC}"/>
+                <a16:creationId xmlns:a16="http://schemas.microsoft.com/office/drawing/2014/main" xmlns="" id="{83006349-84E5-E044-9975-403321B6A6FC}"/>
               </a:ext>
             </a:extLst>
           </p:cNvPr>
@@ -1139,7 +1147,7 @@
           <p:cNvPr id="6" name="Slide Number Placeholder 5">
             <a:extLst>
               <a:ext uri="{FF2B5EF4-FFF2-40B4-BE49-F238E27FC236}">
-                <a16:creationId xmlns:a16="http://schemas.microsoft.com/office/drawing/2014/main" id="{A8DE17A9-6A26-C74F-B058-9C1567FA1DAB}"/>
+                <a16:creationId xmlns:a16="http://schemas.microsoft.com/office/drawing/2014/main" xmlns="" id="{A8DE17A9-6A26-C74F-B058-9C1567FA1DAB}"/>
               </a:ext>
             </a:extLst>
           </p:cNvPr>
@@ -1321,7 +1329,7 @@
   <p:clrMapOvr>
     <a:overrideClrMapping bg1="lt1" tx1="dk1" bg2="lt2" tx2="dk2" accent1="accent1" accent2="accent2" accent3="accent3" accent4="accent4" accent5="accent5" accent6="accent6" hlink="hlink" folHlink="folHlink"/>
   </p:clrMapOvr>
-  <p:transition>
+  <p:transition xmlns:p14="http://schemas.microsoft.com/office/powerpoint/2010/main">
     <p:fade/>
   </p:transition>
 </p:sldLayout>
@@ -1349,7 +1357,7 @@
           <p:cNvPr id="2" name="Title 1">
             <a:extLst>
               <a:ext uri="{FF2B5EF4-FFF2-40B4-BE49-F238E27FC236}">
-                <a16:creationId xmlns:a16="http://schemas.microsoft.com/office/drawing/2014/main" id="{7CECF9CE-D2A4-1148-80BB-4B8088EBAF30}"/>
+                <a16:creationId xmlns:a16="http://schemas.microsoft.com/office/drawing/2014/main" xmlns="" id="{7CECF9CE-D2A4-1148-80BB-4B8088EBAF30}"/>
               </a:ext>
             </a:extLst>
           </p:cNvPr>
@@ -1377,7 +1385,7 @@
           <p:cNvPr id="3" name="Content Placeholder 2">
             <a:extLst>
               <a:ext uri="{FF2B5EF4-FFF2-40B4-BE49-F238E27FC236}">
-                <a16:creationId xmlns:a16="http://schemas.microsoft.com/office/drawing/2014/main" id="{B8343045-574A-9F4F-9479-192C1247F956}"/>
+                <a16:creationId xmlns:a16="http://schemas.microsoft.com/office/drawing/2014/main" xmlns="" id="{B8343045-574A-9F4F-9479-192C1247F956}"/>
               </a:ext>
             </a:extLst>
           </p:cNvPr>
@@ -1434,7 +1442,7 @@
           <p:cNvPr id="4" name="Date Placeholder 3">
             <a:extLst>
               <a:ext uri="{FF2B5EF4-FFF2-40B4-BE49-F238E27FC236}">
-                <a16:creationId xmlns:a16="http://schemas.microsoft.com/office/drawing/2014/main" id="{645458F7-5A9A-BB47-A6AC-7C468CFFCB54}"/>
+                <a16:creationId xmlns:a16="http://schemas.microsoft.com/office/drawing/2014/main" xmlns="" id="{645458F7-5A9A-BB47-A6AC-7C468CFFCB54}"/>
               </a:ext>
             </a:extLst>
           </p:cNvPr>
@@ -1463,7 +1471,7 @@
           <p:cNvPr id="5" name="Footer Placeholder 4">
             <a:extLst>
               <a:ext uri="{FF2B5EF4-FFF2-40B4-BE49-F238E27FC236}">
-                <a16:creationId xmlns:a16="http://schemas.microsoft.com/office/drawing/2014/main" id="{4BBAB86A-0354-254C-B7CD-47143E7D70BE}"/>
+                <a16:creationId xmlns:a16="http://schemas.microsoft.com/office/drawing/2014/main" xmlns="" id="{4BBAB86A-0354-254C-B7CD-47143E7D70BE}"/>
               </a:ext>
             </a:extLst>
           </p:cNvPr>
@@ -1488,7 +1496,7 @@
           <p:cNvPr id="6" name="Slide Number Placeholder 5">
             <a:extLst>
               <a:ext uri="{FF2B5EF4-FFF2-40B4-BE49-F238E27FC236}">
-                <a16:creationId xmlns:a16="http://schemas.microsoft.com/office/drawing/2014/main" id="{10713F7C-DA52-0740-B131-04B09E40D8F5}"/>
+                <a16:creationId xmlns:a16="http://schemas.microsoft.com/office/drawing/2014/main" xmlns="" id="{10713F7C-DA52-0740-B131-04B09E40D8F5}"/>
               </a:ext>
             </a:extLst>
           </p:cNvPr>
@@ -1547,7 +1555,7 @@
           <p:cNvPr id="2" name="Title 1">
             <a:extLst>
               <a:ext uri="{FF2B5EF4-FFF2-40B4-BE49-F238E27FC236}">
-                <a16:creationId xmlns:a16="http://schemas.microsoft.com/office/drawing/2014/main" id="{AFD1FA25-A6F7-9C41-9556-71E60A3677B0}"/>
+                <a16:creationId xmlns:a16="http://schemas.microsoft.com/office/drawing/2014/main" xmlns="" id="{AFD1FA25-A6F7-9C41-9556-71E60A3677B0}"/>
               </a:ext>
             </a:extLst>
           </p:cNvPr>
@@ -1584,7 +1592,7 @@
           <p:cNvPr id="3" name="Text Placeholder 2">
             <a:extLst>
               <a:ext uri="{FF2B5EF4-FFF2-40B4-BE49-F238E27FC236}">
-                <a16:creationId xmlns:a16="http://schemas.microsoft.com/office/drawing/2014/main" id="{910CA529-498F-F442-8235-8E629216D58B}"/>
+                <a16:creationId xmlns:a16="http://schemas.microsoft.com/office/drawing/2014/main" xmlns="" id="{910CA529-498F-F442-8235-8E629216D58B}"/>
               </a:ext>
             </a:extLst>
           </p:cNvPr>
@@ -1709,7 +1717,7 @@
           <p:cNvPr id="4" name="Date Placeholder 3">
             <a:extLst>
               <a:ext uri="{FF2B5EF4-FFF2-40B4-BE49-F238E27FC236}">
-                <a16:creationId xmlns:a16="http://schemas.microsoft.com/office/drawing/2014/main" id="{02A82877-42A4-4140-9D35-AD3DEAE9B62F}"/>
+                <a16:creationId xmlns:a16="http://schemas.microsoft.com/office/drawing/2014/main" xmlns="" id="{02A82877-42A4-4140-9D35-AD3DEAE9B62F}"/>
               </a:ext>
             </a:extLst>
           </p:cNvPr>
@@ -1738,7 +1746,7 @@
           <p:cNvPr id="5" name="Footer Placeholder 4">
             <a:extLst>
               <a:ext uri="{FF2B5EF4-FFF2-40B4-BE49-F238E27FC236}">
-                <a16:creationId xmlns:a16="http://schemas.microsoft.com/office/drawing/2014/main" id="{938B06B8-B16F-1948-AAE9-7134A96B6B40}"/>
+                <a16:creationId xmlns:a16="http://schemas.microsoft.com/office/drawing/2014/main" xmlns="" id="{938B06B8-B16F-1948-AAE9-7134A96B6B40}"/>
               </a:ext>
             </a:extLst>
           </p:cNvPr>
@@ -1763,7 +1771,7 @@
           <p:cNvPr id="6" name="Slide Number Placeholder 5">
             <a:extLst>
               <a:ext uri="{FF2B5EF4-FFF2-40B4-BE49-F238E27FC236}">
-                <a16:creationId xmlns:a16="http://schemas.microsoft.com/office/drawing/2014/main" id="{9F67FBA6-2EB7-8249-BEBB-2575657F226A}"/>
+                <a16:creationId xmlns:a16="http://schemas.microsoft.com/office/drawing/2014/main" xmlns="" id="{9F67FBA6-2EB7-8249-BEBB-2575657F226A}"/>
               </a:ext>
             </a:extLst>
           </p:cNvPr>
@@ -1822,7 +1830,7 @@
           <p:cNvPr id="2" name="Title 1">
             <a:extLst>
               <a:ext uri="{FF2B5EF4-FFF2-40B4-BE49-F238E27FC236}">
-                <a16:creationId xmlns:a16="http://schemas.microsoft.com/office/drawing/2014/main" id="{7139CE56-5BAC-C14F-AEE0-8CAF58579966}"/>
+                <a16:creationId xmlns:a16="http://schemas.microsoft.com/office/drawing/2014/main" xmlns="" id="{7139CE56-5BAC-C14F-AEE0-8CAF58579966}"/>
               </a:ext>
             </a:extLst>
           </p:cNvPr>
@@ -1850,7 +1858,7 @@
           <p:cNvPr id="3" name="Content Placeholder 2">
             <a:extLst>
               <a:ext uri="{FF2B5EF4-FFF2-40B4-BE49-F238E27FC236}">
-                <a16:creationId xmlns:a16="http://schemas.microsoft.com/office/drawing/2014/main" id="{0AA81B29-5392-1147-A6E3-A19C9D699CDC}"/>
+                <a16:creationId xmlns:a16="http://schemas.microsoft.com/office/drawing/2014/main" xmlns="" id="{0AA81B29-5392-1147-A6E3-A19C9D699CDC}"/>
               </a:ext>
             </a:extLst>
           </p:cNvPr>
@@ -1912,7 +1920,7 @@
           <p:cNvPr id="4" name="Content Placeholder 3">
             <a:extLst>
               <a:ext uri="{FF2B5EF4-FFF2-40B4-BE49-F238E27FC236}">
-                <a16:creationId xmlns:a16="http://schemas.microsoft.com/office/drawing/2014/main" id="{95233529-47E0-F84E-808B-52F4033727C6}"/>
+                <a16:creationId xmlns:a16="http://schemas.microsoft.com/office/drawing/2014/main" xmlns="" id="{95233529-47E0-F84E-808B-52F4033727C6}"/>
               </a:ext>
             </a:extLst>
           </p:cNvPr>
@@ -1974,7 +1982,7 @@
           <p:cNvPr id="5" name="Date Placeholder 4">
             <a:extLst>
               <a:ext uri="{FF2B5EF4-FFF2-40B4-BE49-F238E27FC236}">
-                <a16:creationId xmlns:a16="http://schemas.microsoft.com/office/drawing/2014/main" id="{A346ECCD-57B7-0547-B7EE-4DC6C2FD136C}"/>
+                <a16:creationId xmlns:a16="http://schemas.microsoft.com/office/drawing/2014/main" xmlns="" id="{A346ECCD-57B7-0547-B7EE-4DC6C2FD136C}"/>
               </a:ext>
             </a:extLst>
           </p:cNvPr>
@@ -2003,7 +2011,7 @@
           <p:cNvPr id="6" name="Footer Placeholder 5">
             <a:extLst>
               <a:ext uri="{FF2B5EF4-FFF2-40B4-BE49-F238E27FC236}">
-                <a16:creationId xmlns:a16="http://schemas.microsoft.com/office/drawing/2014/main" id="{719C8052-5B0B-B348-A34E-3243275E540E}"/>
+                <a16:creationId xmlns:a16="http://schemas.microsoft.com/office/drawing/2014/main" xmlns="" id="{719C8052-5B0B-B348-A34E-3243275E540E}"/>
               </a:ext>
             </a:extLst>
           </p:cNvPr>
@@ -2028,7 +2036,7 @@
           <p:cNvPr id="7" name="Slide Number Placeholder 6">
             <a:extLst>
               <a:ext uri="{FF2B5EF4-FFF2-40B4-BE49-F238E27FC236}">
-                <a16:creationId xmlns:a16="http://schemas.microsoft.com/office/drawing/2014/main" id="{9B39F046-3B77-F941-8B34-B17F441AEDE8}"/>
+                <a16:creationId xmlns:a16="http://schemas.microsoft.com/office/drawing/2014/main" xmlns="" id="{9B39F046-3B77-F941-8B34-B17F441AEDE8}"/>
               </a:ext>
             </a:extLst>
           </p:cNvPr>
@@ -2087,7 +2095,7 @@
           <p:cNvPr id="2" name="Title 1">
             <a:extLst>
               <a:ext uri="{FF2B5EF4-FFF2-40B4-BE49-F238E27FC236}">
-                <a16:creationId xmlns:a16="http://schemas.microsoft.com/office/drawing/2014/main" id="{9E9FCF7B-70FD-F34B-A732-576886E64514}"/>
+                <a16:creationId xmlns:a16="http://schemas.microsoft.com/office/drawing/2014/main" xmlns="" id="{9E9FCF7B-70FD-F34B-A732-576886E64514}"/>
               </a:ext>
             </a:extLst>
           </p:cNvPr>
@@ -2120,7 +2128,7 @@
           <p:cNvPr id="3" name="Text Placeholder 2">
             <a:extLst>
               <a:ext uri="{FF2B5EF4-FFF2-40B4-BE49-F238E27FC236}">
-                <a16:creationId xmlns:a16="http://schemas.microsoft.com/office/drawing/2014/main" id="{5D4C80A2-E4A9-A54A-A8AC-3D2891663590}"/>
+                <a16:creationId xmlns:a16="http://schemas.microsoft.com/office/drawing/2014/main" xmlns="" id="{5D4C80A2-E4A9-A54A-A8AC-3D2891663590}"/>
               </a:ext>
             </a:extLst>
           </p:cNvPr>
@@ -2191,7 +2199,7 @@
           <p:cNvPr id="4" name="Content Placeholder 3">
             <a:extLst>
               <a:ext uri="{FF2B5EF4-FFF2-40B4-BE49-F238E27FC236}">
-                <a16:creationId xmlns:a16="http://schemas.microsoft.com/office/drawing/2014/main" id="{0AC0D208-C2D3-6541-9F8A-14B59A3D6708}"/>
+                <a16:creationId xmlns:a16="http://schemas.microsoft.com/office/drawing/2014/main" xmlns="" id="{0AC0D208-C2D3-6541-9F8A-14B59A3D6708}"/>
               </a:ext>
             </a:extLst>
           </p:cNvPr>
@@ -2253,7 +2261,7 @@
           <p:cNvPr id="5" name="Text Placeholder 4">
             <a:extLst>
               <a:ext uri="{FF2B5EF4-FFF2-40B4-BE49-F238E27FC236}">
-                <a16:creationId xmlns:a16="http://schemas.microsoft.com/office/drawing/2014/main" id="{EE346EAF-EA7B-994F-9495-4EE14A06EB87}"/>
+                <a16:creationId xmlns:a16="http://schemas.microsoft.com/office/drawing/2014/main" xmlns="" id="{EE346EAF-EA7B-994F-9495-4EE14A06EB87}"/>
               </a:ext>
             </a:extLst>
           </p:cNvPr>
@@ -2324,7 +2332,7 @@
           <p:cNvPr id="6" name="Content Placeholder 5">
             <a:extLst>
               <a:ext uri="{FF2B5EF4-FFF2-40B4-BE49-F238E27FC236}">
-                <a16:creationId xmlns:a16="http://schemas.microsoft.com/office/drawing/2014/main" id="{A70ED2DB-2AFC-4743-8256-D2381615CD85}"/>
+                <a16:creationId xmlns:a16="http://schemas.microsoft.com/office/drawing/2014/main" xmlns="" id="{A70ED2DB-2AFC-4743-8256-D2381615CD85}"/>
               </a:ext>
             </a:extLst>
           </p:cNvPr>
@@ -2386,7 +2394,7 @@
           <p:cNvPr id="7" name="Date Placeholder 6">
             <a:extLst>
               <a:ext uri="{FF2B5EF4-FFF2-40B4-BE49-F238E27FC236}">
-                <a16:creationId xmlns:a16="http://schemas.microsoft.com/office/drawing/2014/main" id="{CC571CB5-7F6C-5243-BC1C-694365896CD4}"/>
+                <a16:creationId xmlns:a16="http://schemas.microsoft.com/office/drawing/2014/main" xmlns="" id="{CC571CB5-7F6C-5243-BC1C-694365896CD4}"/>
               </a:ext>
             </a:extLst>
           </p:cNvPr>
@@ -2415,7 +2423,7 @@
           <p:cNvPr id="8" name="Footer Placeholder 7">
             <a:extLst>
               <a:ext uri="{FF2B5EF4-FFF2-40B4-BE49-F238E27FC236}">
-                <a16:creationId xmlns:a16="http://schemas.microsoft.com/office/drawing/2014/main" id="{66BEED1D-DA2D-B045-BB98-9E78D35F9FEC}"/>
+                <a16:creationId xmlns:a16="http://schemas.microsoft.com/office/drawing/2014/main" xmlns="" id="{66BEED1D-DA2D-B045-BB98-9E78D35F9FEC}"/>
               </a:ext>
             </a:extLst>
           </p:cNvPr>
@@ -2440,7 +2448,7 @@
           <p:cNvPr id="9" name="Slide Number Placeholder 8">
             <a:extLst>
               <a:ext uri="{FF2B5EF4-FFF2-40B4-BE49-F238E27FC236}">
-                <a16:creationId xmlns:a16="http://schemas.microsoft.com/office/drawing/2014/main" id="{EB3247B4-A068-254D-A151-F3CD9EB6BDDA}"/>
+                <a16:creationId xmlns:a16="http://schemas.microsoft.com/office/drawing/2014/main" xmlns="" id="{EB3247B4-A068-254D-A151-F3CD9EB6BDDA}"/>
               </a:ext>
             </a:extLst>
           </p:cNvPr>
@@ -2499,7 +2507,7 @@
           <p:cNvPr id="2" name="Title 1">
             <a:extLst>
               <a:ext uri="{FF2B5EF4-FFF2-40B4-BE49-F238E27FC236}">
-                <a16:creationId xmlns:a16="http://schemas.microsoft.com/office/drawing/2014/main" id="{A647E20B-067D-2848-97EA-CA2F5950EEC4}"/>
+                <a16:creationId xmlns:a16="http://schemas.microsoft.com/office/drawing/2014/main" xmlns="" id="{A647E20B-067D-2848-97EA-CA2F5950EEC4}"/>
               </a:ext>
             </a:extLst>
           </p:cNvPr>
@@ -2527,7 +2535,7 @@
           <p:cNvPr id="3" name="Date Placeholder 2">
             <a:extLst>
               <a:ext uri="{FF2B5EF4-FFF2-40B4-BE49-F238E27FC236}">
-                <a16:creationId xmlns:a16="http://schemas.microsoft.com/office/drawing/2014/main" id="{92703C34-2987-1642-989F-DFF90FE4F616}"/>
+                <a16:creationId xmlns:a16="http://schemas.microsoft.com/office/drawing/2014/main" xmlns="" id="{92703C34-2987-1642-989F-DFF90FE4F616}"/>
               </a:ext>
             </a:extLst>
           </p:cNvPr>
@@ -2556,7 +2564,7 @@
           <p:cNvPr id="4" name="Footer Placeholder 3">
             <a:extLst>
               <a:ext uri="{FF2B5EF4-FFF2-40B4-BE49-F238E27FC236}">
-                <a16:creationId xmlns:a16="http://schemas.microsoft.com/office/drawing/2014/main" id="{68924DEC-6444-B445-BA00-6F2199DDD653}"/>
+                <a16:creationId xmlns:a16="http://schemas.microsoft.com/office/drawing/2014/main" xmlns="" id="{68924DEC-6444-B445-BA00-6F2199DDD653}"/>
               </a:ext>
             </a:extLst>
           </p:cNvPr>
@@ -2581,7 +2589,7 @@
           <p:cNvPr id="5" name="Slide Number Placeholder 4">
             <a:extLst>
               <a:ext uri="{FF2B5EF4-FFF2-40B4-BE49-F238E27FC236}">
-                <a16:creationId xmlns:a16="http://schemas.microsoft.com/office/drawing/2014/main" id="{C5876EFB-8599-8C4F-8BEF-0101ACC152C0}"/>
+                <a16:creationId xmlns:a16="http://schemas.microsoft.com/office/drawing/2014/main" xmlns="" id="{C5876EFB-8599-8C4F-8BEF-0101ACC152C0}"/>
               </a:ext>
             </a:extLst>
           </p:cNvPr>
@@ -2640,7 +2648,7 @@
           <p:cNvPr id="2" name="Date Placeholder 1">
             <a:extLst>
               <a:ext uri="{FF2B5EF4-FFF2-40B4-BE49-F238E27FC236}">
-                <a16:creationId xmlns:a16="http://schemas.microsoft.com/office/drawing/2014/main" id="{9CF7C7E3-9296-BB42-8EFA-7DEDB60DE1A5}"/>
+                <a16:creationId xmlns:a16="http://schemas.microsoft.com/office/drawing/2014/main" xmlns="" id="{9CF7C7E3-9296-BB42-8EFA-7DEDB60DE1A5}"/>
               </a:ext>
             </a:extLst>
           </p:cNvPr>
@@ -2669,7 +2677,7 @@
           <p:cNvPr id="3" name="Footer Placeholder 2">
             <a:extLst>
               <a:ext uri="{FF2B5EF4-FFF2-40B4-BE49-F238E27FC236}">
-                <a16:creationId xmlns:a16="http://schemas.microsoft.com/office/drawing/2014/main" id="{DF919FD4-EA3B-4C4F-B620-1001426381B8}"/>
+                <a16:creationId xmlns:a16="http://schemas.microsoft.com/office/drawing/2014/main" xmlns="" id="{DF919FD4-EA3B-4C4F-B620-1001426381B8}"/>
               </a:ext>
             </a:extLst>
           </p:cNvPr>
@@ -2694,7 +2702,7 @@
           <p:cNvPr id="4" name="Slide Number Placeholder 3">
             <a:extLst>
               <a:ext uri="{FF2B5EF4-FFF2-40B4-BE49-F238E27FC236}">
-                <a16:creationId xmlns:a16="http://schemas.microsoft.com/office/drawing/2014/main" id="{35EFB6D9-C771-AA4C-9AF5-22D4F1D8F32F}"/>
+                <a16:creationId xmlns:a16="http://schemas.microsoft.com/office/drawing/2014/main" xmlns="" id="{35EFB6D9-C771-AA4C-9AF5-22D4F1D8F32F}"/>
               </a:ext>
             </a:extLst>
           </p:cNvPr>
@@ -2753,7 +2761,7 @@
           <p:cNvPr id="2" name="Title 1">
             <a:extLst>
               <a:ext uri="{FF2B5EF4-FFF2-40B4-BE49-F238E27FC236}">
-                <a16:creationId xmlns:a16="http://schemas.microsoft.com/office/drawing/2014/main" id="{06A8B566-D668-9A46-AABA-D6E599AD3BD2}"/>
+                <a16:creationId xmlns:a16="http://schemas.microsoft.com/office/drawing/2014/main" xmlns="" id="{06A8B566-D668-9A46-AABA-D6E599AD3BD2}"/>
               </a:ext>
             </a:extLst>
           </p:cNvPr>
@@ -2790,7 +2798,7 @@
           <p:cNvPr id="3" name="Content Placeholder 2">
             <a:extLst>
               <a:ext uri="{FF2B5EF4-FFF2-40B4-BE49-F238E27FC236}">
-                <a16:creationId xmlns:a16="http://schemas.microsoft.com/office/drawing/2014/main" id="{D81D5A2C-BC2C-BA43-976A-A4FA0D4D23BD}"/>
+                <a16:creationId xmlns:a16="http://schemas.microsoft.com/office/drawing/2014/main" xmlns="" id="{D81D5A2C-BC2C-BA43-976A-A4FA0D4D23BD}"/>
               </a:ext>
             </a:extLst>
           </p:cNvPr>
@@ -2880,7 +2888,7 @@
           <p:cNvPr id="4" name="Text Placeholder 3">
             <a:extLst>
               <a:ext uri="{FF2B5EF4-FFF2-40B4-BE49-F238E27FC236}">
-                <a16:creationId xmlns:a16="http://schemas.microsoft.com/office/drawing/2014/main" id="{195AF715-4053-DA4C-8A30-0703274D0E0E}"/>
+                <a16:creationId xmlns:a16="http://schemas.microsoft.com/office/drawing/2014/main" xmlns="" id="{195AF715-4053-DA4C-8A30-0703274D0E0E}"/>
               </a:ext>
             </a:extLst>
           </p:cNvPr>
@@ -2951,7 +2959,7 @@
           <p:cNvPr id="5" name="Date Placeholder 4">
             <a:extLst>
               <a:ext uri="{FF2B5EF4-FFF2-40B4-BE49-F238E27FC236}">
-                <a16:creationId xmlns:a16="http://schemas.microsoft.com/office/drawing/2014/main" id="{A0766889-939D-E84C-818C-D59589B84207}"/>
+                <a16:creationId xmlns:a16="http://schemas.microsoft.com/office/drawing/2014/main" xmlns="" id="{A0766889-939D-E84C-818C-D59589B84207}"/>
               </a:ext>
             </a:extLst>
           </p:cNvPr>
@@ -2980,7 +2988,7 @@
           <p:cNvPr id="6" name="Footer Placeholder 5">
             <a:extLst>
               <a:ext uri="{FF2B5EF4-FFF2-40B4-BE49-F238E27FC236}">
-                <a16:creationId xmlns:a16="http://schemas.microsoft.com/office/drawing/2014/main" id="{B5D08EFC-F2C2-7840-9B9B-559E48E7F67C}"/>
+                <a16:creationId xmlns:a16="http://schemas.microsoft.com/office/drawing/2014/main" xmlns="" id="{B5D08EFC-F2C2-7840-9B9B-559E48E7F67C}"/>
               </a:ext>
             </a:extLst>
           </p:cNvPr>
@@ -3005,7 +3013,7 @@
           <p:cNvPr id="7" name="Slide Number Placeholder 6">
             <a:extLst>
               <a:ext uri="{FF2B5EF4-FFF2-40B4-BE49-F238E27FC236}">
-                <a16:creationId xmlns:a16="http://schemas.microsoft.com/office/drawing/2014/main" id="{534961D4-6E52-2240-BBA0-8C90711D91BB}"/>
+                <a16:creationId xmlns:a16="http://schemas.microsoft.com/office/drawing/2014/main" xmlns="" id="{534961D4-6E52-2240-BBA0-8C90711D91BB}"/>
               </a:ext>
             </a:extLst>
           </p:cNvPr>
@@ -3064,7 +3072,7 @@
           <p:cNvPr id="2" name="Title 1">
             <a:extLst>
               <a:ext uri="{FF2B5EF4-FFF2-40B4-BE49-F238E27FC236}">
-                <a16:creationId xmlns:a16="http://schemas.microsoft.com/office/drawing/2014/main" id="{21EE9434-DB1D-ED4C-8FDB-17F9D3986850}"/>
+                <a16:creationId xmlns:a16="http://schemas.microsoft.com/office/drawing/2014/main" xmlns="" id="{21EE9434-DB1D-ED4C-8FDB-17F9D3986850}"/>
               </a:ext>
             </a:extLst>
           </p:cNvPr>
@@ -3101,7 +3109,7 @@
           <p:cNvPr id="3" name="Picture Placeholder 2">
             <a:extLst>
               <a:ext uri="{FF2B5EF4-FFF2-40B4-BE49-F238E27FC236}">
-                <a16:creationId xmlns:a16="http://schemas.microsoft.com/office/drawing/2014/main" id="{50A4317C-EC8B-D645-818E-B4C07D9EB5E5}"/>
+                <a16:creationId xmlns:a16="http://schemas.microsoft.com/office/drawing/2014/main" xmlns="" id="{50A4317C-EC8B-D645-818E-B4C07D9EB5E5}"/>
               </a:ext>
             </a:extLst>
           </p:cNvPr>
@@ -3168,7 +3176,7 @@
           <p:cNvPr id="4" name="Text Placeholder 3">
             <a:extLst>
               <a:ext uri="{FF2B5EF4-FFF2-40B4-BE49-F238E27FC236}">
-                <a16:creationId xmlns:a16="http://schemas.microsoft.com/office/drawing/2014/main" id="{002AC5D4-8F98-F746-BF68-E535719F6146}"/>
+                <a16:creationId xmlns:a16="http://schemas.microsoft.com/office/drawing/2014/main" xmlns="" id="{002AC5D4-8F98-F746-BF68-E535719F6146}"/>
               </a:ext>
             </a:extLst>
           </p:cNvPr>
@@ -3239,7 +3247,7 @@
           <p:cNvPr id="5" name="Date Placeholder 4">
             <a:extLst>
               <a:ext uri="{FF2B5EF4-FFF2-40B4-BE49-F238E27FC236}">
-                <a16:creationId xmlns:a16="http://schemas.microsoft.com/office/drawing/2014/main" id="{08921FF9-98BC-8649-891B-B5EBCBF44539}"/>
+                <a16:creationId xmlns:a16="http://schemas.microsoft.com/office/drawing/2014/main" xmlns="" id="{08921FF9-98BC-8649-891B-B5EBCBF44539}"/>
               </a:ext>
             </a:extLst>
           </p:cNvPr>
@@ -3268,7 +3276,7 @@
           <p:cNvPr id="6" name="Footer Placeholder 5">
             <a:extLst>
               <a:ext uri="{FF2B5EF4-FFF2-40B4-BE49-F238E27FC236}">
-                <a16:creationId xmlns:a16="http://schemas.microsoft.com/office/drawing/2014/main" id="{7E947D3B-DC4A-9A41-A3F3-A9F6F2C3A899}"/>
+                <a16:creationId xmlns:a16="http://schemas.microsoft.com/office/drawing/2014/main" xmlns="" id="{7E947D3B-DC4A-9A41-A3F3-A9F6F2C3A899}"/>
               </a:ext>
             </a:extLst>
           </p:cNvPr>
@@ -3293,7 +3301,7 @@
           <p:cNvPr id="7" name="Slide Number Placeholder 6">
             <a:extLst>
               <a:ext uri="{FF2B5EF4-FFF2-40B4-BE49-F238E27FC236}">
-                <a16:creationId xmlns:a16="http://schemas.microsoft.com/office/drawing/2014/main" id="{6A3C2815-A897-9540-9628-17B77505B44B}"/>
+                <a16:creationId xmlns:a16="http://schemas.microsoft.com/office/drawing/2014/main" xmlns="" id="{6A3C2815-A897-9540-9628-17B77505B44B}"/>
               </a:ext>
             </a:extLst>
           </p:cNvPr>
@@ -3357,7 +3365,7 @@
           <p:cNvPr id="2" name="Title Placeholder 1">
             <a:extLst>
               <a:ext uri="{FF2B5EF4-FFF2-40B4-BE49-F238E27FC236}">
-                <a16:creationId xmlns:a16="http://schemas.microsoft.com/office/drawing/2014/main" id="{6E080B71-C4FE-4D48-842F-D60219C0A3CF}"/>
+                <a16:creationId xmlns:a16="http://schemas.microsoft.com/office/drawing/2014/main" xmlns="" id="{6E080B71-C4FE-4D48-842F-D60219C0A3CF}"/>
               </a:ext>
             </a:extLst>
           </p:cNvPr>
@@ -3395,7 +3403,7 @@
           <p:cNvPr id="3" name="Text Placeholder 2">
             <a:extLst>
               <a:ext uri="{FF2B5EF4-FFF2-40B4-BE49-F238E27FC236}">
-                <a16:creationId xmlns:a16="http://schemas.microsoft.com/office/drawing/2014/main" id="{17BBDDEF-4925-C24C-BF06-CD0996EB046D}"/>
+                <a16:creationId xmlns:a16="http://schemas.microsoft.com/office/drawing/2014/main" xmlns="" id="{17BBDDEF-4925-C24C-BF06-CD0996EB046D}"/>
               </a:ext>
             </a:extLst>
           </p:cNvPr>
@@ -3462,7 +3470,7 @@
           <p:cNvPr id="4" name="Date Placeholder 3">
             <a:extLst>
               <a:ext uri="{FF2B5EF4-FFF2-40B4-BE49-F238E27FC236}">
-                <a16:creationId xmlns:a16="http://schemas.microsoft.com/office/drawing/2014/main" id="{DC80CB21-0DF3-CD4A-B09E-69ECEA1526F7}"/>
+                <a16:creationId xmlns:a16="http://schemas.microsoft.com/office/drawing/2014/main" xmlns="" id="{DC80CB21-0DF3-CD4A-B09E-69ECEA1526F7}"/>
               </a:ext>
             </a:extLst>
           </p:cNvPr>
@@ -3509,7 +3517,7 @@
           <p:cNvPr id="5" name="Footer Placeholder 4">
             <a:extLst>
               <a:ext uri="{FF2B5EF4-FFF2-40B4-BE49-F238E27FC236}">
-                <a16:creationId xmlns:a16="http://schemas.microsoft.com/office/drawing/2014/main" id="{ABB4EA46-2316-0C4B-BFC8-8C9729394897}"/>
+                <a16:creationId xmlns:a16="http://schemas.microsoft.com/office/drawing/2014/main" xmlns="" id="{ABB4EA46-2316-0C4B-BFC8-8C9729394897}"/>
               </a:ext>
             </a:extLst>
           </p:cNvPr>
@@ -3552,7 +3560,7 @@
           <p:cNvPr id="6" name="Slide Number Placeholder 5">
             <a:extLst>
               <a:ext uri="{FF2B5EF4-FFF2-40B4-BE49-F238E27FC236}">
-                <a16:creationId xmlns:a16="http://schemas.microsoft.com/office/drawing/2014/main" id="{E186B8A5-E4A5-744C-8AA1-B9824F9A9FB2}"/>
+                <a16:creationId xmlns:a16="http://schemas.microsoft.com/office/drawing/2014/main" xmlns="" id="{E186B8A5-E4A5-744C-8AA1-B9824F9A9FB2}"/>
               </a:ext>
             </a:extLst>
           </p:cNvPr>
@@ -3921,7 +3929,7 @@
           <p:cNvPr id="7" name="Picture 6" descr="A close up of a sign&#10;&#10;Description generated with high confidence">
             <a:extLst>
               <a:ext uri="{FF2B5EF4-FFF2-40B4-BE49-F238E27FC236}">
-                <a16:creationId xmlns:a16="http://schemas.microsoft.com/office/drawing/2014/main" id="{D4223982-D3DB-4AAB-85E3-3C4F24EAEB8E}"/>
+                <a16:creationId xmlns:a16="http://schemas.microsoft.com/office/drawing/2014/main" xmlns="" id="{D4223982-D3DB-4AAB-85E3-3C4F24EAEB8E}"/>
               </a:ext>
             </a:extLst>
           </p:cNvPr>
@@ -3957,7 +3965,7 @@
           <p:cNvPr id="8" name="Rectangle 7">
             <a:extLst>
               <a:ext uri="{FF2B5EF4-FFF2-40B4-BE49-F238E27FC236}">
-                <a16:creationId xmlns:a16="http://schemas.microsoft.com/office/drawing/2014/main" id="{A328DB65-785B-4A16-8D5D-ECB875C0104D}"/>
+                <a16:creationId xmlns:a16="http://schemas.microsoft.com/office/drawing/2014/main" xmlns="" id="{A328DB65-785B-4A16-8D5D-ECB875C0104D}"/>
               </a:ext>
             </a:extLst>
           </p:cNvPr>
@@ -4006,7 +4014,7 @@
           <p:cNvPr id="2" name="Title 1">
             <a:extLst>
               <a:ext uri="{FF2B5EF4-FFF2-40B4-BE49-F238E27FC236}">
-                <a16:creationId xmlns:a16="http://schemas.microsoft.com/office/drawing/2014/main" id="{7FA43F5E-28C6-480E-A4F8-8C595CC043FE}"/>
+                <a16:creationId xmlns:a16="http://schemas.microsoft.com/office/drawing/2014/main" xmlns="" id="{7FA43F5E-28C6-480E-A4F8-8C595CC043FE}"/>
               </a:ext>
             </a:extLst>
           </p:cNvPr>
@@ -4019,8 +4027,8 @@
         </p:nvSpPr>
         <p:spPr>
           <a:xfrm>
-            <a:off x="634276" y="803705"/>
-            <a:ext cx="4208656" cy="3034857"/>
+            <a:off x="387171" y="803705"/>
+            <a:ext cx="4455761" cy="3034857"/>
           </a:xfrm>
         </p:spPr>
         <p:txBody>
@@ -4036,8 +4044,21 @@
                   <a:srgbClr val="FFFFFF"/>
                 </a:solidFill>
               </a:rPr>
-              <a:t>News Article NLP Analyzer</a:t>
-            </a:r>
+              <a:t>News </a:t>
+            </a:r>
+            <a:r>
+              <a:rPr lang="en-US" sz="5400" dirty="0" smtClean="0">
+                <a:solidFill>
+                  <a:srgbClr val="FFFFFF"/>
+                </a:solidFill>
+              </a:rPr>
+              <a:t>Articles Recommender</a:t>
+            </a:r>
+            <a:endParaRPr lang="en-US" sz="5400" dirty="0">
+              <a:solidFill>
+                <a:srgbClr val="FFFFFF"/>
+              </a:solidFill>
+            </a:endParaRPr>
           </a:p>
         </p:txBody>
       </p:sp>
@@ -4046,7 +4067,7 @@
           <p:cNvPr id="3" name="Subtitle 2">
             <a:extLst>
               <a:ext uri="{FF2B5EF4-FFF2-40B4-BE49-F238E27FC236}">
-                <a16:creationId xmlns:a16="http://schemas.microsoft.com/office/drawing/2014/main" id="{EE9A30BF-B783-4E5F-B1AB-6673475DB934}"/>
+                <a16:creationId xmlns:a16="http://schemas.microsoft.com/office/drawing/2014/main" xmlns="" id="{EE9A30BF-B783-4E5F-B1AB-6673475DB934}"/>
               </a:ext>
             </a:extLst>
           </p:cNvPr>
@@ -4151,7 +4172,7 @@
           <p:cNvPr id="9" name="TextBox 8">
             <a:extLst>
               <a:ext uri="{FF2B5EF4-FFF2-40B4-BE49-F238E27FC236}">
-                <a16:creationId xmlns:a16="http://schemas.microsoft.com/office/drawing/2014/main" id="{C979495A-7FB0-4DDD-8F5F-937CE54E843D}"/>
+                <a16:creationId xmlns:a16="http://schemas.microsoft.com/office/drawing/2014/main" xmlns="" id="{C979495A-7FB0-4DDD-8F5F-937CE54E843D}"/>
               </a:ext>
             </a:extLst>
           </p:cNvPr>
@@ -4196,6 +4217,1209 @@
   <p:clrMapOvr>
     <a:masterClrMapping/>
   </p:clrMapOvr>
+  <p:timing>
+    <p:tnLst>
+      <p:par>
+        <p:cTn xmlns:p14="http://schemas.microsoft.com/office/powerpoint/2010/main" id="1" dur="indefinite" restart="never" nodeType="tmRoot"/>
+      </p:par>
+    </p:tnLst>
+  </p:timing>
+</p:sld>
+</file>
+
+<file path=ppt/slides/slide10.xml><?xml version="1.0" encoding="utf-8"?>
+<p:sld xmlns:a="http://schemas.openxmlformats.org/drawingml/2006/main" xmlns:r="http://schemas.openxmlformats.org/officeDocument/2006/relationships" xmlns:p="http://schemas.openxmlformats.org/presentationml/2006/main">
+  <p:cSld>
+    <p:spTree>
+      <p:nvGrpSpPr>
+        <p:cNvPr id="1" name=""/>
+        <p:cNvGrpSpPr/>
+        <p:nvPr/>
+      </p:nvGrpSpPr>
+      <p:grpSpPr>
+        <a:xfrm>
+          <a:off x="0" y="0"/>
+          <a:ext cx="0" cy="0"/>
+          <a:chOff x="0" y="0"/>
+          <a:chExt cx="0" cy="0"/>
+        </a:xfrm>
+      </p:grpSpPr>
+      <p:sp>
+        <p:nvSpPr>
+          <p:cNvPr id="2" name="Title 1"/>
+          <p:cNvSpPr>
+            <a:spLocks noGrp="1"/>
+          </p:cNvSpPr>
+          <p:nvPr>
+            <p:ph type="title"/>
+          </p:nvPr>
+        </p:nvSpPr>
+        <p:spPr/>
+        <p:txBody>
+          <a:bodyPr/>
+          <a:lstStyle/>
+          <a:p>
+            <a:r>
+              <a:rPr lang="en-US" dirty="0" smtClean="0"/>
+              <a:t>Component 2: Topic Modeler (Ryan)</a:t>
+            </a:r>
+            <a:endParaRPr lang="en-US" dirty="0"/>
+          </a:p>
+        </p:txBody>
+      </p:sp>
+    </p:spTree>
+    <p:extLst>
+      <p:ext uri="{BB962C8B-B14F-4D97-AF65-F5344CB8AC3E}">
+        <p14:creationId xmlns:p14="http://schemas.microsoft.com/office/powerpoint/2010/main" val="3848655109"/>
+      </p:ext>
+    </p:extLst>
+  </p:cSld>
+  <p:clrMapOvr>
+    <a:masterClrMapping/>
+  </p:clrMapOvr>
+  <p:transition xmlns:p14="http://schemas.microsoft.com/office/powerpoint/2010/main">
+    <p:fade/>
+  </p:transition>
+</p:sld>
+</file>
+
+<file path=ppt/slides/slide11.xml><?xml version="1.0" encoding="utf-8"?>
+<p:sld xmlns:a="http://schemas.openxmlformats.org/drawingml/2006/main" xmlns:r="http://schemas.openxmlformats.org/officeDocument/2006/relationships" xmlns:p="http://schemas.openxmlformats.org/presentationml/2006/main">
+  <p:cSld>
+    <p:spTree>
+      <p:nvGrpSpPr>
+        <p:cNvPr id="1" name=""/>
+        <p:cNvGrpSpPr/>
+        <p:nvPr/>
+      </p:nvGrpSpPr>
+      <p:grpSpPr>
+        <a:xfrm>
+          <a:off x="0" y="0"/>
+          <a:ext cx="0" cy="0"/>
+          <a:chOff x="0" y="0"/>
+          <a:chExt cx="0" cy="0"/>
+        </a:xfrm>
+      </p:grpSpPr>
+      <p:sp>
+        <p:nvSpPr>
+          <p:cNvPr id="2" name="Title 1"/>
+          <p:cNvSpPr>
+            <a:spLocks noGrp="1"/>
+          </p:cNvSpPr>
+          <p:nvPr>
+            <p:ph type="title"/>
+          </p:nvPr>
+        </p:nvSpPr>
+        <p:spPr/>
+        <p:txBody>
+          <a:bodyPr/>
+          <a:lstStyle/>
+          <a:p>
+            <a:r>
+              <a:rPr lang="en-US" dirty="0" smtClean="0"/>
+              <a:t>Component 3: Recommender (Crystal)</a:t>
+            </a:r>
+            <a:endParaRPr lang="en-US" dirty="0"/>
+          </a:p>
+        </p:txBody>
+      </p:sp>
+    </p:spTree>
+    <p:extLst>
+      <p:ext uri="{BB962C8B-B14F-4D97-AF65-F5344CB8AC3E}">
+        <p14:creationId xmlns:p14="http://schemas.microsoft.com/office/powerpoint/2010/main" val="716948892"/>
+      </p:ext>
+    </p:extLst>
+  </p:cSld>
+  <p:clrMapOvr>
+    <a:masterClrMapping/>
+  </p:clrMapOvr>
+  <p:transition xmlns:p14="http://schemas.microsoft.com/office/powerpoint/2010/main">
+    <p:fade/>
+  </p:transition>
+</p:sld>
+</file>
+
+<file path=ppt/slides/slide12.xml><?xml version="1.0" encoding="utf-8"?>
+<p:sld xmlns:a="http://schemas.openxmlformats.org/drawingml/2006/main" xmlns:r="http://schemas.openxmlformats.org/officeDocument/2006/relationships" xmlns:p="http://schemas.openxmlformats.org/presentationml/2006/main">
+  <p:cSld>
+    <p:spTree>
+      <p:nvGrpSpPr>
+        <p:cNvPr id="1" name=""/>
+        <p:cNvGrpSpPr/>
+        <p:nvPr/>
+      </p:nvGrpSpPr>
+      <p:grpSpPr>
+        <a:xfrm>
+          <a:off x="0" y="0"/>
+          <a:ext cx="0" cy="0"/>
+          <a:chOff x="0" y="0"/>
+          <a:chExt cx="0" cy="0"/>
+        </a:xfrm>
+      </p:grpSpPr>
+      <p:sp>
+        <p:nvSpPr>
+          <p:cNvPr id="2" name="Title 1"/>
+          <p:cNvSpPr>
+            <a:spLocks noGrp="1"/>
+          </p:cNvSpPr>
+          <p:nvPr>
+            <p:ph type="title"/>
+          </p:nvPr>
+        </p:nvSpPr>
+        <p:spPr/>
+        <p:txBody>
+          <a:bodyPr/>
+          <a:lstStyle/>
+          <a:p>
+            <a:r>
+              <a:rPr lang="en-US" dirty="0" smtClean="0"/>
+              <a:t>Component 4: Sentiment Analyzer (Charles)</a:t>
+            </a:r>
+            <a:endParaRPr lang="en-US" dirty="0"/>
+          </a:p>
+        </p:txBody>
+      </p:sp>
+    </p:spTree>
+    <p:extLst>
+      <p:ext uri="{BB962C8B-B14F-4D97-AF65-F5344CB8AC3E}">
+        <p14:creationId xmlns:p14="http://schemas.microsoft.com/office/powerpoint/2010/main" val="278324565"/>
+      </p:ext>
+    </p:extLst>
+  </p:cSld>
+  <p:clrMapOvr>
+    <a:masterClrMapping/>
+  </p:clrMapOvr>
+  <p:transition xmlns:p14="http://schemas.microsoft.com/office/powerpoint/2010/main">
+    <p:fade/>
+  </p:transition>
+</p:sld>
+</file>
+
+<file path=ppt/slides/slide13.xml><?xml version="1.0" encoding="utf-8"?>
+<p:sld xmlns:a="http://schemas.openxmlformats.org/drawingml/2006/main" xmlns:r="http://schemas.openxmlformats.org/officeDocument/2006/relationships" xmlns:p="http://schemas.openxmlformats.org/presentationml/2006/main">
+  <p:cSld>
+    <p:spTree>
+      <p:nvGrpSpPr>
+        <p:cNvPr id="1" name=""/>
+        <p:cNvGrpSpPr/>
+        <p:nvPr/>
+      </p:nvGrpSpPr>
+      <p:grpSpPr>
+        <a:xfrm>
+          <a:off x="0" y="0"/>
+          <a:ext cx="0" cy="0"/>
+          <a:chOff x="0" y="0"/>
+          <a:chExt cx="0" cy="0"/>
+        </a:xfrm>
+      </p:grpSpPr>
+      <p:sp>
+        <p:nvSpPr>
+          <p:cNvPr id="2" name="Title 1">
+            <a:extLst>
+              <a:ext uri="{FF2B5EF4-FFF2-40B4-BE49-F238E27FC236}">
+                <a16:creationId xmlns:a16="http://schemas.microsoft.com/office/drawing/2014/main" xmlns="" id="{E8FD8485-8D87-7944-8EC0-6B992B9C4D86}"/>
+              </a:ext>
+            </a:extLst>
+          </p:cNvPr>
+          <p:cNvSpPr>
+            <a:spLocks noGrp="1"/>
+          </p:cNvSpPr>
+          <p:nvPr>
+            <p:ph type="title"/>
+          </p:nvPr>
+        </p:nvSpPr>
+        <p:spPr/>
+        <p:txBody>
+          <a:bodyPr/>
+          <a:lstStyle/>
+          <a:p>
+            <a:r>
+              <a:rPr lang="en-US" dirty="0"/>
+              <a:t>Demo</a:t>
+            </a:r>
+          </a:p>
+        </p:txBody>
+      </p:sp>
+      <p:sp>
+        <p:nvSpPr>
+          <p:cNvPr id="3" name="Content Placeholder 2">
+            <a:extLst>
+              <a:ext uri="{FF2B5EF4-FFF2-40B4-BE49-F238E27FC236}">
+                <a16:creationId xmlns:a16="http://schemas.microsoft.com/office/drawing/2014/main" xmlns="" id="{B6614BC7-F88E-854F-A078-E006F32764E1}"/>
+              </a:ext>
+            </a:extLst>
+          </p:cNvPr>
+          <p:cNvSpPr txBox="1">
+            <a:spLocks/>
+          </p:cNvSpPr>
+          <p:nvPr/>
+        </p:nvSpPr>
+        <p:spPr>
+          <a:xfrm>
+            <a:off x="268081" y="939452"/>
+            <a:ext cx="11085720" cy="5336088"/>
+          </a:xfrm>
+          <a:prstGeom prst="rect">
+            <a:avLst/>
+          </a:prstGeom>
+        </p:spPr>
+        <p:txBody>
+          <a:bodyPr>
+            <a:noAutofit/>
+          </a:bodyPr>
+          <a:lstStyle>
+            <a:lvl1pPr marL="228600" indent="-228600" algn="l" defTabSz="914400" rtl="0" eaLnBrk="1" latinLnBrk="0" hangingPunct="1">
+              <a:lnSpc>
+                <a:spcPct val="90000"/>
+              </a:lnSpc>
+              <a:spcBef>
+                <a:spcPts val="1000"/>
+              </a:spcBef>
+              <a:buFont typeface="Arial" panose="020B0604020202020204" pitchFamily="34" charset="0"/>
+              <a:buChar char="•"/>
+              <a:defRPr sz="2800" kern="1200">
+                <a:solidFill>
+                  <a:schemeClr val="tx1"/>
+                </a:solidFill>
+                <a:latin typeface="+mn-lt"/>
+                <a:ea typeface="+mn-ea"/>
+                <a:cs typeface="+mn-cs"/>
+              </a:defRPr>
+            </a:lvl1pPr>
+            <a:lvl2pPr marL="685800" indent="-228600" algn="l" defTabSz="914400" rtl="0" eaLnBrk="1" latinLnBrk="0" hangingPunct="1">
+              <a:lnSpc>
+                <a:spcPct val="90000"/>
+              </a:lnSpc>
+              <a:spcBef>
+                <a:spcPts val="500"/>
+              </a:spcBef>
+              <a:buFont typeface="Arial" panose="020B0604020202020204" pitchFamily="34" charset="0"/>
+              <a:buChar char="•"/>
+              <a:defRPr sz="2400" kern="1200">
+                <a:solidFill>
+                  <a:schemeClr val="tx1"/>
+                </a:solidFill>
+                <a:latin typeface="+mn-lt"/>
+                <a:ea typeface="+mn-ea"/>
+                <a:cs typeface="+mn-cs"/>
+              </a:defRPr>
+            </a:lvl2pPr>
+            <a:lvl3pPr marL="1143000" indent="-228600" algn="l" defTabSz="914400" rtl="0" eaLnBrk="1" latinLnBrk="0" hangingPunct="1">
+              <a:lnSpc>
+                <a:spcPct val="90000"/>
+              </a:lnSpc>
+              <a:spcBef>
+                <a:spcPts val="500"/>
+              </a:spcBef>
+              <a:buFont typeface="Arial" panose="020B0604020202020204" pitchFamily="34" charset="0"/>
+              <a:buChar char="•"/>
+              <a:defRPr sz="2000" kern="1200">
+                <a:solidFill>
+                  <a:schemeClr val="tx1"/>
+                </a:solidFill>
+                <a:latin typeface="+mn-lt"/>
+                <a:ea typeface="+mn-ea"/>
+                <a:cs typeface="+mn-cs"/>
+              </a:defRPr>
+            </a:lvl3pPr>
+            <a:lvl4pPr marL="1600200" indent="-228600" algn="l" defTabSz="914400" rtl="0" eaLnBrk="1" latinLnBrk="0" hangingPunct="1">
+              <a:lnSpc>
+                <a:spcPct val="90000"/>
+              </a:lnSpc>
+              <a:spcBef>
+                <a:spcPts val="500"/>
+              </a:spcBef>
+              <a:buFont typeface="Arial" panose="020B0604020202020204" pitchFamily="34" charset="0"/>
+              <a:buChar char="•"/>
+              <a:defRPr sz="1800" kern="1200">
+                <a:solidFill>
+                  <a:schemeClr val="tx1"/>
+                </a:solidFill>
+                <a:latin typeface="+mn-lt"/>
+                <a:ea typeface="+mn-ea"/>
+                <a:cs typeface="+mn-cs"/>
+              </a:defRPr>
+            </a:lvl4pPr>
+            <a:lvl5pPr marL="2057400" indent="-228600" algn="l" defTabSz="914400" rtl="0" eaLnBrk="1" latinLnBrk="0" hangingPunct="1">
+              <a:lnSpc>
+                <a:spcPct val="90000"/>
+              </a:lnSpc>
+              <a:spcBef>
+                <a:spcPts val="500"/>
+              </a:spcBef>
+              <a:buFont typeface="Arial" panose="020B0604020202020204" pitchFamily="34" charset="0"/>
+              <a:buChar char="•"/>
+              <a:defRPr sz="1800" kern="1200">
+                <a:solidFill>
+                  <a:schemeClr val="tx1"/>
+                </a:solidFill>
+                <a:latin typeface="+mn-lt"/>
+                <a:ea typeface="+mn-ea"/>
+                <a:cs typeface="+mn-cs"/>
+              </a:defRPr>
+            </a:lvl5pPr>
+            <a:lvl6pPr marL="2514600" indent="-228600" algn="l" defTabSz="914400" rtl="0" eaLnBrk="1" latinLnBrk="0" hangingPunct="1">
+              <a:lnSpc>
+                <a:spcPct val="90000"/>
+              </a:lnSpc>
+              <a:spcBef>
+                <a:spcPts val="500"/>
+              </a:spcBef>
+              <a:buFont typeface="Arial" panose="020B0604020202020204" pitchFamily="34" charset="0"/>
+              <a:buChar char="•"/>
+              <a:defRPr sz="1800" kern="1200">
+                <a:solidFill>
+                  <a:schemeClr val="tx1"/>
+                </a:solidFill>
+                <a:latin typeface="+mn-lt"/>
+                <a:ea typeface="+mn-ea"/>
+                <a:cs typeface="+mn-cs"/>
+              </a:defRPr>
+            </a:lvl6pPr>
+            <a:lvl7pPr marL="2971800" indent="-228600" algn="l" defTabSz="914400" rtl="0" eaLnBrk="1" latinLnBrk="0" hangingPunct="1">
+              <a:lnSpc>
+                <a:spcPct val="90000"/>
+              </a:lnSpc>
+              <a:spcBef>
+                <a:spcPts val="500"/>
+              </a:spcBef>
+              <a:buFont typeface="Arial" panose="020B0604020202020204" pitchFamily="34" charset="0"/>
+              <a:buChar char="•"/>
+              <a:defRPr sz="1800" kern="1200">
+                <a:solidFill>
+                  <a:schemeClr val="tx1"/>
+                </a:solidFill>
+                <a:latin typeface="+mn-lt"/>
+                <a:ea typeface="+mn-ea"/>
+                <a:cs typeface="+mn-cs"/>
+              </a:defRPr>
+            </a:lvl7pPr>
+            <a:lvl8pPr marL="3429000" indent="-228600" algn="l" defTabSz="914400" rtl="0" eaLnBrk="1" latinLnBrk="0" hangingPunct="1">
+              <a:lnSpc>
+                <a:spcPct val="90000"/>
+              </a:lnSpc>
+              <a:spcBef>
+                <a:spcPts val="500"/>
+              </a:spcBef>
+              <a:buFont typeface="Arial" panose="020B0604020202020204" pitchFamily="34" charset="0"/>
+              <a:buChar char="•"/>
+              <a:defRPr sz="1800" kern="1200">
+                <a:solidFill>
+                  <a:schemeClr val="tx1"/>
+                </a:solidFill>
+                <a:latin typeface="+mn-lt"/>
+                <a:ea typeface="+mn-ea"/>
+                <a:cs typeface="+mn-cs"/>
+              </a:defRPr>
+            </a:lvl8pPr>
+            <a:lvl9pPr marL="3886200" indent="-228600" algn="l" defTabSz="914400" rtl="0" eaLnBrk="1" latinLnBrk="0" hangingPunct="1">
+              <a:lnSpc>
+                <a:spcPct val="90000"/>
+              </a:lnSpc>
+              <a:spcBef>
+                <a:spcPts val="500"/>
+              </a:spcBef>
+              <a:buFont typeface="Arial" panose="020B0604020202020204" pitchFamily="34" charset="0"/>
+              <a:buChar char="•"/>
+              <a:defRPr sz="1800" kern="1200">
+                <a:solidFill>
+                  <a:schemeClr val="tx1"/>
+                </a:solidFill>
+                <a:latin typeface="+mn-lt"/>
+                <a:ea typeface="+mn-ea"/>
+                <a:cs typeface="+mn-cs"/>
+              </a:defRPr>
+            </a:lvl9pPr>
+          </a:lstStyle>
+          <a:p>
+            <a:r>
+              <a:rPr lang="en-US" sz="3200" dirty="0" smtClean="0"/>
+              <a:t>Website here for the demo</a:t>
+            </a:r>
+            <a:endParaRPr lang="en-US" sz="3200" dirty="0"/>
+          </a:p>
+          <a:p>
+            <a:endParaRPr lang="en-US" sz="3200" dirty="0"/>
+          </a:p>
+          <a:p>
+            <a:endParaRPr lang="en-US" sz="3200" dirty="0"/>
+          </a:p>
+        </p:txBody>
+      </p:sp>
+    </p:spTree>
+    <p:extLst>
+      <p:ext uri="{BB962C8B-B14F-4D97-AF65-F5344CB8AC3E}">
+        <p14:creationId xmlns:p14="http://schemas.microsoft.com/office/powerpoint/2010/main" val="1895162162"/>
+      </p:ext>
+    </p:extLst>
+  </p:cSld>
+  <p:clrMapOvr>
+    <a:masterClrMapping/>
+  </p:clrMapOvr>
+  <p:transition xmlns:p14="http://schemas.microsoft.com/office/powerpoint/2010/main">
+    <p:fade/>
+  </p:transition>
+  <p:timing>
+    <p:tnLst>
+      <p:par>
+        <p:cTn xmlns:p14="http://schemas.microsoft.com/office/powerpoint/2010/main" id="1" dur="indefinite" restart="never" nodeType="tmRoot"/>
+      </p:par>
+    </p:tnLst>
+  </p:timing>
+</p:sld>
+</file>
+
+<file path=ppt/slides/slide14.xml><?xml version="1.0" encoding="utf-8"?>
+<p:sld xmlns:a="http://schemas.openxmlformats.org/drawingml/2006/main" xmlns:r="http://schemas.openxmlformats.org/officeDocument/2006/relationships" xmlns:p="http://schemas.openxmlformats.org/presentationml/2006/main">
+  <p:cSld>
+    <p:spTree>
+      <p:nvGrpSpPr>
+        <p:cNvPr id="1" name=""/>
+        <p:cNvGrpSpPr/>
+        <p:nvPr/>
+      </p:nvGrpSpPr>
+      <p:grpSpPr>
+        <a:xfrm>
+          <a:off x="0" y="0"/>
+          <a:ext cx="0" cy="0"/>
+          <a:chOff x="0" y="0"/>
+          <a:chExt cx="0" cy="0"/>
+        </a:xfrm>
+      </p:grpSpPr>
+      <p:sp>
+        <p:nvSpPr>
+          <p:cNvPr id="2" name="Title 1"/>
+          <p:cNvSpPr>
+            <a:spLocks noGrp="1"/>
+          </p:cNvSpPr>
+          <p:nvPr>
+            <p:ph type="title"/>
+          </p:nvPr>
+        </p:nvSpPr>
+        <p:spPr/>
+        <p:txBody>
+          <a:bodyPr/>
+          <a:lstStyle/>
+          <a:p>
+            <a:r>
+              <a:rPr lang="en-US" dirty="0" smtClean="0"/>
+              <a:t>Problems Encountered</a:t>
+            </a:r>
+            <a:endParaRPr lang="en-US" dirty="0"/>
+          </a:p>
+        </p:txBody>
+      </p:sp>
+      <p:sp>
+        <p:nvSpPr>
+          <p:cNvPr id="3" name="Content Placeholder 2">
+            <a:extLst>
+              <a:ext uri="{FF2B5EF4-FFF2-40B4-BE49-F238E27FC236}">
+                <a16:creationId xmlns:a16="http://schemas.microsoft.com/office/drawing/2014/main" xmlns="" id="{B6614BC7-F88E-854F-A078-E006F32764E1}"/>
+              </a:ext>
+            </a:extLst>
+          </p:cNvPr>
+          <p:cNvSpPr txBox="1">
+            <a:spLocks/>
+          </p:cNvSpPr>
+          <p:nvPr/>
+        </p:nvSpPr>
+        <p:spPr>
+          <a:xfrm>
+            <a:off x="268081" y="939452"/>
+            <a:ext cx="11085720" cy="5336088"/>
+          </a:xfrm>
+          <a:prstGeom prst="rect">
+            <a:avLst/>
+          </a:prstGeom>
+        </p:spPr>
+        <p:txBody>
+          <a:bodyPr>
+            <a:noAutofit/>
+          </a:bodyPr>
+          <a:lstStyle>
+            <a:lvl1pPr marL="228600" indent="-228600" algn="l" defTabSz="914400" rtl="0" eaLnBrk="1" latinLnBrk="0" hangingPunct="1">
+              <a:lnSpc>
+                <a:spcPct val="90000"/>
+              </a:lnSpc>
+              <a:spcBef>
+                <a:spcPts val="1000"/>
+              </a:spcBef>
+              <a:buFont typeface="Arial" panose="020B0604020202020204" pitchFamily="34" charset="0"/>
+              <a:buChar char="•"/>
+              <a:defRPr sz="2800" kern="1200">
+                <a:solidFill>
+                  <a:schemeClr val="tx1"/>
+                </a:solidFill>
+                <a:latin typeface="+mn-lt"/>
+                <a:ea typeface="+mn-ea"/>
+                <a:cs typeface="+mn-cs"/>
+              </a:defRPr>
+            </a:lvl1pPr>
+            <a:lvl2pPr marL="685800" indent="-228600" algn="l" defTabSz="914400" rtl="0" eaLnBrk="1" latinLnBrk="0" hangingPunct="1">
+              <a:lnSpc>
+                <a:spcPct val="90000"/>
+              </a:lnSpc>
+              <a:spcBef>
+                <a:spcPts val="500"/>
+              </a:spcBef>
+              <a:buFont typeface="Arial" panose="020B0604020202020204" pitchFamily="34" charset="0"/>
+              <a:buChar char="•"/>
+              <a:defRPr sz="2400" kern="1200">
+                <a:solidFill>
+                  <a:schemeClr val="tx1"/>
+                </a:solidFill>
+                <a:latin typeface="+mn-lt"/>
+                <a:ea typeface="+mn-ea"/>
+                <a:cs typeface="+mn-cs"/>
+              </a:defRPr>
+            </a:lvl2pPr>
+            <a:lvl3pPr marL="1143000" indent="-228600" algn="l" defTabSz="914400" rtl="0" eaLnBrk="1" latinLnBrk="0" hangingPunct="1">
+              <a:lnSpc>
+                <a:spcPct val="90000"/>
+              </a:lnSpc>
+              <a:spcBef>
+                <a:spcPts val="500"/>
+              </a:spcBef>
+              <a:buFont typeface="Arial" panose="020B0604020202020204" pitchFamily="34" charset="0"/>
+              <a:buChar char="•"/>
+              <a:defRPr sz="2000" kern="1200">
+                <a:solidFill>
+                  <a:schemeClr val="tx1"/>
+                </a:solidFill>
+                <a:latin typeface="+mn-lt"/>
+                <a:ea typeface="+mn-ea"/>
+                <a:cs typeface="+mn-cs"/>
+              </a:defRPr>
+            </a:lvl3pPr>
+            <a:lvl4pPr marL="1600200" indent="-228600" algn="l" defTabSz="914400" rtl="0" eaLnBrk="1" latinLnBrk="0" hangingPunct="1">
+              <a:lnSpc>
+                <a:spcPct val="90000"/>
+              </a:lnSpc>
+              <a:spcBef>
+                <a:spcPts val="500"/>
+              </a:spcBef>
+              <a:buFont typeface="Arial" panose="020B0604020202020204" pitchFamily="34" charset="0"/>
+              <a:buChar char="•"/>
+              <a:defRPr sz="1800" kern="1200">
+                <a:solidFill>
+                  <a:schemeClr val="tx1"/>
+                </a:solidFill>
+                <a:latin typeface="+mn-lt"/>
+                <a:ea typeface="+mn-ea"/>
+                <a:cs typeface="+mn-cs"/>
+              </a:defRPr>
+            </a:lvl4pPr>
+            <a:lvl5pPr marL="2057400" indent="-228600" algn="l" defTabSz="914400" rtl="0" eaLnBrk="1" latinLnBrk="0" hangingPunct="1">
+              <a:lnSpc>
+                <a:spcPct val="90000"/>
+              </a:lnSpc>
+              <a:spcBef>
+                <a:spcPts val="500"/>
+              </a:spcBef>
+              <a:buFont typeface="Arial" panose="020B0604020202020204" pitchFamily="34" charset="0"/>
+              <a:buChar char="•"/>
+              <a:defRPr sz="1800" kern="1200">
+                <a:solidFill>
+                  <a:schemeClr val="tx1"/>
+                </a:solidFill>
+                <a:latin typeface="+mn-lt"/>
+                <a:ea typeface="+mn-ea"/>
+                <a:cs typeface="+mn-cs"/>
+              </a:defRPr>
+            </a:lvl5pPr>
+            <a:lvl6pPr marL="2514600" indent="-228600" algn="l" defTabSz="914400" rtl="0" eaLnBrk="1" latinLnBrk="0" hangingPunct="1">
+              <a:lnSpc>
+                <a:spcPct val="90000"/>
+              </a:lnSpc>
+              <a:spcBef>
+                <a:spcPts val="500"/>
+              </a:spcBef>
+              <a:buFont typeface="Arial" panose="020B0604020202020204" pitchFamily="34" charset="0"/>
+              <a:buChar char="•"/>
+              <a:defRPr sz="1800" kern="1200">
+                <a:solidFill>
+                  <a:schemeClr val="tx1"/>
+                </a:solidFill>
+                <a:latin typeface="+mn-lt"/>
+                <a:ea typeface="+mn-ea"/>
+                <a:cs typeface="+mn-cs"/>
+              </a:defRPr>
+            </a:lvl6pPr>
+            <a:lvl7pPr marL="2971800" indent="-228600" algn="l" defTabSz="914400" rtl="0" eaLnBrk="1" latinLnBrk="0" hangingPunct="1">
+              <a:lnSpc>
+                <a:spcPct val="90000"/>
+              </a:lnSpc>
+              <a:spcBef>
+                <a:spcPts val="500"/>
+              </a:spcBef>
+              <a:buFont typeface="Arial" panose="020B0604020202020204" pitchFamily="34" charset="0"/>
+              <a:buChar char="•"/>
+              <a:defRPr sz="1800" kern="1200">
+                <a:solidFill>
+                  <a:schemeClr val="tx1"/>
+                </a:solidFill>
+                <a:latin typeface="+mn-lt"/>
+                <a:ea typeface="+mn-ea"/>
+                <a:cs typeface="+mn-cs"/>
+              </a:defRPr>
+            </a:lvl7pPr>
+            <a:lvl8pPr marL="3429000" indent="-228600" algn="l" defTabSz="914400" rtl="0" eaLnBrk="1" latinLnBrk="0" hangingPunct="1">
+              <a:lnSpc>
+                <a:spcPct val="90000"/>
+              </a:lnSpc>
+              <a:spcBef>
+                <a:spcPts val="500"/>
+              </a:spcBef>
+              <a:buFont typeface="Arial" panose="020B0604020202020204" pitchFamily="34" charset="0"/>
+              <a:buChar char="•"/>
+              <a:defRPr sz="1800" kern="1200">
+                <a:solidFill>
+                  <a:schemeClr val="tx1"/>
+                </a:solidFill>
+                <a:latin typeface="+mn-lt"/>
+                <a:ea typeface="+mn-ea"/>
+                <a:cs typeface="+mn-cs"/>
+              </a:defRPr>
+            </a:lvl8pPr>
+            <a:lvl9pPr marL="3886200" indent="-228600" algn="l" defTabSz="914400" rtl="0" eaLnBrk="1" latinLnBrk="0" hangingPunct="1">
+              <a:lnSpc>
+                <a:spcPct val="90000"/>
+              </a:lnSpc>
+              <a:spcBef>
+                <a:spcPts val="500"/>
+              </a:spcBef>
+              <a:buFont typeface="Arial" panose="020B0604020202020204" pitchFamily="34" charset="0"/>
+              <a:buChar char="•"/>
+              <a:defRPr sz="1800" kern="1200">
+                <a:solidFill>
+                  <a:schemeClr val="tx1"/>
+                </a:solidFill>
+                <a:latin typeface="+mn-lt"/>
+                <a:ea typeface="+mn-ea"/>
+                <a:cs typeface="+mn-cs"/>
+              </a:defRPr>
+            </a:lvl9pPr>
+          </a:lstStyle>
+          <a:p>
+            <a:r>
+              <a:rPr lang="en-US" sz="3200" dirty="0" smtClean="0"/>
+              <a:t>Dataset and model storage</a:t>
+            </a:r>
+          </a:p>
+          <a:p>
+            <a:pPr lvl="1"/>
+            <a:r>
+              <a:rPr lang="en-US" dirty="0" smtClean="0"/>
+              <a:t>Had to create build scripts to build models locally</a:t>
+            </a:r>
+          </a:p>
+          <a:p>
+            <a:r>
+              <a:rPr lang="en-US" sz="3200" dirty="0" smtClean="0"/>
+              <a:t>Model tuning</a:t>
+            </a:r>
+          </a:p>
+          <a:p>
+            <a:pPr lvl="1"/>
+            <a:r>
+              <a:rPr lang="en-US" dirty="0" smtClean="0"/>
+              <a:t>Included extra stop words and deleted bad articles</a:t>
+            </a:r>
+          </a:p>
+          <a:p>
+            <a:pPr lvl="1"/>
+            <a:r>
+              <a:rPr lang="en-US" dirty="0" smtClean="0"/>
+              <a:t>NY Times seed words were time period sensitive, so had to get topic words over longer time scale</a:t>
+            </a:r>
+          </a:p>
+          <a:p>
+            <a:pPr lvl="1"/>
+            <a:r>
+              <a:rPr lang="en-US" dirty="0" smtClean="0"/>
+              <a:t>Number of topics for the LDA models had to be tuned manually</a:t>
+            </a:r>
+          </a:p>
+          <a:p>
+            <a:r>
+              <a:rPr lang="en-US" sz="3200" dirty="0" smtClean="0"/>
+              <a:t>Interpretability</a:t>
+            </a:r>
+          </a:p>
+          <a:p>
+            <a:pPr lvl="1"/>
+            <a:r>
+              <a:rPr lang="en-US" dirty="0" smtClean="0"/>
+              <a:t>Not all LDA topics were interpretable</a:t>
+            </a:r>
+          </a:p>
+          <a:p>
+            <a:pPr lvl="1"/>
+            <a:r>
+              <a:rPr lang="en-US" dirty="0" smtClean="0"/>
+              <a:t>Divided topic modeling </a:t>
+            </a:r>
+            <a:r>
+              <a:rPr lang="en-US" dirty="0" smtClean="0"/>
+              <a:t>into </a:t>
+            </a:r>
+            <a:r>
+              <a:rPr lang="en-US" dirty="0" smtClean="0"/>
+              <a:t>guided topics and unguided topics </a:t>
+            </a:r>
+            <a:endParaRPr lang="en-US" dirty="0"/>
+          </a:p>
+          <a:p>
+            <a:endParaRPr lang="en-US" sz="3200" dirty="0"/>
+          </a:p>
+          <a:p>
+            <a:endParaRPr lang="en-US" sz="3200" dirty="0"/>
+          </a:p>
+        </p:txBody>
+      </p:sp>
+    </p:spTree>
+    <p:extLst>
+      <p:ext uri="{BB962C8B-B14F-4D97-AF65-F5344CB8AC3E}">
+        <p14:creationId xmlns:p14="http://schemas.microsoft.com/office/powerpoint/2010/main" val="274835956"/>
+      </p:ext>
+    </p:extLst>
+  </p:cSld>
+  <p:clrMapOvr>
+    <a:masterClrMapping/>
+  </p:clrMapOvr>
+  <p:transition xmlns:p14="http://schemas.microsoft.com/office/powerpoint/2010/main">
+    <p:fade/>
+  </p:transition>
+</p:sld>
+</file>
+
+<file path=ppt/slides/slide15.xml><?xml version="1.0" encoding="utf-8"?>
+<p:sld xmlns:a="http://schemas.openxmlformats.org/drawingml/2006/main" xmlns:r="http://schemas.openxmlformats.org/officeDocument/2006/relationships" xmlns:p="http://schemas.openxmlformats.org/presentationml/2006/main">
+  <p:cSld>
+    <p:spTree>
+      <p:nvGrpSpPr>
+        <p:cNvPr id="1" name=""/>
+        <p:cNvGrpSpPr/>
+        <p:nvPr/>
+      </p:nvGrpSpPr>
+      <p:grpSpPr>
+        <a:xfrm>
+          <a:off x="0" y="0"/>
+          <a:ext cx="0" cy="0"/>
+          <a:chOff x="0" y="0"/>
+          <a:chExt cx="0" cy="0"/>
+        </a:xfrm>
+      </p:grpSpPr>
+      <p:sp>
+        <p:nvSpPr>
+          <p:cNvPr id="2" name="Title 1">
+            <a:extLst>
+              <a:ext uri="{FF2B5EF4-FFF2-40B4-BE49-F238E27FC236}">
+                <a16:creationId xmlns:a16="http://schemas.microsoft.com/office/drawing/2014/main" xmlns="" id="{2832AE9A-4189-544C-BFA8-D4CCD669F831}"/>
+              </a:ext>
+            </a:extLst>
+          </p:cNvPr>
+          <p:cNvSpPr>
+            <a:spLocks noGrp="1"/>
+          </p:cNvSpPr>
+          <p:nvPr>
+            <p:ph type="title"/>
+          </p:nvPr>
+        </p:nvSpPr>
+        <p:spPr/>
+        <p:txBody>
+          <a:bodyPr/>
+          <a:lstStyle/>
+          <a:p>
+            <a:r>
+              <a:rPr lang="en-US" dirty="0"/>
+              <a:t>Future Work</a:t>
+            </a:r>
+          </a:p>
+        </p:txBody>
+      </p:sp>
+      <p:sp>
+        <p:nvSpPr>
+          <p:cNvPr id="3" name="Content Placeholder 2">
+            <a:extLst>
+              <a:ext uri="{FF2B5EF4-FFF2-40B4-BE49-F238E27FC236}">
+                <a16:creationId xmlns:a16="http://schemas.microsoft.com/office/drawing/2014/main" xmlns="" id="{B6614BC7-F88E-854F-A078-E006F32764E1}"/>
+              </a:ext>
+            </a:extLst>
+          </p:cNvPr>
+          <p:cNvSpPr txBox="1">
+            <a:spLocks/>
+          </p:cNvSpPr>
+          <p:nvPr/>
+        </p:nvSpPr>
+        <p:spPr>
+          <a:xfrm>
+            <a:off x="268081" y="939452"/>
+            <a:ext cx="11085720" cy="5336088"/>
+          </a:xfrm>
+          <a:prstGeom prst="rect">
+            <a:avLst/>
+          </a:prstGeom>
+        </p:spPr>
+        <p:txBody>
+          <a:bodyPr>
+            <a:noAutofit/>
+          </a:bodyPr>
+          <a:lstStyle>
+            <a:lvl1pPr marL="228600" indent="-228600" algn="l" defTabSz="914400" rtl="0" eaLnBrk="1" latinLnBrk="0" hangingPunct="1">
+              <a:lnSpc>
+                <a:spcPct val="90000"/>
+              </a:lnSpc>
+              <a:spcBef>
+                <a:spcPts val="1000"/>
+              </a:spcBef>
+              <a:buFont typeface="Arial" panose="020B0604020202020204" pitchFamily="34" charset="0"/>
+              <a:buChar char="•"/>
+              <a:defRPr sz="2800" kern="1200">
+                <a:solidFill>
+                  <a:schemeClr val="tx1"/>
+                </a:solidFill>
+                <a:latin typeface="+mn-lt"/>
+                <a:ea typeface="+mn-ea"/>
+                <a:cs typeface="+mn-cs"/>
+              </a:defRPr>
+            </a:lvl1pPr>
+            <a:lvl2pPr marL="685800" indent="-228600" algn="l" defTabSz="914400" rtl="0" eaLnBrk="1" latinLnBrk="0" hangingPunct="1">
+              <a:lnSpc>
+                <a:spcPct val="90000"/>
+              </a:lnSpc>
+              <a:spcBef>
+                <a:spcPts val="500"/>
+              </a:spcBef>
+              <a:buFont typeface="Arial" panose="020B0604020202020204" pitchFamily="34" charset="0"/>
+              <a:buChar char="•"/>
+              <a:defRPr sz="2400" kern="1200">
+                <a:solidFill>
+                  <a:schemeClr val="tx1"/>
+                </a:solidFill>
+                <a:latin typeface="+mn-lt"/>
+                <a:ea typeface="+mn-ea"/>
+                <a:cs typeface="+mn-cs"/>
+              </a:defRPr>
+            </a:lvl2pPr>
+            <a:lvl3pPr marL="1143000" indent="-228600" algn="l" defTabSz="914400" rtl="0" eaLnBrk="1" latinLnBrk="0" hangingPunct="1">
+              <a:lnSpc>
+                <a:spcPct val="90000"/>
+              </a:lnSpc>
+              <a:spcBef>
+                <a:spcPts val="500"/>
+              </a:spcBef>
+              <a:buFont typeface="Arial" panose="020B0604020202020204" pitchFamily="34" charset="0"/>
+              <a:buChar char="•"/>
+              <a:defRPr sz="2000" kern="1200">
+                <a:solidFill>
+                  <a:schemeClr val="tx1"/>
+                </a:solidFill>
+                <a:latin typeface="+mn-lt"/>
+                <a:ea typeface="+mn-ea"/>
+                <a:cs typeface="+mn-cs"/>
+              </a:defRPr>
+            </a:lvl3pPr>
+            <a:lvl4pPr marL="1600200" indent="-228600" algn="l" defTabSz="914400" rtl="0" eaLnBrk="1" latinLnBrk="0" hangingPunct="1">
+              <a:lnSpc>
+                <a:spcPct val="90000"/>
+              </a:lnSpc>
+              <a:spcBef>
+                <a:spcPts val="500"/>
+              </a:spcBef>
+              <a:buFont typeface="Arial" panose="020B0604020202020204" pitchFamily="34" charset="0"/>
+              <a:buChar char="•"/>
+              <a:defRPr sz="1800" kern="1200">
+                <a:solidFill>
+                  <a:schemeClr val="tx1"/>
+                </a:solidFill>
+                <a:latin typeface="+mn-lt"/>
+                <a:ea typeface="+mn-ea"/>
+                <a:cs typeface="+mn-cs"/>
+              </a:defRPr>
+            </a:lvl4pPr>
+            <a:lvl5pPr marL="2057400" indent="-228600" algn="l" defTabSz="914400" rtl="0" eaLnBrk="1" latinLnBrk="0" hangingPunct="1">
+              <a:lnSpc>
+                <a:spcPct val="90000"/>
+              </a:lnSpc>
+              <a:spcBef>
+                <a:spcPts val="500"/>
+              </a:spcBef>
+              <a:buFont typeface="Arial" panose="020B0604020202020204" pitchFamily="34" charset="0"/>
+              <a:buChar char="•"/>
+              <a:defRPr sz="1800" kern="1200">
+                <a:solidFill>
+                  <a:schemeClr val="tx1"/>
+                </a:solidFill>
+                <a:latin typeface="+mn-lt"/>
+                <a:ea typeface="+mn-ea"/>
+                <a:cs typeface="+mn-cs"/>
+              </a:defRPr>
+            </a:lvl5pPr>
+            <a:lvl6pPr marL="2514600" indent="-228600" algn="l" defTabSz="914400" rtl="0" eaLnBrk="1" latinLnBrk="0" hangingPunct="1">
+              <a:lnSpc>
+                <a:spcPct val="90000"/>
+              </a:lnSpc>
+              <a:spcBef>
+                <a:spcPts val="500"/>
+              </a:spcBef>
+              <a:buFont typeface="Arial" panose="020B0604020202020204" pitchFamily="34" charset="0"/>
+              <a:buChar char="•"/>
+              <a:defRPr sz="1800" kern="1200">
+                <a:solidFill>
+                  <a:schemeClr val="tx1"/>
+                </a:solidFill>
+                <a:latin typeface="+mn-lt"/>
+                <a:ea typeface="+mn-ea"/>
+                <a:cs typeface="+mn-cs"/>
+              </a:defRPr>
+            </a:lvl6pPr>
+            <a:lvl7pPr marL="2971800" indent="-228600" algn="l" defTabSz="914400" rtl="0" eaLnBrk="1" latinLnBrk="0" hangingPunct="1">
+              <a:lnSpc>
+                <a:spcPct val="90000"/>
+              </a:lnSpc>
+              <a:spcBef>
+                <a:spcPts val="500"/>
+              </a:spcBef>
+              <a:buFont typeface="Arial" panose="020B0604020202020204" pitchFamily="34" charset="0"/>
+              <a:buChar char="•"/>
+              <a:defRPr sz="1800" kern="1200">
+                <a:solidFill>
+                  <a:schemeClr val="tx1"/>
+                </a:solidFill>
+                <a:latin typeface="+mn-lt"/>
+                <a:ea typeface="+mn-ea"/>
+                <a:cs typeface="+mn-cs"/>
+              </a:defRPr>
+            </a:lvl7pPr>
+            <a:lvl8pPr marL="3429000" indent="-228600" algn="l" defTabSz="914400" rtl="0" eaLnBrk="1" latinLnBrk="0" hangingPunct="1">
+              <a:lnSpc>
+                <a:spcPct val="90000"/>
+              </a:lnSpc>
+              <a:spcBef>
+                <a:spcPts val="500"/>
+              </a:spcBef>
+              <a:buFont typeface="Arial" panose="020B0604020202020204" pitchFamily="34" charset="0"/>
+              <a:buChar char="•"/>
+              <a:defRPr sz="1800" kern="1200">
+                <a:solidFill>
+                  <a:schemeClr val="tx1"/>
+                </a:solidFill>
+                <a:latin typeface="+mn-lt"/>
+                <a:ea typeface="+mn-ea"/>
+                <a:cs typeface="+mn-cs"/>
+              </a:defRPr>
+            </a:lvl8pPr>
+            <a:lvl9pPr marL="3886200" indent="-228600" algn="l" defTabSz="914400" rtl="0" eaLnBrk="1" latinLnBrk="0" hangingPunct="1">
+              <a:lnSpc>
+                <a:spcPct val="90000"/>
+              </a:lnSpc>
+              <a:spcBef>
+                <a:spcPts val="500"/>
+              </a:spcBef>
+              <a:buFont typeface="Arial" panose="020B0604020202020204" pitchFamily="34" charset="0"/>
+              <a:buChar char="•"/>
+              <a:defRPr sz="1800" kern="1200">
+                <a:solidFill>
+                  <a:schemeClr val="tx1"/>
+                </a:solidFill>
+                <a:latin typeface="+mn-lt"/>
+                <a:ea typeface="+mn-ea"/>
+                <a:cs typeface="+mn-cs"/>
+              </a:defRPr>
+            </a:lvl9pPr>
+          </a:lstStyle>
+          <a:p>
+            <a:r>
+              <a:rPr lang="en-US" sz="3200" dirty="0" smtClean="0"/>
+              <a:t>Improve recommender system</a:t>
+            </a:r>
+          </a:p>
+          <a:p>
+            <a:pPr lvl="1"/>
+            <a:r>
+              <a:rPr lang="en-US" dirty="0" smtClean="0"/>
+              <a:t>Add additional non-topic related features </a:t>
+            </a:r>
+            <a:r>
+              <a:rPr lang="en-US" dirty="0" smtClean="0"/>
+              <a:t>in the recommendation system</a:t>
+            </a:r>
+          </a:p>
+          <a:p>
+            <a:pPr lvl="1"/>
+            <a:r>
+              <a:rPr lang="en-US" dirty="0" smtClean="0"/>
+              <a:t>Further optimize </a:t>
+            </a:r>
+            <a:r>
+              <a:rPr lang="en-US" dirty="0" err="1" smtClean="0"/>
+              <a:t>hyperparamters</a:t>
+            </a:r>
+            <a:r>
+              <a:rPr lang="en-US" dirty="0" smtClean="0"/>
+              <a:t> to the LDA models</a:t>
+            </a:r>
+          </a:p>
+          <a:p>
+            <a:r>
+              <a:rPr lang="en-US" sz="3200" dirty="0" smtClean="0"/>
+              <a:t>Corpus-wide visualizations for data exploration</a:t>
+            </a:r>
+          </a:p>
+          <a:p>
+            <a:r>
+              <a:rPr lang="en-US" sz="3200" dirty="0" smtClean="0"/>
+              <a:t>Prettify UI</a:t>
+            </a:r>
+          </a:p>
+          <a:p>
+            <a:endParaRPr lang="en-US" sz="3200" dirty="0" smtClean="0"/>
+          </a:p>
+          <a:p>
+            <a:endParaRPr lang="en-US" sz="3200" dirty="0" smtClean="0"/>
+          </a:p>
+          <a:p>
+            <a:endParaRPr lang="en-US" dirty="0" smtClean="0"/>
+          </a:p>
+          <a:p>
+            <a:endParaRPr lang="en-US" sz="3200" dirty="0"/>
+          </a:p>
+          <a:p>
+            <a:endParaRPr lang="en-US" sz="3200" dirty="0"/>
+          </a:p>
+          <a:p>
+            <a:endParaRPr lang="en-US" sz="3200" dirty="0"/>
+          </a:p>
+        </p:txBody>
+      </p:sp>
+    </p:spTree>
+    <p:extLst>
+      <p:ext uri="{BB962C8B-B14F-4D97-AF65-F5344CB8AC3E}">
+        <p14:creationId xmlns:p14="http://schemas.microsoft.com/office/powerpoint/2010/main" val="1503719038"/>
+      </p:ext>
+    </p:extLst>
+  </p:cSld>
+  <p:clrMapOvr>
+    <a:masterClrMapping/>
+  </p:clrMapOvr>
+  <p:transition xmlns:p14="http://schemas.microsoft.com/office/powerpoint/2010/main">
+    <p:fade/>
+  </p:transition>
+  <p:timing>
+    <p:tnLst>
+      <p:par>
+        <p:cTn xmlns:p14="http://schemas.microsoft.com/office/powerpoint/2010/main" id="1" dur="indefinite" restart="never" nodeType="tmRoot"/>
+      </p:par>
+    </p:tnLst>
+  </p:timing>
+</p:sld>
+</file>
+
+<file path=ppt/slides/slide16.xml><?xml version="1.0" encoding="utf-8"?>
+<p:sld xmlns:a="http://schemas.openxmlformats.org/drawingml/2006/main" xmlns:r="http://schemas.openxmlformats.org/officeDocument/2006/relationships" xmlns:p="http://schemas.openxmlformats.org/presentationml/2006/main">
+  <p:cSld>
+    <p:spTree>
+      <p:nvGrpSpPr>
+        <p:cNvPr id="1" name=""/>
+        <p:cNvGrpSpPr/>
+        <p:nvPr/>
+      </p:nvGrpSpPr>
+      <p:grpSpPr>
+        <a:xfrm>
+          <a:off x="0" y="0"/>
+          <a:ext cx="0" cy="0"/>
+          <a:chOff x="0" y="0"/>
+          <a:chExt cx="0" cy="0"/>
+        </a:xfrm>
+      </p:grpSpPr>
+      <p:sp>
+        <p:nvSpPr>
+          <p:cNvPr id="2" name="Title 1">
+            <a:extLst>
+              <a:ext uri="{FF2B5EF4-FFF2-40B4-BE49-F238E27FC236}">
+                <a16:creationId xmlns:a16="http://schemas.microsoft.com/office/drawing/2014/main" xmlns="" id="{1C4D9048-0D5E-42BB-952A-048C2B8BB387}"/>
+              </a:ext>
+            </a:extLst>
+          </p:cNvPr>
+          <p:cNvSpPr>
+            <a:spLocks noGrp="1"/>
+          </p:cNvSpPr>
+          <p:nvPr>
+            <p:ph type="title"/>
+          </p:nvPr>
+        </p:nvSpPr>
+        <p:spPr/>
+        <p:txBody>
+          <a:bodyPr>
+            <a:normAutofit/>
+          </a:bodyPr>
+          <a:lstStyle/>
+          <a:p>
+            <a:r>
+              <a:rPr lang="en-US" dirty="0" smtClean="0"/>
+              <a:t>Detailed Design (Appendix)</a:t>
+            </a:r>
+            <a:endParaRPr lang="en-US" sz="1400" dirty="0"/>
+          </a:p>
+        </p:txBody>
+      </p:sp>
+      <p:pic>
+        <p:nvPicPr>
+          <p:cNvPr id="17" name="Picture 16" descr="A screenshot of a cell phone&#10;&#10;Description generated with very high confidence">
+            <a:extLst>
+              <a:ext uri="{FF2B5EF4-FFF2-40B4-BE49-F238E27FC236}">
+                <a16:creationId xmlns:a16="http://schemas.microsoft.com/office/drawing/2014/main" xmlns="" id="{A74180A5-2905-4815-8C07-0F6CEDCBB538}"/>
+              </a:ext>
+            </a:extLst>
+          </p:cNvPr>
+          <p:cNvPicPr>
+            <a:picLocks noChangeAspect="1"/>
+          </p:cNvPicPr>
+          <p:nvPr/>
+        </p:nvPicPr>
+        <p:blipFill>
+          <a:blip r:embed="rId3">
+            <a:extLst>
+              <a:ext uri="{28A0092B-C50C-407E-A947-70E740481C1C}">
+                <a14:useLocalDpi xmlns:a14="http://schemas.microsoft.com/office/drawing/2010/main" val="0"/>
+              </a:ext>
+            </a:extLst>
+          </a:blip>
+          <a:stretch>
+            <a:fillRect/>
+          </a:stretch>
+        </p:blipFill>
+        <p:spPr>
+          <a:xfrm>
+            <a:off x="71437" y="1300942"/>
+            <a:ext cx="11858030" cy="4991337"/>
+          </a:xfrm>
+          <a:prstGeom prst="rect">
+            <a:avLst/>
+          </a:prstGeom>
+        </p:spPr>
+      </p:pic>
+    </p:spTree>
+    <p:extLst>
+      <p:ext uri="{BB962C8B-B14F-4D97-AF65-F5344CB8AC3E}">
+        <p14:creationId xmlns:p14="http://schemas.microsoft.com/office/powerpoint/2010/main" val="715819530"/>
+      </p:ext>
+    </p:extLst>
+  </p:cSld>
+  <p:clrMapOvr>
+    <a:masterClrMapping/>
+  </p:clrMapOvr>
+  <p:transition xmlns:p14="http://schemas.microsoft.com/office/powerpoint/2010/main">
+    <p:fade/>
+  </p:transition>
+  <p:timing>
+    <p:tnLst>
+      <p:par>
+        <p:cTn xmlns:p14="http://schemas.microsoft.com/office/powerpoint/2010/main" id="1" dur="indefinite" restart="never" nodeType="tmRoot"/>
+      </p:par>
+    </p:tnLst>
+  </p:timing>
 </p:sld>
 </file>
 
@@ -4221,7 +5445,7 @@
           <p:cNvPr id="2" name="Title 1">
             <a:extLst>
               <a:ext uri="{FF2B5EF4-FFF2-40B4-BE49-F238E27FC236}">
-                <a16:creationId xmlns:a16="http://schemas.microsoft.com/office/drawing/2014/main" id="{B43B5ED8-7DDB-6E41-8F8B-44BE3DED3E8B}"/>
+                <a16:creationId xmlns:a16="http://schemas.microsoft.com/office/drawing/2014/main" xmlns="" id="{B43B5ED8-7DDB-6E41-8F8B-44BE3DED3E8B}"/>
               </a:ext>
             </a:extLst>
           </p:cNvPr>
@@ -4238,9 +5462,10 @@
           <a:lstStyle/>
           <a:p>
             <a:r>
-              <a:rPr lang="en-US" dirty="0"/>
-              <a:t>Background</a:t>
-            </a:r>
+              <a:rPr lang="en-US" dirty="0" smtClean="0"/>
+              <a:t>Problem Statement</a:t>
+            </a:r>
+            <a:endParaRPr lang="en-US" dirty="0"/>
           </a:p>
         </p:txBody>
       </p:sp>
@@ -4249,7 +5474,7 @@
           <p:cNvPr id="4" name="Content Placeholder 2">
             <a:extLst>
               <a:ext uri="{FF2B5EF4-FFF2-40B4-BE49-F238E27FC236}">
-                <a16:creationId xmlns:a16="http://schemas.microsoft.com/office/drawing/2014/main" id="{B6614BC7-F88E-854F-A078-E006F32764E1}"/>
+                <a16:creationId xmlns:a16="http://schemas.microsoft.com/office/drawing/2014/main" xmlns="" id="{B6614BC7-F88E-854F-A078-E006F32764E1}"/>
               </a:ext>
             </a:extLst>
           </p:cNvPr>
@@ -4260,7 +5485,7 @@
         </p:nvSpPr>
         <p:spPr>
           <a:xfrm>
-            <a:off x="268081" y="939452"/>
+            <a:off x="585570" y="939452"/>
             <a:ext cx="11085720" cy="5336088"/>
           </a:xfrm>
           <a:prstGeom prst="rect">
@@ -4436,762 +5661,201 @@
             </a:lvl9pPr>
           </a:lstStyle>
           <a:p>
-            <a:r>
-              <a:rPr lang="en-US" sz="3200" dirty="0"/>
-              <a:t>News article recommendation system based on topic relevance</a:t>
-            </a:r>
-          </a:p>
-          <a:p>
-            <a:r>
-              <a:rPr lang="en-US" sz="3200" dirty="0"/>
-              <a:t>Takes user input query article or topic search from UI</a:t>
-            </a:r>
-          </a:p>
-          <a:p>
-            <a:r>
-              <a:rPr lang="en-US" sz="3200" dirty="0"/>
-              <a:t>Analyzes user input through topic modeling and sentiment analyzer</a:t>
-            </a:r>
-          </a:p>
-          <a:p>
-            <a:r>
-              <a:rPr lang="en-US" sz="3200" dirty="0"/>
-              <a:t>Recommends relevant articles from corpus based on user input</a:t>
-            </a:r>
-          </a:p>
-          <a:p>
-            <a:r>
-              <a:rPr lang="en-US" sz="3200" dirty="0"/>
-              <a:t>Visualizes user input through word cloud to summarize article</a:t>
-            </a:r>
-          </a:p>
-          <a:p>
-            <a:r>
-              <a:rPr lang="en-US" sz="3200" dirty="0"/>
-              <a:t>Lists topic modeling result for user input article</a:t>
-            </a:r>
-          </a:p>
-          <a:p>
-            <a:r>
-              <a:rPr lang="en-US" sz="3200" dirty="0"/>
-              <a:t>Presents sentiment analysis based on number of positive/negative/neutral sentences in input</a:t>
-            </a:r>
-          </a:p>
-          <a:p>
+            <a:pPr marL="0" indent="0" algn="ctr">
+              <a:buNone/>
+            </a:pPr>
+            <a:r>
+              <a:rPr lang="en-US" sz="3200" dirty="0" smtClean="0">
+                <a:solidFill>
+                  <a:srgbClr val="FF0000"/>
+                </a:solidFill>
+              </a:rPr>
+              <a:t>Current search engines only take keywords, </a:t>
+            </a:r>
+            <a:r>
+              <a:rPr lang="en-US" sz="3200" dirty="0" smtClean="0">
+                <a:solidFill>
+                  <a:srgbClr val="FF0000"/>
+                </a:solidFill>
+              </a:rPr>
+              <a:t>but w</a:t>
+            </a:r>
+            <a:r>
+              <a:rPr lang="en-US" sz="3200" dirty="0" smtClean="0">
+                <a:solidFill>
+                  <a:srgbClr val="FF0000"/>
+                </a:solidFill>
+              </a:rPr>
+              <a:t>e want to find similar articles based on a reference article!</a:t>
+            </a:r>
+          </a:p>
+          <a:p>
+            <a:pPr marL="0" indent="0" algn="ctr">
+              <a:buNone/>
+            </a:pPr>
+            <a:endParaRPr lang="en-US" sz="3200" dirty="0">
+              <a:solidFill>
+                <a:srgbClr val="FF0000"/>
+              </a:solidFill>
+            </a:endParaRPr>
+          </a:p>
+          <a:p>
+            <a:pPr marL="0" indent="0" algn="ctr">
+              <a:buNone/>
+            </a:pPr>
+            <a:endParaRPr lang="en-US" sz="3200" dirty="0">
+              <a:solidFill>
+                <a:srgbClr val="FF0000"/>
+              </a:solidFill>
+            </a:endParaRPr>
+          </a:p>
+          <a:p>
+            <a:pPr marL="0" indent="0">
+              <a:buNone/>
+            </a:pPr>
+            <a:r>
+              <a:rPr lang="en-US" sz="3200" dirty="0" smtClean="0"/>
+              <a:t>				    OUR LOGO HERE</a:t>
+            </a:r>
             <a:endParaRPr lang="en-US" sz="3200" dirty="0"/>
           </a:p>
-          <a:p>
-            <a:endParaRPr lang="en-US" sz="3200" dirty="0"/>
-          </a:p>
-        </p:txBody>
-      </p:sp>
+        </p:txBody>
+      </p:sp>
+      <p:pic>
+        <p:nvPicPr>
+          <p:cNvPr id="3" name="Picture 2"/>
+          <p:cNvPicPr>
+            <a:picLocks noChangeAspect="1"/>
+          </p:cNvPicPr>
+          <p:nvPr/>
+        </p:nvPicPr>
+        <p:blipFill>
+          <a:blip r:embed="rId2"/>
+          <a:stretch>
+            <a:fillRect/>
+          </a:stretch>
+        </p:blipFill>
+        <p:spPr>
+          <a:xfrm>
+            <a:off x="991040" y="4089242"/>
+            <a:ext cx="2954166" cy="1969444"/>
+          </a:xfrm>
+          <a:prstGeom prst="rect">
+            <a:avLst/>
+          </a:prstGeom>
+        </p:spPr>
+      </p:pic>
+      <p:pic>
+        <p:nvPicPr>
+          <p:cNvPr id="5" name="Picture 4"/>
+          <p:cNvPicPr>
+            <a:picLocks noChangeAspect="1"/>
+          </p:cNvPicPr>
+          <p:nvPr/>
+        </p:nvPicPr>
+        <p:blipFill>
+          <a:blip r:embed="rId3"/>
+          <a:stretch>
+            <a:fillRect/>
+          </a:stretch>
+        </p:blipFill>
+        <p:spPr>
+          <a:xfrm>
+            <a:off x="8285449" y="4441075"/>
+            <a:ext cx="2698578" cy="1092924"/>
+          </a:xfrm>
+          <a:prstGeom prst="rect">
+            <a:avLst/>
+          </a:prstGeom>
+        </p:spPr>
+      </p:pic>
+      <p:cxnSp>
+        <p:nvCxnSpPr>
+          <p:cNvPr id="7" name="Straight Connector 6"/>
+          <p:cNvCxnSpPr/>
+          <p:nvPr/>
+        </p:nvCxnSpPr>
+        <p:spPr>
+          <a:xfrm flipH="1">
+            <a:off x="1254432" y="4089242"/>
+            <a:ext cx="2555326" cy="2186298"/>
+          </a:xfrm>
+          <a:prstGeom prst="line">
+            <a:avLst/>
+          </a:prstGeom>
+          <a:ln w="76200" cmpd="sng">
+            <a:solidFill>
+              <a:srgbClr val="FF0000"/>
+            </a:solidFill>
+          </a:ln>
+        </p:spPr>
+        <p:style>
+          <a:lnRef idx="2">
+            <a:schemeClr val="accent1"/>
+          </a:lnRef>
+          <a:fillRef idx="0">
+            <a:schemeClr val="accent1"/>
+          </a:fillRef>
+          <a:effectRef idx="1">
+            <a:schemeClr val="accent1"/>
+          </a:effectRef>
+          <a:fontRef idx="minor">
+            <a:schemeClr val="tx1"/>
+          </a:fontRef>
+        </p:style>
+      </p:cxnSp>
+      <p:cxnSp>
+        <p:nvCxnSpPr>
+          <p:cNvPr id="8" name="Straight Connector 7"/>
+          <p:cNvCxnSpPr/>
+          <p:nvPr/>
+        </p:nvCxnSpPr>
+        <p:spPr>
+          <a:xfrm flipH="1">
+            <a:off x="8378370" y="4089242"/>
+            <a:ext cx="2555326" cy="2186298"/>
+          </a:xfrm>
+          <a:prstGeom prst="line">
+            <a:avLst/>
+          </a:prstGeom>
+          <a:ln w="76200" cmpd="sng">
+            <a:solidFill>
+              <a:srgbClr val="FF0000"/>
+            </a:solidFill>
+          </a:ln>
+        </p:spPr>
+        <p:style>
+          <a:lnRef idx="2">
+            <a:schemeClr val="accent1"/>
+          </a:lnRef>
+          <a:fillRef idx="0">
+            <a:schemeClr val="accent1"/>
+          </a:fillRef>
+          <a:effectRef idx="1">
+            <a:schemeClr val="accent1"/>
+          </a:effectRef>
+          <a:fontRef idx="minor">
+            <a:schemeClr val="tx1"/>
+          </a:fontRef>
+        </p:style>
+      </p:cxnSp>
     </p:spTree>
     <p:extLst>
       <p:ext uri="{BB962C8B-B14F-4D97-AF65-F5344CB8AC3E}">
-        <p14:creationId xmlns:p14="http://schemas.microsoft.com/office/powerpoint/2010/main" val="1069115304"/>
+        <p14:creationId xmlns:p14="http://schemas.microsoft.com/office/powerpoint/2010/main" val="857940236"/>
       </p:ext>
     </p:extLst>
   </p:cSld>
   <p:clrMapOvr>
     <a:masterClrMapping/>
   </p:clrMapOvr>
-  <p:transition>
-    <p:fade/>
-  </p:transition>
-</p:sld>
-</file>
-
-<file path=ppt/slides/slide3.xml><?xml version="1.0" encoding="utf-8"?>
-<p:sld xmlns:a="http://schemas.openxmlformats.org/drawingml/2006/main" xmlns:r="http://schemas.openxmlformats.org/officeDocument/2006/relationships" xmlns:p="http://schemas.openxmlformats.org/presentationml/2006/main">
-  <p:cSld>
-    <p:spTree>
-      <p:nvGrpSpPr>
-        <p:cNvPr id="1" name=""/>
-        <p:cNvGrpSpPr/>
-        <p:nvPr/>
-      </p:nvGrpSpPr>
-      <p:grpSpPr>
-        <a:xfrm>
-          <a:off x="0" y="0"/>
-          <a:ext cx="0" cy="0"/>
-          <a:chOff x="0" y="0"/>
-          <a:chExt cx="0" cy="0"/>
-        </a:xfrm>
-      </p:grpSpPr>
-      <p:sp>
-        <p:nvSpPr>
-          <p:cNvPr id="2" name="Title 1">
-            <a:extLst>
-              <a:ext uri="{FF2B5EF4-FFF2-40B4-BE49-F238E27FC236}">
-                <a16:creationId xmlns:a16="http://schemas.microsoft.com/office/drawing/2014/main" id="{3E0EAB73-EC4F-414F-AB38-0915E0C1F16A}"/>
-              </a:ext>
-            </a:extLst>
-          </p:cNvPr>
-          <p:cNvSpPr>
-            <a:spLocks noGrp="1"/>
-          </p:cNvSpPr>
-          <p:nvPr>
-            <p:ph type="title"/>
-          </p:nvPr>
-        </p:nvSpPr>
-        <p:spPr/>
-        <p:txBody>
-          <a:bodyPr/>
-          <a:lstStyle/>
-          <a:p>
-            <a:r>
-              <a:rPr lang="en-US" dirty="0"/>
-              <a:t>Data Sources</a:t>
-            </a:r>
-          </a:p>
-        </p:txBody>
-      </p:sp>
-      <p:sp>
-        <p:nvSpPr>
-          <p:cNvPr id="3" name="Content Placeholder 2">
-            <a:extLst>
-              <a:ext uri="{FF2B5EF4-FFF2-40B4-BE49-F238E27FC236}">
-                <a16:creationId xmlns:a16="http://schemas.microsoft.com/office/drawing/2014/main" id="{50A8077D-01DD-6246-B6D0-2E7DE592A67B}"/>
-              </a:ext>
-            </a:extLst>
-          </p:cNvPr>
-          <p:cNvSpPr txBox="1">
-            <a:spLocks/>
-          </p:cNvSpPr>
-          <p:nvPr/>
-        </p:nvSpPr>
-        <p:spPr>
-          <a:xfrm>
-            <a:off x="268080" y="1011433"/>
-            <a:ext cx="10515600" cy="4351338"/>
-          </a:xfrm>
-          <a:prstGeom prst="rect">
-            <a:avLst/>
-          </a:prstGeom>
-        </p:spPr>
-        <p:txBody>
-          <a:bodyPr/>
-          <a:lstStyle>
-            <a:lvl1pPr marL="228600" indent="-228600" algn="l" defTabSz="914400" rtl="0" eaLnBrk="1" latinLnBrk="0" hangingPunct="1">
-              <a:lnSpc>
-                <a:spcPct val="90000"/>
-              </a:lnSpc>
-              <a:spcBef>
-                <a:spcPts val="1000"/>
-              </a:spcBef>
-              <a:buFont typeface="Arial" panose="020B0604020202020204" pitchFamily="34" charset="0"/>
-              <a:buChar char="•"/>
-              <a:defRPr sz="2800" kern="1200">
-                <a:solidFill>
-                  <a:schemeClr val="tx1"/>
-                </a:solidFill>
-                <a:latin typeface="+mn-lt"/>
-                <a:ea typeface="+mn-ea"/>
-                <a:cs typeface="+mn-cs"/>
-              </a:defRPr>
-            </a:lvl1pPr>
-            <a:lvl2pPr marL="685800" indent="-228600" algn="l" defTabSz="914400" rtl="0" eaLnBrk="1" latinLnBrk="0" hangingPunct="1">
-              <a:lnSpc>
-                <a:spcPct val="90000"/>
-              </a:lnSpc>
-              <a:spcBef>
-                <a:spcPts val="500"/>
-              </a:spcBef>
-              <a:buFont typeface="Arial" panose="020B0604020202020204" pitchFamily="34" charset="0"/>
-              <a:buChar char="•"/>
-              <a:defRPr sz="2400" kern="1200">
-                <a:solidFill>
-                  <a:schemeClr val="tx1"/>
-                </a:solidFill>
-                <a:latin typeface="+mn-lt"/>
-                <a:ea typeface="+mn-ea"/>
-                <a:cs typeface="+mn-cs"/>
-              </a:defRPr>
-            </a:lvl2pPr>
-            <a:lvl3pPr marL="1143000" indent="-228600" algn="l" defTabSz="914400" rtl="0" eaLnBrk="1" latinLnBrk="0" hangingPunct="1">
-              <a:lnSpc>
-                <a:spcPct val="90000"/>
-              </a:lnSpc>
-              <a:spcBef>
-                <a:spcPts val="500"/>
-              </a:spcBef>
-              <a:buFont typeface="Arial" panose="020B0604020202020204" pitchFamily="34" charset="0"/>
-              <a:buChar char="•"/>
-              <a:defRPr sz="2000" kern="1200">
-                <a:solidFill>
-                  <a:schemeClr val="tx1"/>
-                </a:solidFill>
-                <a:latin typeface="+mn-lt"/>
-                <a:ea typeface="+mn-ea"/>
-                <a:cs typeface="+mn-cs"/>
-              </a:defRPr>
-            </a:lvl3pPr>
-            <a:lvl4pPr marL="1600200" indent="-228600" algn="l" defTabSz="914400" rtl="0" eaLnBrk="1" latinLnBrk="0" hangingPunct="1">
-              <a:lnSpc>
-                <a:spcPct val="90000"/>
-              </a:lnSpc>
-              <a:spcBef>
-                <a:spcPts val="500"/>
-              </a:spcBef>
-              <a:buFont typeface="Arial" panose="020B0604020202020204" pitchFamily="34" charset="0"/>
-              <a:buChar char="•"/>
-              <a:defRPr sz="1800" kern="1200">
-                <a:solidFill>
-                  <a:schemeClr val="tx1"/>
-                </a:solidFill>
-                <a:latin typeface="+mn-lt"/>
-                <a:ea typeface="+mn-ea"/>
-                <a:cs typeface="+mn-cs"/>
-              </a:defRPr>
-            </a:lvl4pPr>
-            <a:lvl5pPr marL="2057400" indent="-228600" algn="l" defTabSz="914400" rtl="0" eaLnBrk="1" latinLnBrk="0" hangingPunct="1">
-              <a:lnSpc>
-                <a:spcPct val="90000"/>
-              </a:lnSpc>
-              <a:spcBef>
-                <a:spcPts val="500"/>
-              </a:spcBef>
-              <a:buFont typeface="Arial" panose="020B0604020202020204" pitchFamily="34" charset="0"/>
-              <a:buChar char="•"/>
-              <a:defRPr sz="1800" kern="1200">
-                <a:solidFill>
-                  <a:schemeClr val="tx1"/>
-                </a:solidFill>
-                <a:latin typeface="+mn-lt"/>
-                <a:ea typeface="+mn-ea"/>
-                <a:cs typeface="+mn-cs"/>
-              </a:defRPr>
-            </a:lvl5pPr>
-            <a:lvl6pPr marL="2514600" indent="-228600" algn="l" defTabSz="914400" rtl="0" eaLnBrk="1" latinLnBrk="0" hangingPunct="1">
-              <a:lnSpc>
-                <a:spcPct val="90000"/>
-              </a:lnSpc>
-              <a:spcBef>
-                <a:spcPts val="500"/>
-              </a:spcBef>
-              <a:buFont typeface="Arial" panose="020B0604020202020204" pitchFamily="34" charset="0"/>
-              <a:buChar char="•"/>
-              <a:defRPr sz="1800" kern="1200">
-                <a:solidFill>
-                  <a:schemeClr val="tx1"/>
-                </a:solidFill>
-                <a:latin typeface="+mn-lt"/>
-                <a:ea typeface="+mn-ea"/>
-                <a:cs typeface="+mn-cs"/>
-              </a:defRPr>
-            </a:lvl6pPr>
-            <a:lvl7pPr marL="2971800" indent="-228600" algn="l" defTabSz="914400" rtl="0" eaLnBrk="1" latinLnBrk="0" hangingPunct="1">
-              <a:lnSpc>
-                <a:spcPct val="90000"/>
-              </a:lnSpc>
-              <a:spcBef>
-                <a:spcPts val="500"/>
-              </a:spcBef>
-              <a:buFont typeface="Arial" panose="020B0604020202020204" pitchFamily="34" charset="0"/>
-              <a:buChar char="•"/>
-              <a:defRPr sz="1800" kern="1200">
-                <a:solidFill>
-                  <a:schemeClr val="tx1"/>
-                </a:solidFill>
-                <a:latin typeface="+mn-lt"/>
-                <a:ea typeface="+mn-ea"/>
-                <a:cs typeface="+mn-cs"/>
-              </a:defRPr>
-            </a:lvl7pPr>
-            <a:lvl8pPr marL="3429000" indent="-228600" algn="l" defTabSz="914400" rtl="0" eaLnBrk="1" latinLnBrk="0" hangingPunct="1">
-              <a:lnSpc>
-                <a:spcPct val="90000"/>
-              </a:lnSpc>
-              <a:spcBef>
-                <a:spcPts val="500"/>
-              </a:spcBef>
-              <a:buFont typeface="Arial" panose="020B0604020202020204" pitchFamily="34" charset="0"/>
-              <a:buChar char="•"/>
-              <a:defRPr sz="1800" kern="1200">
-                <a:solidFill>
-                  <a:schemeClr val="tx1"/>
-                </a:solidFill>
-                <a:latin typeface="+mn-lt"/>
-                <a:ea typeface="+mn-ea"/>
-                <a:cs typeface="+mn-cs"/>
-              </a:defRPr>
-            </a:lvl8pPr>
-            <a:lvl9pPr marL="3886200" indent="-228600" algn="l" defTabSz="914400" rtl="0" eaLnBrk="1" latinLnBrk="0" hangingPunct="1">
-              <a:lnSpc>
-                <a:spcPct val="90000"/>
-              </a:lnSpc>
-              <a:spcBef>
-                <a:spcPts val="500"/>
-              </a:spcBef>
-              <a:buFont typeface="Arial" panose="020B0604020202020204" pitchFamily="34" charset="0"/>
-              <a:buChar char="•"/>
-              <a:defRPr sz="1800" kern="1200">
-                <a:solidFill>
-                  <a:schemeClr val="tx1"/>
-                </a:solidFill>
-                <a:latin typeface="+mn-lt"/>
-                <a:ea typeface="+mn-ea"/>
-                <a:cs typeface="+mn-cs"/>
-              </a:defRPr>
-            </a:lvl9pPr>
-          </a:lstStyle>
-          <a:p>
-            <a:r>
-              <a:rPr lang="en-US" dirty="0" err="1"/>
-              <a:t>Kaggle</a:t>
-            </a:r>
-            <a:r>
-              <a:rPr lang="en-US" dirty="0"/>
-              <a:t> news articles dataset</a:t>
-            </a:r>
-          </a:p>
-          <a:p>
-            <a:pPr lvl="1"/>
-            <a:r>
-              <a:rPr lang="en-US" dirty="0"/>
-              <a:t>140,000 articles including article title, author, publisher, content and date</a:t>
-            </a:r>
-          </a:p>
-          <a:p>
-            <a:pPr lvl="1"/>
-            <a:r>
-              <a:rPr lang="en-US" dirty="0"/>
-              <a:t>Articles from 2015 to 2017 from 15 major US publishers</a:t>
-            </a:r>
-          </a:p>
-          <a:p>
-            <a:endParaRPr lang="en-US" dirty="0"/>
-          </a:p>
-          <a:p>
-            <a:r>
-              <a:rPr lang="en-US" dirty="0" err="1"/>
-              <a:t>NYtimes</a:t>
-            </a:r>
-            <a:r>
-              <a:rPr lang="en-US" dirty="0"/>
-              <a:t> topic category labels </a:t>
-            </a:r>
-          </a:p>
-          <a:p>
-            <a:pPr lvl="1"/>
-            <a:r>
-              <a:rPr lang="en-US" dirty="0"/>
-              <a:t>News article topics from </a:t>
-            </a:r>
-            <a:r>
-              <a:rPr lang="en-US" dirty="0" err="1"/>
-              <a:t>NYtimes</a:t>
-            </a:r>
-            <a:endParaRPr lang="en-US" dirty="0"/>
-          </a:p>
-          <a:p>
-            <a:pPr lvl="1"/>
-            <a:r>
-              <a:rPr lang="en-US" dirty="0"/>
-              <a:t>Passed through guided LDA model to produce interpretable topics 		</a:t>
-            </a:r>
-          </a:p>
-          <a:p>
-            <a:pPr lvl="1"/>
-            <a:endParaRPr lang="en-US" dirty="0"/>
-          </a:p>
-        </p:txBody>
-      </p:sp>
-    </p:spTree>
-    <p:extLst>
-      <p:ext uri="{BB962C8B-B14F-4D97-AF65-F5344CB8AC3E}">
-        <p14:creationId xmlns:p14="http://schemas.microsoft.com/office/powerpoint/2010/main" val="1081099500"/>
-      </p:ext>
-    </p:extLst>
-  </p:cSld>
-  <p:clrMapOvr>
-    <a:masterClrMapping/>
-  </p:clrMapOvr>
-  <p:transition>
-    <p:fade/>
-  </p:transition>
-</p:sld>
-</file>
-
-<file path=ppt/slides/slide4.xml><?xml version="1.0" encoding="utf-8"?>
-<p:sld xmlns:a="http://schemas.openxmlformats.org/drawingml/2006/main" xmlns:r="http://schemas.openxmlformats.org/officeDocument/2006/relationships" xmlns:p="http://schemas.openxmlformats.org/presentationml/2006/main">
-  <p:cSld>
-    <p:spTree>
-      <p:nvGrpSpPr>
-        <p:cNvPr id="1" name=""/>
-        <p:cNvGrpSpPr/>
-        <p:nvPr/>
-      </p:nvGrpSpPr>
-      <p:grpSpPr>
-        <a:xfrm>
-          <a:off x="0" y="0"/>
-          <a:ext cx="0" cy="0"/>
-          <a:chOff x="0" y="0"/>
-          <a:chExt cx="0" cy="0"/>
-        </a:xfrm>
-      </p:grpSpPr>
-      <p:sp>
-        <p:nvSpPr>
-          <p:cNvPr id="2" name="Title 1">
-            <a:extLst>
-              <a:ext uri="{FF2B5EF4-FFF2-40B4-BE49-F238E27FC236}">
-                <a16:creationId xmlns:a16="http://schemas.microsoft.com/office/drawing/2014/main" id="{2EF134A1-43EF-4349-A2AD-27D89395C626}"/>
-              </a:ext>
-            </a:extLst>
-          </p:cNvPr>
-          <p:cNvSpPr>
-            <a:spLocks noGrp="1"/>
-          </p:cNvSpPr>
-          <p:nvPr>
-            <p:ph type="title"/>
-          </p:nvPr>
-        </p:nvSpPr>
-        <p:spPr/>
-        <p:txBody>
-          <a:bodyPr/>
-          <a:lstStyle/>
-          <a:p>
-            <a:r>
-              <a:rPr lang="en-US" dirty="0"/>
-              <a:t>Target Users</a:t>
-            </a:r>
-          </a:p>
-        </p:txBody>
-      </p:sp>
-    </p:spTree>
-    <p:extLst>
-      <p:ext uri="{BB962C8B-B14F-4D97-AF65-F5344CB8AC3E}">
-        <p14:creationId xmlns:p14="http://schemas.microsoft.com/office/powerpoint/2010/main" val="888694540"/>
-      </p:ext>
-    </p:extLst>
-  </p:cSld>
-  <p:clrMapOvr>
-    <a:masterClrMapping/>
-  </p:clrMapOvr>
-  <p:transition>
-    <p:fade/>
-  </p:transition>
-</p:sld>
-</file>
-
-<file path=ppt/slides/slide5.xml><?xml version="1.0" encoding="utf-8"?>
-<p:sld xmlns:a="http://schemas.openxmlformats.org/drawingml/2006/main" xmlns:r="http://schemas.openxmlformats.org/officeDocument/2006/relationships" xmlns:p="http://schemas.openxmlformats.org/presentationml/2006/main">
-  <p:cSld>
-    <p:spTree>
-      <p:nvGrpSpPr>
-        <p:cNvPr id="1" name=""/>
-        <p:cNvGrpSpPr/>
-        <p:nvPr/>
-      </p:nvGrpSpPr>
-      <p:grpSpPr>
-        <a:xfrm>
-          <a:off x="0" y="0"/>
-          <a:ext cx="0" cy="0"/>
-          <a:chOff x="0" y="0"/>
-          <a:chExt cx="0" cy="0"/>
-        </a:xfrm>
-      </p:grpSpPr>
-      <p:sp>
-        <p:nvSpPr>
-          <p:cNvPr id="2" name="Title 1">
-            <a:extLst>
-              <a:ext uri="{FF2B5EF4-FFF2-40B4-BE49-F238E27FC236}">
-                <a16:creationId xmlns:a16="http://schemas.microsoft.com/office/drawing/2014/main" id="{E8FD8485-8D87-7944-8EC0-6B992B9C4D86}"/>
-              </a:ext>
-            </a:extLst>
-          </p:cNvPr>
-          <p:cNvSpPr>
-            <a:spLocks noGrp="1"/>
-          </p:cNvSpPr>
-          <p:nvPr>
-            <p:ph type="title"/>
-          </p:nvPr>
-        </p:nvSpPr>
-        <p:spPr/>
-        <p:txBody>
-          <a:bodyPr/>
-          <a:lstStyle/>
-          <a:p>
-            <a:r>
-              <a:rPr lang="en-US" dirty="0"/>
-              <a:t>Demo</a:t>
-            </a:r>
-          </a:p>
-        </p:txBody>
-      </p:sp>
-    </p:spTree>
-    <p:extLst>
-      <p:ext uri="{BB962C8B-B14F-4D97-AF65-F5344CB8AC3E}">
-        <p14:creationId xmlns:p14="http://schemas.microsoft.com/office/powerpoint/2010/main" val="1895162162"/>
-      </p:ext>
-    </p:extLst>
-  </p:cSld>
-  <p:clrMapOvr>
-    <a:masterClrMapping/>
-  </p:clrMapOvr>
-  <p:transition>
-    <p:fade/>
-  </p:transition>
-</p:sld>
-</file>
-
-<file path=ppt/slides/slide6.xml><?xml version="1.0" encoding="utf-8"?>
-<p:sld xmlns:a="http://schemas.openxmlformats.org/drawingml/2006/main" xmlns:r="http://schemas.openxmlformats.org/officeDocument/2006/relationships" xmlns:p="http://schemas.openxmlformats.org/presentationml/2006/main">
-  <p:cSld>
-    <p:spTree>
-      <p:nvGrpSpPr>
-        <p:cNvPr id="1" name=""/>
-        <p:cNvGrpSpPr/>
-        <p:nvPr/>
-      </p:nvGrpSpPr>
-      <p:grpSpPr>
-        <a:xfrm>
-          <a:off x="0" y="0"/>
-          <a:ext cx="0" cy="0"/>
-          <a:chOff x="0" y="0"/>
-          <a:chExt cx="0" cy="0"/>
-        </a:xfrm>
-      </p:grpSpPr>
-      <p:sp>
-        <p:nvSpPr>
-          <p:cNvPr id="2" name="Title 1">
-            <a:extLst>
-              <a:ext uri="{FF2B5EF4-FFF2-40B4-BE49-F238E27FC236}">
-                <a16:creationId xmlns:a16="http://schemas.microsoft.com/office/drawing/2014/main" id="{1C4D9048-0D5E-42BB-952A-048C2B8BB387}"/>
-              </a:ext>
-            </a:extLst>
-          </p:cNvPr>
-          <p:cNvSpPr>
-            <a:spLocks noGrp="1"/>
-          </p:cNvSpPr>
-          <p:nvPr>
-            <p:ph type="title"/>
-          </p:nvPr>
-        </p:nvSpPr>
-        <p:spPr/>
-        <p:txBody>
-          <a:bodyPr>
-            <a:normAutofit/>
-          </a:bodyPr>
-          <a:lstStyle/>
-          <a:p>
-            <a:r>
-              <a:rPr lang="en-US" dirty="0"/>
-              <a:t>Design Overview</a:t>
-            </a:r>
-            <a:endParaRPr lang="en-US" sz="1400" dirty="0"/>
-          </a:p>
-        </p:txBody>
-      </p:sp>
-      <p:pic>
-        <p:nvPicPr>
-          <p:cNvPr id="17" name="Picture 16" descr="A screenshot of a cell phone&#10;&#10;Description generated with very high confidence">
-            <a:extLst>
-              <a:ext uri="{FF2B5EF4-FFF2-40B4-BE49-F238E27FC236}">
-                <a16:creationId xmlns:a16="http://schemas.microsoft.com/office/drawing/2014/main" id="{A74180A5-2905-4815-8C07-0F6CEDCBB538}"/>
-              </a:ext>
-            </a:extLst>
-          </p:cNvPr>
-          <p:cNvPicPr>
-            <a:picLocks noChangeAspect="1"/>
-          </p:cNvPicPr>
-          <p:nvPr/>
-        </p:nvPicPr>
-        <p:blipFill>
-          <a:blip r:embed="rId3">
-            <a:extLst>
-              <a:ext uri="{28A0092B-C50C-407E-A947-70E740481C1C}">
-                <a14:useLocalDpi xmlns:a14="http://schemas.microsoft.com/office/drawing/2010/main" val="0"/>
-              </a:ext>
-            </a:extLst>
-          </a:blip>
-          <a:stretch>
-            <a:fillRect/>
-          </a:stretch>
-        </p:blipFill>
-        <p:spPr>
-          <a:xfrm>
-            <a:off x="71437" y="1641712"/>
-            <a:ext cx="12192000" cy="5131913"/>
-          </a:xfrm>
-          <a:prstGeom prst="rect">
-            <a:avLst/>
-          </a:prstGeom>
-        </p:spPr>
-      </p:pic>
-      <p:sp>
-        <p:nvSpPr>
-          <p:cNvPr id="19" name="Rectangle 18">
-            <a:extLst>
-              <a:ext uri="{FF2B5EF4-FFF2-40B4-BE49-F238E27FC236}">
-                <a16:creationId xmlns:a16="http://schemas.microsoft.com/office/drawing/2014/main" id="{49E88F24-955B-4B35-B0E9-C1A57D8AF0A5}"/>
-              </a:ext>
-            </a:extLst>
-          </p:cNvPr>
-          <p:cNvSpPr/>
-          <p:nvPr/>
-        </p:nvSpPr>
-        <p:spPr>
-          <a:xfrm>
-            <a:off x="97690" y="3242354"/>
-            <a:ext cx="12192000" cy="2659980"/>
-          </a:xfrm>
-          <a:prstGeom prst="rect">
-            <a:avLst/>
-          </a:prstGeom>
-          <a:solidFill>
-            <a:schemeClr val="bg1"/>
-          </a:solidFill>
-          <a:ln>
-            <a:noFill/>
-          </a:ln>
-        </p:spPr>
-        <p:style>
-          <a:lnRef idx="2">
-            <a:schemeClr val="accent1">
-              <a:shade val="50000"/>
-            </a:schemeClr>
-          </a:lnRef>
-          <a:fillRef idx="1">
-            <a:schemeClr val="accent1"/>
-          </a:fillRef>
-          <a:effectRef idx="0">
-            <a:schemeClr val="accent1"/>
-          </a:effectRef>
-          <a:fontRef idx="minor">
-            <a:schemeClr val="lt1"/>
-          </a:fontRef>
-        </p:style>
-        <p:txBody>
-          <a:bodyPr rtlCol="0" anchor="ctr"/>
-          <a:lstStyle/>
-          <a:p>
-            <a:pPr algn="ctr"/>
-            <a:endParaRPr lang="en-US"/>
-          </a:p>
-        </p:txBody>
-      </p:sp>
-      <p:sp>
-        <p:nvSpPr>
-          <p:cNvPr id="22" name="Rectangle 21">
-            <a:extLst>
-              <a:ext uri="{FF2B5EF4-FFF2-40B4-BE49-F238E27FC236}">
-                <a16:creationId xmlns:a16="http://schemas.microsoft.com/office/drawing/2014/main" id="{AFC67E61-B938-4161-81B6-504506CA4DA2}"/>
-              </a:ext>
-            </a:extLst>
-          </p:cNvPr>
-          <p:cNvSpPr/>
-          <p:nvPr/>
-        </p:nvSpPr>
-        <p:spPr>
-          <a:xfrm>
-            <a:off x="4904509" y="1641712"/>
-            <a:ext cx="7154883" cy="1582439"/>
-          </a:xfrm>
-          <a:prstGeom prst="rect">
-            <a:avLst/>
-          </a:prstGeom>
-          <a:solidFill>
-            <a:schemeClr val="bg1"/>
-          </a:solidFill>
-          <a:ln>
-            <a:noFill/>
-          </a:ln>
-        </p:spPr>
-        <p:style>
-          <a:lnRef idx="2">
-            <a:schemeClr val="accent1">
-              <a:shade val="50000"/>
-            </a:schemeClr>
-          </a:lnRef>
-          <a:fillRef idx="1">
-            <a:schemeClr val="accent1"/>
-          </a:fillRef>
-          <a:effectRef idx="0">
-            <a:schemeClr val="accent1"/>
-          </a:effectRef>
-          <a:fontRef idx="minor">
-            <a:schemeClr val="lt1"/>
-          </a:fontRef>
-        </p:style>
-        <p:txBody>
-          <a:bodyPr rtlCol="0" anchor="ctr"/>
-          <a:lstStyle/>
-          <a:p>
-            <a:pPr algn="ctr"/>
-            <a:endParaRPr lang="en-US"/>
-          </a:p>
-        </p:txBody>
-      </p:sp>
-      <p:sp>
-        <p:nvSpPr>
-          <p:cNvPr id="4" name="Rectangle 3">
-            <a:extLst>
-              <a:ext uri="{FF2B5EF4-FFF2-40B4-BE49-F238E27FC236}">
-                <a16:creationId xmlns:a16="http://schemas.microsoft.com/office/drawing/2014/main" id="{C0E94649-B0F7-4B0E-850E-EDD2E68980D9}"/>
-              </a:ext>
-            </a:extLst>
-          </p:cNvPr>
-          <p:cNvSpPr/>
-          <p:nvPr/>
-        </p:nvSpPr>
-        <p:spPr>
-          <a:xfrm>
-            <a:off x="2951629" y="1969994"/>
-            <a:ext cx="981636" cy="679077"/>
-          </a:xfrm>
-          <a:prstGeom prst="rect">
-            <a:avLst/>
-          </a:prstGeom>
-          <a:noFill/>
-          <a:ln w="38100">
-            <a:solidFill>
-              <a:schemeClr val="accent2"/>
-            </a:solidFill>
-          </a:ln>
-        </p:spPr>
-        <p:style>
-          <a:lnRef idx="2">
-            <a:schemeClr val="accent1">
-              <a:shade val="50000"/>
-            </a:schemeClr>
-          </a:lnRef>
-          <a:fillRef idx="1">
-            <a:schemeClr val="accent1"/>
-          </a:fillRef>
-          <a:effectRef idx="0">
-            <a:schemeClr val="accent1"/>
-          </a:effectRef>
-          <a:fontRef idx="minor">
-            <a:schemeClr val="lt1"/>
-          </a:fontRef>
-        </p:style>
-        <p:txBody>
-          <a:bodyPr rtlCol="0" anchor="ctr"/>
-          <a:lstStyle/>
-          <a:p>
-            <a:pPr algn="ctr"/>
-            <a:endParaRPr lang="en-US"/>
-          </a:p>
-        </p:txBody>
-      </p:sp>
-    </p:spTree>
-    <p:extLst>
-      <p:ext uri="{BB962C8B-B14F-4D97-AF65-F5344CB8AC3E}">
-        <p14:creationId xmlns:p14="http://schemas.microsoft.com/office/powerpoint/2010/main" val="715819530"/>
-      </p:ext>
-    </p:extLst>
-  </p:cSld>
-  <p:clrMapOvr>
-    <a:masterClrMapping/>
-  </p:clrMapOvr>
-  <p:transition>
+  <p:transition xmlns:p14="http://schemas.microsoft.com/office/powerpoint/2010/main">
     <p:fade/>
   </p:transition>
   <p:timing>
     <p:tnLst>
       <p:par>
-        <p:cTn id="1" dur="indefinite" restart="never" nodeType="tmRoot">
+        <p:cTn xmlns:p14="http://schemas.microsoft.com/office/powerpoint/2010/main" id="1" dur="indefinite" restart="never" nodeType="tmRoot">
           <p:childTnLst>
             <p:seq concurrent="1" nextAc="seek">
               <p:cTn id="2" dur="indefinite" nodeType="mainSeq">
@@ -5209,7 +5873,7 @@
                             </p:stCondLst>
                             <p:childTnLst>
                               <p:par>
-                                <p:cTn id="5" presetID="1" presetClass="exit" presetSubtype="0" fill="hold" grpId="0" nodeType="clickEffect">
+                                <p:cTn id="5" presetID="1" presetClass="entr" presetSubtype="0" fill="hold" nodeType="clickEffect">
                                   <p:stCondLst>
                                     <p:cond delay="0"/>
                                   </p:stCondLst>
@@ -5222,14 +5886,41 @@
                                           </p:stCondLst>
                                         </p:cTn>
                                         <p:tgtEl>
-                                          <p:spTgt spid="19"/>
+                                          <p:spTgt spid="7"/>
                                         </p:tgtEl>
                                         <p:attrNameLst>
                                           <p:attrName>style.visibility</p:attrName>
                                         </p:attrNameLst>
                                       </p:cBhvr>
                                       <p:to>
-                                        <p:strVal val="hidden"/>
+                                        <p:strVal val="visible"/>
+                                      </p:to>
+                                    </p:set>
+                                  </p:childTnLst>
+                                </p:cTn>
+                              </p:par>
+                              <p:par>
+                                <p:cTn id="7" presetID="1" presetClass="entr" presetSubtype="0" fill="hold" nodeType="withEffect">
+                                  <p:stCondLst>
+                                    <p:cond delay="0"/>
+                                  </p:stCondLst>
+                                  <p:childTnLst>
+                                    <p:set>
+                                      <p:cBhvr>
+                                        <p:cTn id="8" dur="1" fill="hold">
+                                          <p:stCondLst>
+                                            <p:cond delay="0"/>
+                                          </p:stCondLst>
+                                        </p:cTn>
+                                        <p:tgtEl>
+                                          <p:spTgt spid="8"/>
+                                        </p:tgtEl>
+                                        <p:attrNameLst>
+                                          <p:attrName>style.visibility</p:attrName>
+                                        </p:attrNameLst>
+                                      </p:cBhvr>
+                                      <p:to>
+                                        <p:strVal val="visible"/>
                                       </p:to>
                                     </p:set>
                                   </p:childTnLst>
@@ -5242,77 +5933,36 @@
                     </p:cTn>
                   </p:par>
                   <p:par>
-                    <p:cTn id="7" fill="hold">
+                    <p:cTn id="9" fill="hold">
                       <p:stCondLst>
                         <p:cond delay="indefinite"/>
                       </p:stCondLst>
                       <p:childTnLst>
                         <p:par>
-                          <p:cTn id="8" fill="hold">
+                          <p:cTn id="10" fill="hold">
                             <p:stCondLst>
                               <p:cond delay="0"/>
                             </p:stCondLst>
                             <p:childTnLst>
                               <p:par>
-                                <p:cTn id="9" presetID="1" presetClass="exit" presetSubtype="0" fill="hold" grpId="0" nodeType="clickEffect">
+                                <p:cTn id="11" presetID="1" presetClass="entr" presetSubtype="0" fill="hold" nodeType="clickEffect">
                                   <p:stCondLst>
                                     <p:cond delay="0"/>
                                   </p:stCondLst>
                                   <p:childTnLst>
                                     <p:set>
                                       <p:cBhvr>
-                                        <p:cTn id="10" dur="1" fill="hold">
+                                        <p:cTn id="12" dur="1" fill="hold">
                                           <p:stCondLst>
                                             <p:cond delay="0"/>
                                           </p:stCondLst>
                                         </p:cTn>
                                         <p:tgtEl>
-                                          <p:spTgt spid="22"/>
-                                        </p:tgtEl>
-                                        <p:attrNameLst>
-                                          <p:attrName>style.visibility</p:attrName>
-                                        </p:attrNameLst>
-                                      </p:cBhvr>
-                                      <p:to>
-                                        <p:strVal val="hidden"/>
-                                      </p:to>
-                                    </p:set>
-                                  </p:childTnLst>
-                                </p:cTn>
-                              </p:par>
-                            </p:childTnLst>
-                          </p:cTn>
-                        </p:par>
-                      </p:childTnLst>
-                    </p:cTn>
-                  </p:par>
-                  <p:par>
-                    <p:cTn id="11" fill="hold">
-                      <p:stCondLst>
-                        <p:cond delay="indefinite"/>
-                      </p:stCondLst>
-                      <p:childTnLst>
-                        <p:par>
-                          <p:cTn id="12" fill="hold">
-                            <p:stCondLst>
-                              <p:cond delay="0"/>
-                            </p:stCondLst>
-                            <p:childTnLst>
-                              <p:par>
-                                <p:cTn id="13" presetID="10" presetClass="entr" presetSubtype="0" fill="hold" grpId="0" nodeType="clickEffect">
-                                  <p:stCondLst>
-                                    <p:cond delay="0"/>
-                                  </p:stCondLst>
-                                  <p:childTnLst>
-                                    <p:set>
-                                      <p:cBhvr>
-                                        <p:cTn id="14" dur="1" fill="hold">
-                                          <p:stCondLst>
-                                            <p:cond delay="0"/>
-                                          </p:stCondLst>
-                                        </p:cTn>
-                                        <p:tgtEl>
-                                          <p:spTgt spid="4"/>
+                                          <p:spTgt spid="4">
+                                            <p:txEl>
+                                              <p:pRg st="3" end="3"/>
+                                            </p:txEl>
+                                          </p:spTgt>
                                         </p:tgtEl>
                                         <p:attrNameLst>
                                           <p:attrName>style.visibility</p:attrName>
@@ -5322,14 +5972,6 @@
                                         <p:strVal val="visible"/>
                                       </p:to>
                                     </p:set>
-                                    <p:animEffect transition="in" filter="fade">
-                                      <p:cBhvr>
-                                        <p:cTn id="15" dur="500"/>
-                                        <p:tgtEl>
-                                          <p:spTgt spid="4"/>
-                                        </p:tgtEl>
-                                      </p:cBhvr>
-                                    </p:animEffect>
                                   </p:childTnLst>
                                 </p:cTn>
                               </p:par>
@@ -5360,11 +6002,1240 @@
         </p:cTn>
       </p:par>
     </p:tnLst>
-    <p:bldLst>
-      <p:bldP spid="19" grpId="0" animBg="1"/>
-      <p:bldP spid="22" grpId="0" animBg="1"/>
-      <p:bldP spid="4" grpId="0" animBg="1"/>
-    </p:bldLst>
+  </p:timing>
+</p:sld>
+</file>
+
+<file path=ppt/slides/slide3.xml><?xml version="1.0" encoding="utf-8"?>
+<p:sld xmlns:a="http://schemas.openxmlformats.org/drawingml/2006/main" xmlns:r="http://schemas.openxmlformats.org/officeDocument/2006/relationships" xmlns:p="http://schemas.openxmlformats.org/presentationml/2006/main">
+  <p:cSld>
+    <p:spTree>
+      <p:nvGrpSpPr>
+        <p:cNvPr id="1" name=""/>
+        <p:cNvGrpSpPr/>
+        <p:nvPr/>
+      </p:nvGrpSpPr>
+      <p:grpSpPr>
+        <a:xfrm>
+          <a:off x="0" y="0"/>
+          <a:ext cx="0" cy="0"/>
+          <a:chOff x="0" y="0"/>
+          <a:chExt cx="0" cy="0"/>
+        </a:xfrm>
+      </p:grpSpPr>
+      <p:sp>
+        <p:nvSpPr>
+          <p:cNvPr id="2" name="Title 1">
+            <a:extLst>
+              <a:ext uri="{FF2B5EF4-FFF2-40B4-BE49-F238E27FC236}">
+                <a16:creationId xmlns:a16="http://schemas.microsoft.com/office/drawing/2014/main" xmlns="" id="{B43B5ED8-7DDB-6E41-8F8B-44BE3DED3E8B}"/>
+              </a:ext>
+            </a:extLst>
+          </p:cNvPr>
+          <p:cNvSpPr>
+            <a:spLocks noGrp="1"/>
+          </p:cNvSpPr>
+          <p:nvPr>
+            <p:ph type="title"/>
+          </p:nvPr>
+        </p:nvSpPr>
+        <p:spPr/>
+        <p:txBody>
+          <a:bodyPr/>
+          <a:lstStyle/>
+          <a:p>
+            <a:r>
+              <a:rPr lang="en-US" dirty="0"/>
+              <a:t>Background</a:t>
+            </a:r>
+          </a:p>
+        </p:txBody>
+      </p:sp>
+      <p:sp>
+        <p:nvSpPr>
+          <p:cNvPr id="4" name="Content Placeholder 2">
+            <a:extLst>
+              <a:ext uri="{FF2B5EF4-FFF2-40B4-BE49-F238E27FC236}">
+                <a16:creationId xmlns:a16="http://schemas.microsoft.com/office/drawing/2014/main" xmlns="" id="{B6614BC7-F88E-854F-A078-E006F32764E1}"/>
+              </a:ext>
+            </a:extLst>
+          </p:cNvPr>
+          <p:cNvSpPr txBox="1">
+            <a:spLocks/>
+          </p:cNvSpPr>
+          <p:nvPr/>
+        </p:nvSpPr>
+        <p:spPr>
+          <a:xfrm>
+            <a:off x="268081" y="939452"/>
+            <a:ext cx="11085720" cy="5336088"/>
+          </a:xfrm>
+          <a:prstGeom prst="rect">
+            <a:avLst/>
+          </a:prstGeom>
+        </p:spPr>
+        <p:txBody>
+          <a:bodyPr>
+            <a:noAutofit/>
+          </a:bodyPr>
+          <a:lstStyle>
+            <a:lvl1pPr marL="228600" indent="-228600" algn="l" defTabSz="914400" rtl="0" eaLnBrk="1" latinLnBrk="0" hangingPunct="1">
+              <a:lnSpc>
+                <a:spcPct val="90000"/>
+              </a:lnSpc>
+              <a:spcBef>
+                <a:spcPts val="1000"/>
+              </a:spcBef>
+              <a:buFont typeface="Arial" panose="020B0604020202020204" pitchFamily="34" charset="0"/>
+              <a:buChar char="•"/>
+              <a:defRPr sz="2800" kern="1200">
+                <a:solidFill>
+                  <a:schemeClr val="tx1"/>
+                </a:solidFill>
+                <a:latin typeface="+mn-lt"/>
+                <a:ea typeface="+mn-ea"/>
+                <a:cs typeface="+mn-cs"/>
+              </a:defRPr>
+            </a:lvl1pPr>
+            <a:lvl2pPr marL="685800" indent="-228600" algn="l" defTabSz="914400" rtl="0" eaLnBrk="1" latinLnBrk="0" hangingPunct="1">
+              <a:lnSpc>
+                <a:spcPct val="90000"/>
+              </a:lnSpc>
+              <a:spcBef>
+                <a:spcPts val="500"/>
+              </a:spcBef>
+              <a:buFont typeface="Arial" panose="020B0604020202020204" pitchFamily="34" charset="0"/>
+              <a:buChar char="•"/>
+              <a:defRPr sz="2400" kern="1200">
+                <a:solidFill>
+                  <a:schemeClr val="tx1"/>
+                </a:solidFill>
+                <a:latin typeface="+mn-lt"/>
+                <a:ea typeface="+mn-ea"/>
+                <a:cs typeface="+mn-cs"/>
+              </a:defRPr>
+            </a:lvl2pPr>
+            <a:lvl3pPr marL="1143000" indent="-228600" algn="l" defTabSz="914400" rtl="0" eaLnBrk="1" latinLnBrk="0" hangingPunct="1">
+              <a:lnSpc>
+                <a:spcPct val="90000"/>
+              </a:lnSpc>
+              <a:spcBef>
+                <a:spcPts val="500"/>
+              </a:spcBef>
+              <a:buFont typeface="Arial" panose="020B0604020202020204" pitchFamily="34" charset="0"/>
+              <a:buChar char="•"/>
+              <a:defRPr sz="2000" kern="1200">
+                <a:solidFill>
+                  <a:schemeClr val="tx1"/>
+                </a:solidFill>
+                <a:latin typeface="+mn-lt"/>
+                <a:ea typeface="+mn-ea"/>
+                <a:cs typeface="+mn-cs"/>
+              </a:defRPr>
+            </a:lvl3pPr>
+            <a:lvl4pPr marL="1600200" indent="-228600" algn="l" defTabSz="914400" rtl="0" eaLnBrk="1" latinLnBrk="0" hangingPunct="1">
+              <a:lnSpc>
+                <a:spcPct val="90000"/>
+              </a:lnSpc>
+              <a:spcBef>
+                <a:spcPts val="500"/>
+              </a:spcBef>
+              <a:buFont typeface="Arial" panose="020B0604020202020204" pitchFamily="34" charset="0"/>
+              <a:buChar char="•"/>
+              <a:defRPr sz="1800" kern="1200">
+                <a:solidFill>
+                  <a:schemeClr val="tx1"/>
+                </a:solidFill>
+                <a:latin typeface="+mn-lt"/>
+                <a:ea typeface="+mn-ea"/>
+                <a:cs typeface="+mn-cs"/>
+              </a:defRPr>
+            </a:lvl4pPr>
+            <a:lvl5pPr marL="2057400" indent="-228600" algn="l" defTabSz="914400" rtl="0" eaLnBrk="1" latinLnBrk="0" hangingPunct="1">
+              <a:lnSpc>
+                <a:spcPct val="90000"/>
+              </a:lnSpc>
+              <a:spcBef>
+                <a:spcPts val="500"/>
+              </a:spcBef>
+              <a:buFont typeface="Arial" panose="020B0604020202020204" pitchFamily="34" charset="0"/>
+              <a:buChar char="•"/>
+              <a:defRPr sz="1800" kern="1200">
+                <a:solidFill>
+                  <a:schemeClr val="tx1"/>
+                </a:solidFill>
+                <a:latin typeface="+mn-lt"/>
+                <a:ea typeface="+mn-ea"/>
+                <a:cs typeface="+mn-cs"/>
+              </a:defRPr>
+            </a:lvl5pPr>
+            <a:lvl6pPr marL="2514600" indent="-228600" algn="l" defTabSz="914400" rtl="0" eaLnBrk="1" latinLnBrk="0" hangingPunct="1">
+              <a:lnSpc>
+                <a:spcPct val="90000"/>
+              </a:lnSpc>
+              <a:spcBef>
+                <a:spcPts val="500"/>
+              </a:spcBef>
+              <a:buFont typeface="Arial" panose="020B0604020202020204" pitchFamily="34" charset="0"/>
+              <a:buChar char="•"/>
+              <a:defRPr sz="1800" kern="1200">
+                <a:solidFill>
+                  <a:schemeClr val="tx1"/>
+                </a:solidFill>
+                <a:latin typeface="+mn-lt"/>
+                <a:ea typeface="+mn-ea"/>
+                <a:cs typeface="+mn-cs"/>
+              </a:defRPr>
+            </a:lvl6pPr>
+            <a:lvl7pPr marL="2971800" indent="-228600" algn="l" defTabSz="914400" rtl="0" eaLnBrk="1" latinLnBrk="0" hangingPunct="1">
+              <a:lnSpc>
+                <a:spcPct val="90000"/>
+              </a:lnSpc>
+              <a:spcBef>
+                <a:spcPts val="500"/>
+              </a:spcBef>
+              <a:buFont typeface="Arial" panose="020B0604020202020204" pitchFamily="34" charset="0"/>
+              <a:buChar char="•"/>
+              <a:defRPr sz="1800" kern="1200">
+                <a:solidFill>
+                  <a:schemeClr val="tx1"/>
+                </a:solidFill>
+                <a:latin typeface="+mn-lt"/>
+                <a:ea typeface="+mn-ea"/>
+                <a:cs typeface="+mn-cs"/>
+              </a:defRPr>
+            </a:lvl7pPr>
+            <a:lvl8pPr marL="3429000" indent="-228600" algn="l" defTabSz="914400" rtl="0" eaLnBrk="1" latinLnBrk="0" hangingPunct="1">
+              <a:lnSpc>
+                <a:spcPct val="90000"/>
+              </a:lnSpc>
+              <a:spcBef>
+                <a:spcPts val="500"/>
+              </a:spcBef>
+              <a:buFont typeface="Arial" panose="020B0604020202020204" pitchFamily="34" charset="0"/>
+              <a:buChar char="•"/>
+              <a:defRPr sz="1800" kern="1200">
+                <a:solidFill>
+                  <a:schemeClr val="tx1"/>
+                </a:solidFill>
+                <a:latin typeface="+mn-lt"/>
+                <a:ea typeface="+mn-ea"/>
+                <a:cs typeface="+mn-cs"/>
+              </a:defRPr>
+            </a:lvl8pPr>
+            <a:lvl9pPr marL="3886200" indent="-228600" algn="l" defTabSz="914400" rtl="0" eaLnBrk="1" latinLnBrk="0" hangingPunct="1">
+              <a:lnSpc>
+                <a:spcPct val="90000"/>
+              </a:lnSpc>
+              <a:spcBef>
+                <a:spcPts val="500"/>
+              </a:spcBef>
+              <a:buFont typeface="Arial" panose="020B0604020202020204" pitchFamily="34" charset="0"/>
+              <a:buChar char="•"/>
+              <a:defRPr sz="1800" kern="1200">
+                <a:solidFill>
+                  <a:schemeClr val="tx1"/>
+                </a:solidFill>
+                <a:latin typeface="+mn-lt"/>
+                <a:ea typeface="+mn-ea"/>
+                <a:cs typeface="+mn-cs"/>
+              </a:defRPr>
+            </a:lvl9pPr>
+          </a:lstStyle>
+          <a:p>
+            <a:r>
+              <a:rPr lang="en-US" sz="3200" dirty="0"/>
+              <a:t>News article recommendation system based on topic </a:t>
+            </a:r>
+            <a:r>
+              <a:rPr lang="en-US" sz="3200" dirty="0" smtClean="0"/>
+              <a:t>relevance</a:t>
+            </a:r>
+          </a:p>
+          <a:p>
+            <a:r>
+              <a:rPr lang="en-US" sz="3200" dirty="0" smtClean="0"/>
+              <a:t>Takes </a:t>
+            </a:r>
+            <a:r>
+              <a:rPr lang="en-US" sz="3200" dirty="0"/>
+              <a:t>user input query article or topic search from UI</a:t>
+            </a:r>
+          </a:p>
+          <a:p>
+            <a:r>
+              <a:rPr lang="en-US" sz="3200" dirty="0"/>
+              <a:t>Analyzes user input through topic modeling and sentiment analyzer</a:t>
+            </a:r>
+          </a:p>
+          <a:p>
+            <a:r>
+              <a:rPr lang="en-US" sz="3200" dirty="0"/>
+              <a:t>Recommends relevant articles from corpus based on user input</a:t>
+            </a:r>
+          </a:p>
+          <a:p>
+            <a:r>
+              <a:rPr lang="en-US" sz="3200" dirty="0"/>
+              <a:t>Visualizes user input through word cloud to summarize article</a:t>
+            </a:r>
+          </a:p>
+          <a:p>
+            <a:r>
+              <a:rPr lang="en-US" sz="3200" dirty="0"/>
+              <a:t>Lists topic modeling result for user input article</a:t>
+            </a:r>
+          </a:p>
+          <a:p>
+            <a:r>
+              <a:rPr lang="en-US" sz="3200" dirty="0"/>
+              <a:t>Presents sentiment analysis based on number of positive/negative/neutral sentences in input</a:t>
+            </a:r>
+          </a:p>
+          <a:p>
+            <a:endParaRPr lang="en-US" sz="3200" dirty="0"/>
+          </a:p>
+          <a:p>
+            <a:endParaRPr lang="en-US" sz="3200" dirty="0"/>
+          </a:p>
+        </p:txBody>
+      </p:sp>
+    </p:spTree>
+    <p:extLst>
+      <p:ext uri="{BB962C8B-B14F-4D97-AF65-F5344CB8AC3E}">
+        <p14:creationId xmlns:p14="http://schemas.microsoft.com/office/powerpoint/2010/main" val="1069115304"/>
+      </p:ext>
+    </p:extLst>
+  </p:cSld>
+  <p:clrMapOvr>
+    <a:masterClrMapping/>
+  </p:clrMapOvr>
+  <p:transition xmlns:p14="http://schemas.microsoft.com/office/powerpoint/2010/main">
+    <p:fade/>
+  </p:transition>
+  <p:timing>
+    <p:tnLst>
+      <p:par>
+        <p:cTn xmlns:p14="http://schemas.microsoft.com/office/powerpoint/2010/main" id="1" dur="indefinite" restart="never" nodeType="tmRoot"/>
+      </p:par>
+    </p:tnLst>
+  </p:timing>
+</p:sld>
+</file>
+
+<file path=ppt/slides/slide4.xml><?xml version="1.0" encoding="utf-8"?>
+<p:sld xmlns:a="http://schemas.openxmlformats.org/drawingml/2006/main" xmlns:r="http://schemas.openxmlformats.org/officeDocument/2006/relationships" xmlns:p="http://schemas.openxmlformats.org/presentationml/2006/main">
+  <p:cSld>
+    <p:spTree>
+      <p:nvGrpSpPr>
+        <p:cNvPr id="1" name=""/>
+        <p:cNvGrpSpPr/>
+        <p:nvPr/>
+      </p:nvGrpSpPr>
+      <p:grpSpPr>
+        <a:xfrm>
+          <a:off x="0" y="0"/>
+          <a:ext cx="0" cy="0"/>
+          <a:chOff x="0" y="0"/>
+          <a:chExt cx="0" cy="0"/>
+        </a:xfrm>
+      </p:grpSpPr>
+      <p:sp>
+        <p:nvSpPr>
+          <p:cNvPr id="2" name="Title 1">
+            <a:extLst>
+              <a:ext uri="{FF2B5EF4-FFF2-40B4-BE49-F238E27FC236}">
+                <a16:creationId xmlns:a16="http://schemas.microsoft.com/office/drawing/2014/main" xmlns="" id="{2EF134A1-43EF-4349-A2AD-27D89395C626}"/>
+              </a:ext>
+            </a:extLst>
+          </p:cNvPr>
+          <p:cNvSpPr>
+            <a:spLocks noGrp="1"/>
+          </p:cNvSpPr>
+          <p:nvPr>
+            <p:ph type="title"/>
+          </p:nvPr>
+        </p:nvSpPr>
+        <p:spPr/>
+        <p:txBody>
+          <a:bodyPr/>
+          <a:lstStyle/>
+          <a:p>
+            <a:r>
+              <a:rPr lang="en-US" dirty="0"/>
+              <a:t>Target Users</a:t>
+            </a:r>
+          </a:p>
+        </p:txBody>
+      </p:sp>
+      <p:sp>
+        <p:nvSpPr>
+          <p:cNvPr id="3" name="Content Placeholder 2">
+            <a:extLst>
+              <a:ext uri="{FF2B5EF4-FFF2-40B4-BE49-F238E27FC236}">
+                <a16:creationId xmlns:a16="http://schemas.microsoft.com/office/drawing/2014/main" xmlns="" id="{B6614BC7-F88E-854F-A078-E006F32764E1}"/>
+              </a:ext>
+            </a:extLst>
+          </p:cNvPr>
+          <p:cNvSpPr txBox="1">
+            <a:spLocks/>
+          </p:cNvSpPr>
+          <p:nvPr/>
+        </p:nvSpPr>
+        <p:spPr>
+          <a:xfrm>
+            <a:off x="268081" y="939452"/>
+            <a:ext cx="11085720" cy="5336088"/>
+          </a:xfrm>
+          <a:prstGeom prst="rect">
+            <a:avLst/>
+          </a:prstGeom>
+        </p:spPr>
+        <p:txBody>
+          <a:bodyPr>
+            <a:noAutofit/>
+          </a:bodyPr>
+          <a:lstStyle>
+            <a:lvl1pPr marL="228600" indent="-228600" algn="l" defTabSz="914400" rtl="0" eaLnBrk="1" latinLnBrk="0" hangingPunct="1">
+              <a:lnSpc>
+                <a:spcPct val="90000"/>
+              </a:lnSpc>
+              <a:spcBef>
+                <a:spcPts val="1000"/>
+              </a:spcBef>
+              <a:buFont typeface="Arial" panose="020B0604020202020204" pitchFamily="34" charset="0"/>
+              <a:buChar char="•"/>
+              <a:defRPr sz="2800" kern="1200">
+                <a:solidFill>
+                  <a:schemeClr val="tx1"/>
+                </a:solidFill>
+                <a:latin typeface="+mn-lt"/>
+                <a:ea typeface="+mn-ea"/>
+                <a:cs typeface="+mn-cs"/>
+              </a:defRPr>
+            </a:lvl1pPr>
+            <a:lvl2pPr marL="685800" indent="-228600" algn="l" defTabSz="914400" rtl="0" eaLnBrk="1" latinLnBrk="0" hangingPunct="1">
+              <a:lnSpc>
+                <a:spcPct val="90000"/>
+              </a:lnSpc>
+              <a:spcBef>
+                <a:spcPts val="500"/>
+              </a:spcBef>
+              <a:buFont typeface="Arial" panose="020B0604020202020204" pitchFamily="34" charset="0"/>
+              <a:buChar char="•"/>
+              <a:defRPr sz="2400" kern="1200">
+                <a:solidFill>
+                  <a:schemeClr val="tx1"/>
+                </a:solidFill>
+                <a:latin typeface="+mn-lt"/>
+                <a:ea typeface="+mn-ea"/>
+                <a:cs typeface="+mn-cs"/>
+              </a:defRPr>
+            </a:lvl2pPr>
+            <a:lvl3pPr marL="1143000" indent="-228600" algn="l" defTabSz="914400" rtl="0" eaLnBrk="1" latinLnBrk="0" hangingPunct="1">
+              <a:lnSpc>
+                <a:spcPct val="90000"/>
+              </a:lnSpc>
+              <a:spcBef>
+                <a:spcPts val="500"/>
+              </a:spcBef>
+              <a:buFont typeface="Arial" panose="020B0604020202020204" pitchFamily="34" charset="0"/>
+              <a:buChar char="•"/>
+              <a:defRPr sz="2000" kern="1200">
+                <a:solidFill>
+                  <a:schemeClr val="tx1"/>
+                </a:solidFill>
+                <a:latin typeface="+mn-lt"/>
+                <a:ea typeface="+mn-ea"/>
+                <a:cs typeface="+mn-cs"/>
+              </a:defRPr>
+            </a:lvl3pPr>
+            <a:lvl4pPr marL="1600200" indent="-228600" algn="l" defTabSz="914400" rtl="0" eaLnBrk="1" latinLnBrk="0" hangingPunct="1">
+              <a:lnSpc>
+                <a:spcPct val="90000"/>
+              </a:lnSpc>
+              <a:spcBef>
+                <a:spcPts val="500"/>
+              </a:spcBef>
+              <a:buFont typeface="Arial" panose="020B0604020202020204" pitchFamily="34" charset="0"/>
+              <a:buChar char="•"/>
+              <a:defRPr sz="1800" kern="1200">
+                <a:solidFill>
+                  <a:schemeClr val="tx1"/>
+                </a:solidFill>
+                <a:latin typeface="+mn-lt"/>
+                <a:ea typeface="+mn-ea"/>
+                <a:cs typeface="+mn-cs"/>
+              </a:defRPr>
+            </a:lvl4pPr>
+            <a:lvl5pPr marL="2057400" indent="-228600" algn="l" defTabSz="914400" rtl="0" eaLnBrk="1" latinLnBrk="0" hangingPunct="1">
+              <a:lnSpc>
+                <a:spcPct val="90000"/>
+              </a:lnSpc>
+              <a:spcBef>
+                <a:spcPts val="500"/>
+              </a:spcBef>
+              <a:buFont typeface="Arial" panose="020B0604020202020204" pitchFamily="34" charset="0"/>
+              <a:buChar char="•"/>
+              <a:defRPr sz="1800" kern="1200">
+                <a:solidFill>
+                  <a:schemeClr val="tx1"/>
+                </a:solidFill>
+                <a:latin typeface="+mn-lt"/>
+                <a:ea typeface="+mn-ea"/>
+                <a:cs typeface="+mn-cs"/>
+              </a:defRPr>
+            </a:lvl5pPr>
+            <a:lvl6pPr marL="2514600" indent="-228600" algn="l" defTabSz="914400" rtl="0" eaLnBrk="1" latinLnBrk="0" hangingPunct="1">
+              <a:lnSpc>
+                <a:spcPct val="90000"/>
+              </a:lnSpc>
+              <a:spcBef>
+                <a:spcPts val="500"/>
+              </a:spcBef>
+              <a:buFont typeface="Arial" panose="020B0604020202020204" pitchFamily="34" charset="0"/>
+              <a:buChar char="•"/>
+              <a:defRPr sz="1800" kern="1200">
+                <a:solidFill>
+                  <a:schemeClr val="tx1"/>
+                </a:solidFill>
+                <a:latin typeface="+mn-lt"/>
+                <a:ea typeface="+mn-ea"/>
+                <a:cs typeface="+mn-cs"/>
+              </a:defRPr>
+            </a:lvl6pPr>
+            <a:lvl7pPr marL="2971800" indent="-228600" algn="l" defTabSz="914400" rtl="0" eaLnBrk="1" latinLnBrk="0" hangingPunct="1">
+              <a:lnSpc>
+                <a:spcPct val="90000"/>
+              </a:lnSpc>
+              <a:spcBef>
+                <a:spcPts val="500"/>
+              </a:spcBef>
+              <a:buFont typeface="Arial" panose="020B0604020202020204" pitchFamily="34" charset="0"/>
+              <a:buChar char="•"/>
+              <a:defRPr sz="1800" kern="1200">
+                <a:solidFill>
+                  <a:schemeClr val="tx1"/>
+                </a:solidFill>
+                <a:latin typeface="+mn-lt"/>
+                <a:ea typeface="+mn-ea"/>
+                <a:cs typeface="+mn-cs"/>
+              </a:defRPr>
+            </a:lvl7pPr>
+            <a:lvl8pPr marL="3429000" indent="-228600" algn="l" defTabSz="914400" rtl="0" eaLnBrk="1" latinLnBrk="0" hangingPunct="1">
+              <a:lnSpc>
+                <a:spcPct val="90000"/>
+              </a:lnSpc>
+              <a:spcBef>
+                <a:spcPts val="500"/>
+              </a:spcBef>
+              <a:buFont typeface="Arial" panose="020B0604020202020204" pitchFamily="34" charset="0"/>
+              <a:buChar char="•"/>
+              <a:defRPr sz="1800" kern="1200">
+                <a:solidFill>
+                  <a:schemeClr val="tx1"/>
+                </a:solidFill>
+                <a:latin typeface="+mn-lt"/>
+                <a:ea typeface="+mn-ea"/>
+                <a:cs typeface="+mn-cs"/>
+              </a:defRPr>
+            </a:lvl8pPr>
+            <a:lvl9pPr marL="3886200" indent="-228600" algn="l" defTabSz="914400" rtl="0" eaLnBrk="1" latinLnBrk="0" hangingPunct="1">
+              <a:lnSpc>
+                <a:spcPct val="90000"/>
+              </a:lnSpc>
+              <a:spcBef>
+                <a:spcPts val="500"/>
+              </a:spcBef>
+              <a:buFont typeface="Arial" panose="020B0604020202020204" pitchFamily="34" charset="0"/>
+              <a:buChar char="•"/>
+              <a:defRPr sz="1800" kern="1200">
+                <a:solidFill>
+                  <a:schemeClr val="tx1"/>
+                </a:solidFill>
+                <a:latin typeface="+mn-lt"/>
+                <a:ea typeface="+mn-ea"/>
+                <a:cs typeface="+mn-cs"/>
+              </a:defRPr>
+            </a:lvl9pPr>
+          </a:lstStyle>
+          <a:p>
+            <a:r>
+              <a:rPr lang="en-US" sz="3200" dirty="0" smtClean="0"/>
+              <a:t>Researchers</a:t>
+            </a:r>
+          </a:p>
+          <a:p>
+            <a:pPr lvl="1"/>
+            <a:r>
+              <a:rPr lang="en-US" dirty="0" smtClean="0"/>
+              <a:t>Academics looking for specific news articles for their research</a:t>
+            </a:r>
+            <a:endParaRPr lang="en-US" dirty="0" smtClean="0"/>
+          </a:p>
+          <a:p>
+            <a:r>
+              <a:rPr lang="en-US" sz="3200" dirty="0" smtClean="0"/>
+              <a:t>General Public</a:t>
+            </a:r>
+          </a:p>
+          <a:p>
+            <a:pPr lvl="1"/>
+            <a:r>
+              <a:rPr lang="en-US" dirty="0" smtClean="0"/>
+              <a:t>News enthusiasts looking for similar articles</a:t>
+            </a:r>
+            <a:endParaRPr lang="en-US" dirty="0" smtClean="0"/>
+          </a:p>
+          <a:p>
+            <a:pPr lvl="1"/>
+            <a:r>
+              <a:rPr lang="en-US" dirty="0" smtClean="0"/>
+              <a:t>Users who want sentiment and topic information on an article</a:t>
+            </a:r>
+          </a:p>
+          <a:p>
+            <a:endParaRPr lang="en-US" sz="3200" dirty="0"/>
+          </a:p>
+          <a:p>
+            <a:endParaRPr lang="en-US" sz="3200" dirty="0"/>
+          </a:p>
+          <a:p>
+            <a:endParaRPr lang="en-US" sz="3200" dirty="0"/>
+          </a:p>
+        </p:txBody>
+      </p:sp>
+    </p:spTree>
+    <p:extLst>
+      <p:ext uri="{BB962C8B-B14F-4D97-AF65-F5344CB8AC3E}">
+        <p14:creationId xmlns:p14="http://schemas.microsoft.com/office/powerpoint/2010/main" val="888694540"/>
+      </p:ext>
+    </p:extLst>
+  </p:cSld>
+  <p:clrMapOvr>
+    <a:masterClrMapping/>
+  </p:clrMapOvr>
+  <p:transition xmlns:p14="http://schemas.microsoft.com/office/powerpoint/2010/main">
+    <p:fade/>
+  </p:transition>
+  <p:timing>
+    <p:tnLst>
+      <p:par>
+        <p:cTn xmlns:p14="http://schemas.microsoft.com/office/powerpoint/2010/main" id="1" dur="indefinite" restart="never" nodeType="tmRoot"/>
+      </p:par>
+    </p:tnLst>
+  </p:timing>
+</p:sld>
+</file>
+
+<file path=ppt/slides/slide5.xml><?xml version="1.0" encoding="utf-8"?>
+<p:sld xmlns:a="http://schemas.openxmlformats.org/drawingml/2006/main" xmlns:r="http://schemas.openxmlformats.org/officeDocument/2006/relationships" xmlns:p="http://schemas.openxmlformats.org/presentationml/2006/main">
+  <p:cSld>
+    <p:spTree>
+      <p:nvGrpSpPr>
+        <p:cNvPr id="1" name=""/>
+        <p:cNvGrpSpPr/>
+        <p:nvPr/>
+      </p:nvGrpSpPr>
+      <p:grpSpPr>
+        <a:xfrm>
+          <a:off x="0" y="0"/>
+          <a:ext cx="0" cy="0"/>
+          <a:chOff x="0" y="0"/>
+          <a:chExt cx="0" cy="0"/>
+        </a:xfrm>
+      </p:grpSpPr>
+      <p:sp>
+        <p:nvSpPr>
+          <p:cNvPr id="2" name="Title 1">
+            <a:extLst>
+              <a:ext uri="{FF2B5EF4-FFF2-40B4-BE49-F238E27FC236}">
+                <a16:creationId xmlns:a16="http://schemas.microsoft.com/office/drawing/2014/main" xmlns="" id="{3E0EAB73-EC4F-414F-AB38-0915E0C1F16A}"/>
+              </a:ext>
+            </a:extLst>
+          </p:cNvPr>
+          <p:cNvSpPr>
+            <a:spLocks noGrp="1"/>
+          </p:cNvSpPr>
+          <p:nvPr>
+            <p:ph type="title"/>
+          </p:nvPr>
+        </p:nvSpPr>
+        <p:spPr/>
+        <p:txBody>
+          <a:bodyPr/>
+          <a:lstStyle/>
+          <a:p>
+            <a:r>
+              <a:rPr lang="en-US" dirty="0"/>
+              <a:t>Data Sources</a:t>
+            </a:r>
+          </a:p>
+        </p:txBody>
+      </p:sp>
+      <p:sp>
+        <p:nvSpPr>
+          <p:cNvPr id="3" name="Content Placeholder 2">
+            <a:extLst>
+              <a:ext uri="{FF2B5EF4-FFF2-40B4-BE49-F238E27FC236}">
+                <a16:creationId xmlns:a16="http://schemas.microsoft.com/office/drawing/2014/main" xmlns="" id="{50A8077D-01DD-6246-B6D0-2E7DE592A67B}"/>
+              </a:ext>
+            </a:extLst>
+          </p:cNvPr>
+          <p:cNvSpPr txBox="1">
+            <a:spLocks/>
+          </p:cNvSpPr>
+          <p:nvPr/>
+        </p:nvSpPr>
+        <p:spPr>
+          <a:xfrm>
+            <a:off x="268080" y="1011433"/>
+            <a:ext cx="10515600" cy="4351338"/>
+          </a:xfrm>
+          <a:prstGeom prst="rect">
+            <a:avLst/>
+          </a:prstGeom>
+        </p:spPr>
+        <p:txBody>
+          <a:bodyPr/>
+          <a:lstStyle>
+            <a:lvl1pPr marL="228600" indent="-228600" algn="l" defTabSz="914400" rtl="0" eaLnBrk="1" latinLnBrk="0" hangingPunct="1">
+              <a:lnSpc>
+                <a:spcPct val="90000"/>
+              </a:lnSpc>
+              <a:spcBef>
+                <a:spcPts val="1000"/>
+              </a:spcBef>
+              <a:buFont typeface="Arial" panose="020B0604020202020204" pitchFamily="34" charset="0"/>
+              <a:buChar char="•"/>
+              <a:defRPr sz="2800" kern="1200">
+                <a:solidFill>
+                  <a:schemeClr val="tx1"/>
+                </a:solidFill>
+                <a:latin typeface="+mn-lt"/>
+                <a:ea typeface="+mn-ea"/>
+                <a:cs typeface="+mn-cs"/>
+              </a:defRPr>
+            </a:lvl1pPr>
+            <a:lvl2pPr marL="685800" indent="-228600" algn="l" defTabSz="914400" rtl="0" eaLnBrk="1" latinLnBrk="0" hangingPunct="1">
+              <a:lnSpc>
+                <a:spcPct val="90000"/>
+              </a:lnSpc>
+              <a:spcBef>
+                <a:spcPts val="500"/>
+              </a:spcBef>
+              <a:buFont typeface="Arial" panose="020B0604020202020204" pitchFamily="34" charset="0"/>
+              <a:buChar char="•"/>
+              <a:defRPr sz="2400" kern="1200">
+                <a:solidFill>
+                  <a:schemeClr val="tx1"/>
+                </a:solidFill>
+                <a:latin typeface="+mn-lt"/>
+                <a:ea typeface="+mn-ea"/>
+                <a:cs typeface="+mn-cs"/>
+              </a:defRPr>
+            </a:lvl2pPr>
+            <a:lvl3pPr marL="1143000" indent="-228600" algn="l" defTabSz="914400" rtl="0" eaLnBrk="1" latinLnBrk="0" hangingPunct="1">
+              <a:lnSpc>
+                <a:spcPct val="90000"/>
+              </a:lnSpc>
+              <a:spcBef>
+                <a:spcPts val="500"/>
+              </a:spcBef>
+              <a:buFont typeface="Arial" panose="020B0604020202020204" pitchFamily="34" charset="0"/>
+              <a:buChar char="•"/>
+              <a:defRPr sz="2000" kern="1200">
+                <a:solidFill>
+                  <a:schemeClr val="tx1"/>
+                </a:solidFill>
+                <a:latin typeface="+mn-lt"/>
+                <a:ea typeface="+mn-ea"/>
+                <a:cs typeface="+mn-cs"/>
+              </a:defRPr>
+            </a:lvl3pPr>
+            <a:lvl4pPr marL="1600200" indent="-228600" algn="l" defTabSz="914400" rtl="0" eaLnBrk="1" latinLnBrk="0" hangingPunct="1">
+              <a:lnSpc>
+                <a:spcPct val="90000"/>
+              </a:lnSpc>
+              <a:spcBef>
+                <a:spcPts val="500"/>
+              </a:spcBef>
+              <a:buFont typeface="Arial" panose="020B0604020202020204" pitchFamily="34" charset="0"/>
+              <a:buChar char="•"/>
+              <a:defRPr sz="1800" kern="1200">
+                <a:solidFill>
+                  <a:schemeClr val="tx1"/>
+                </a:solidFill>
+                <a:latin typeface="+mn-lt"/>
+                <a:ea typeface="+mn-ea"/>
+                <a:cs typeface="+mn-cs"/>
+              </a:defRPr>
+            </a:lvl4pPr>
+            <a:lvl5pPr marL="2057400" indent="-228600" algn="l" defTabSz="914400" rtl="0" eaLnBrk="1" latinLnBrk="0" hangingPunct="1">
+              <a:lnSpc>
+                <a:spcPct val="90000"/>
+              </a:lnSpc>
+              <a:spcBef>
+                <a:spcPts val="500"/>
+              </a:spcBef>
+              <a:buFont typeface="Arial" panose="020B0604020202020204" pitchFamily="34" charset="0"/>
+              <a:buChar char="•"/>
+              <a:defRPr sz="1800" kern="1200">
+                <a:solidFill>
+                  <a:schemeClr val="tx1"/>
+                </a:solidFill>
+                <a:latin typeface="+mn-lt"/>
+                <a:ea typeface="+mn-ea"/>
+                <a:cs typeface="+mn-cs"/>
+              </a:defRPr>
+            </a:lvl5pPr>
+            <a:lvl6pPr marL="2514600" indent="-228600" algn="l" defTabSz="914400" rtl="0" eaLnBrk="1" latinLnBrk="0" hangingPunct="1">
+              <a:lnSpc>
+                <a:spcPct val="90000"/>
+              </a:lnSpc>
+              <a:spcBef>
+                <a:spcPts val="500"/>
+              </a:spcBef>
+              <a:buFont typeface="Arial" panose="020B0604020202020204" pitchFamily="34" charset="0"/>
+              <a:buChar char="•"/>
+              <a:defRPr sz="1800" kern="1200">
+                <a:solidFill>
+                  <a:schemeClr val="tx1"/>
+                </a:solidFill>
+                <a:latin typeface="+mn-lt"/>
+                <a:ea typeface="+mn-ea"/>
+                <a:cs typeface="+mn-cs"/>
+              </a:defRPr>
+            </a:lvl6pPr>
+            <a:lvl7pPr marL="2971800" indent="-228600" algn="l" defTabSz="914400" rtl="0" eaLnBrk="1" latinLnBrk="0" hangingPunct="1">
+              <a:lnSpc>
+                <a:spcPct val="90000"/>
+              </a:lnSpc>
+              <a:spcBef>
+                <a:spcPts val="500"/>
+              </a:spcBef>
+              <a:buFont typeface="Arial" panose="020B0604020202020204" pitchFamily="34" charset="0"/>
+              <a:buChar char="•"/>
+              <a:defRPr sz="1800" kern="1200">
+                <a:solidFill>
+                  <a:schemeClr val="tx1"/>
+                </a:solidFill>
+                <a:latin typeface="+mn-lt"/>
+                <a:ea typeface="+mn-ea"/>
+                <a:cs typeface="+mn-cs"/>
+              </a:defRPr>
+            </a:lvl7pPr>
+            <a:lvl8pPr marL="3429000" indent="-228600" algn="l" defTabSz="914400" rtl="0" eaLnBrk="1" latinLnBrk="0" hangingPunct="1">
+              <a:lnSpc>
+                <a:spcPct val="90000"/>
+              </a:lnSpc>
+              <a:spcBef>
+                <a:spcPts val="500"/>
+              </a:spcBef>
+              <a:buFont typeface="Arial" panose="020B0604020202020204" pitchFamily="34" charset="0"/>
+              <a:buChar char="•"/>
+              <a:defRPr sz="1800" kern="1200">
+                <a:solidFill>
+                  <a:schemeClr val="tx1"/>
+                </a:solidFill>
+                <a:latin typeface="+mn-lt"/>
+                <a:ea typeface="+mn-ea"/>
+                <a:cs typeface="+mn-cs"/>
+              </a:defRPr>
+            </a:lvl8pPr>
+            <a:lvl9pPr marL="3886200" indent="-228600" algn="l" defTabSz="914400" rtl="0" eaLnBrk="1" latinLnBrk="0" hangingPunct="1">
+              <a:lnSpc>
+                <a:spcPct val="90000"/>
+              </a:lnSpc>
+              <a:spcBef>
+                <a:spcPts val="500"/>
+              </a:spcBef>
+              <a:buFont typeface="Arial" panose="020B0604020202020204" pitchFamily="34" charset="0"/>
+              <a:buChar char="•"/>
+              <a:defRPr sz="1800" kern="1200">
+                <a:solidFill>
+                  <a:schemeClr val="tx1"/>
+                </a:solidFill>
+                <a:latin typeface="+mn-lt"/>
+                <a:ea typeface="+mn-ea"/>
+                <a:cs typeface="+mn-cs"/>
+              </a:defRPr>
+            </a:lvl9pPr>
+          </a:lstStyle>
+          <a:p>
+            <a:r>
+              <a:rPr lang="en-US" dirty="0" err="1"/>
+              <a:t>Kaggle</a:t>
+            </a:r>
+            <a:r>
+              <a:rPr lang="en-US" dirty="0"/>
+              <a:t> news articles </a:t>
+            </a:r>
+            <a:r>
+              <a:rPr lang="en-US" dirty="0" smtClean="0"/>
+              <a:t>dataset (all-the-news dataset)</a:t>
+            </a:r>
+          </a:p>
+          <a:p>
+            <a:pPr lvl="1"/>
+            <a:r>
+              <a:rPr lang="en-US" dirty="0" smtClean="0"/>
+              <a:t>Our news articles corpus</a:t>
+            </a:r>
+            <a:endParaRPr lang="en-US" dirty="0"/>
+          </a:p>
+          <a:p>
+            <a:pPr lvl="1"/>
+            <a:r>
+              <a:rPr lang="en-US" dirty="0"/>
+              <a:t>140,000 articles including article title, author, publisher, content and date</a:t>
+            </a:r>
+          </a:p>
+          <a:p>
+            <a:pPr lvl="1"/>
+            <a:r>
+              <a:rPr lang="en-US" dirty="0"/>
+              <a:t>Articles from 2015 to 2017 from 15 major US publishers</a:t>
+            </a:r>
+          </a:p>
+          <a:p>
+            <a:endParaRPr lang="en-US" dirty="0"/>
+          </a:p>
+          <a:p>
+            <a:r>
+              <a:rPr lang="en-US" dirty="0" smtClean="0"/>
+              <a:t>NY Times </a:t>
+            </a:r>
+            <a:r>
+              <a:rPr lang="en-US" dirty="0"/>
+              <a:t>topic </a:t>
+            </a:r>
+            <a:r>
+              <a:rPr lang="en-US" dirty="0" smtClean="0"/>
+              <a:t>category labels and seed words </a:t>
+            </a:r>
+          </a:p>
+          <a:p>
+            <a:pPr lvl="1"/>
+            <a:r>
+              <a:rPr lang="en-US" dirty="0" smtClean="0"/>
+              <a:t>News article topics from NY Times</a:t>
+            </a:r>
+          </a:p>
+          <a:p>
+            <a:pPr lvl="1"/>
+            <a:r>
+              <a:rPr lang="en-US" dirty="0" smtClean="0"/>
+              <a:t>Passed </a:t>
+            </a:r>
+            <a:r>
+              <a:rPr lang="en-US" dirty="0"/>
+              <a:t>through guided LDA model to produce interpretable topics 		</a:t>
+            </a:r>
+          </a:p>
+          <a:p>
+            <a:pPr lvl="1"/>
+            <a:endParaRPr lang="en-US" dirty="0"/>
+          </a:p>
+        </p:txBody>
+      </p:sp>
+    </p:spTree>
+    <p:extLst>
+      <p:ext uri="{BB962C8B-B14F-4D97-AF65-F5344CB8AC3E}">
+        <p14:creationId xmlns:p14="http://schemas.microsoft.com/office/powerpoint/2010/main" val="1081099500"/>
+      </p:ext>
+    </p:extLst>
+  </p:cSld>
+  <p:clrMapOvr>
+    <a:masterClrMapping/>
+  </p:clrMapOvr>
+  <p:transition xmlns:p14="http://schemas.microsoft.com/office/powerpoint/2010/main">
+    <p:fade/>
+  </p:transition>
+  <p:timing>
+    <p:tnLst>
+      <p:par>
+        <p:cTn xmlns:p14="http://schemas.microsoft.com/office/powerpoint/2010/main" id="1" dur="indefinite" restart="never" nodeType="tmRoot"/>
+      </p:par>
+    </p:tnLst>
+  </p:timing>
+</p:sld>
+</file>
+
+<file path=ppt/slides/slide6.xml><?xml version="1.0" encoding="utf-8"?>
+<p:sld xmlns:a="http://schemas.openxmlformats.org/drawingml/2006/main" xmlns:r="http://schemas.openxmlformats.org/officeDocument/2006/relationships" xmlns:p="http://schemas.openxmlformats.org/presentationml/2006/main">
+  <p:cSld>
+    <p:spTree>
+      <p:nvGrpSpPr>
+        <p:cNvPr id="1" name=""/>
+        <p:cNvGrpSpPr/>
+        <p:nvPr/>
+      </p:nvGrpSpPr>
+      <p:grpSpPr>
+        <a:xfrm>
+          <a:off x="0" y="0"/>
+          <a:ext cx="0" cy="0"/>
+          <a:chOff x="0" y="0"/>
+          <a:chExt cx="0" cy="0"/>
+        </a:xfrm>
+      </p:grpSpPr>
+      <p:sp>
+        <p:nvSpPr>
+          <p:cNvPr id="2" name="Title 1">
+            <a:extLst>
+              <a:ext uri="{FF2B5EF4-FFF2-40B4-BE49-F238E27FC236}">
+                <a16:creationId xmlns:a16="http://schemas.microsoft.com/office/drawing/2014/main" xmlns="" id="{2EF134A1-43EF-4349-A2AD-27D89395C626}"/>
+              </a:ext>
+            </a:extLst>
+          </p:cNvPr>
+          <p:cNvSpPr>
+            <a:spLocks noGrp="1"/>
+          </p:cNvSpPr>
+          <p:nvPr>
+            <p:ph type="title"/>
+          </p:nvPr>
+        </p:nvSpPr>
+        <p:spPr/>
+        <p:txBody>
+          <a:bodyPr/>
+          <a:lstStyle/>
+          <a:p>
+            <a:r>
+              <a:rPr lang="en-US" dirty="0" smtClean="0"/>
+              <a:t>User Interface (Paul)</a:t>
+            </a:r>
+            <a:endParaRPr lang="en-US" dirty="0"/>
+          </a:p>
+        </p:txBody>
+      </p:sp>
+      <p:sp>
+        <p:nvSpPr>
+          <p:cNvPr id="3" name="Content Placeholder 2">
+            <a:extLst>
+              <a:ext uri="{FF2B5EF4-FFF2-40B4-BE49-F238E27FC236}">
+                <a16:creationId xmlns:a16="http://schemas.microsoft.com/office/drawing/2014/main" xmlns="" id="{B6614BC7-F88E-854F-A078-E006F32764E1}"/>
+              </a:ext>
+            </a:extLst>
+          </p:cNvPr>
+          <p:cNvSpPr txBox="1">
+            <a:spLocks/>
+          </p:cNvSpPr>
+          <p:nvPr/>
+        </p:nvSpPr>
+        <p:spPr>
+          <a:xfrm>
+            <a:off x="268081" y="939452"/>
+            <a:ext cx="11085720" cy="5336088"/>
+          </a:xfrm>
+          <a:prstGeom prst="rect">
+            <a:avLst/>
+          </a:prstGeom>
+        </p:spPr>
+        <p:txBody>
+          <a:bodyPr>
+            <a:noAutofit/>
+          </a:bodyPr>
+          <a:lstStyle>
+            <a:lvl1pPr marL="228600" indent="-228600" algn="l" defTabSz="914400" rtl="0" eaLnBrk="1" latinLnBrk="0" hangingPunct="1">
+              <a:lnSpc>
+                <a:spcPct val="90000"/>
+              </a:lnSpc>
+              <a:spcBef>
+                <a:spcPts val="1000"/>
+              </a:spcBef>
+              <a:buFont typeface="Arial" panose="020B0604020202020204" pitchFamily="34" charset="0"/>
+              <a:buChar char="•"/>
+              <a:defRPr sz="2800" kern="1200">
+                <a:solidFill>
+                  <a:schemeClr val="tx1"/>
+                </a:solidFill>
+                <a:latin typeface="+mn-lt"/>
+                <a:ea typeface="+mn-ea"/>
+                <a:cs typeface="+mn-cs"/>
+              </a:defRPr>
+            </a:lvl1pPr>
+            <a:lvl2pPr marL="685800" indent="-228600" algn="l" defTabSz="914400" rtl="0" eaLnBrk="1" latinLnBrk="0" hangingPunct="1">
+              <a:lnSpc>
+                <a:spcPct val="90000"/>
+              </a:lnSpc>
+              <a:spcBef>
+                <a:spcPts val="500"/>
+              </a:spcBef>
+              <a:buFont typeface="Arial" panose="020B0604020202020204" pitchFamily="34" charset="0"/>
+              <a:buChar char="•"/>
+              <a:defRPr sz="2400" kern="1200">
+                <a:solidFill>
+                  <a:schemeClr val="tx1"/>
+                </a:solidFill>
+                <a:latin typeface="+mn-lt"/>
+                <a:ea typeface="+mn-ea"/>
+                <a:cs typeface="+mn-cs"/>
+              </a:defRPr>
+            </a:lvl2pPr>
+            <a:lvl3pPr marL="1143000" indent="-228600" algn="l" defTabSz="914400" rtl="0" eaLnBrk="1" latinLnBrk="0" hangingPunct="1">
+              <a:lnSpc>
+                <a:spcPct val="90000"/>
+              </a:lnSpc>
+              <a:spcBef>
+                <a:spcPts val="500"/>
+              </a:spcBef>
+              <a:buFont typeface="Arial" panose="020B0604020202020204" pitchFamily="34" charset="0"/>
+              <a:buChar char="•"/>
+              <a:defRPr sz="2000" kern="1200">
+                <a:solidFill>
+                  <a:schemeClr val="tx1"/>
+                </a:solidFill>
+                <a:latin typeface="+mn-lt"/>
+                <a:ea typeface="+mn-ea"/>
+                <a:cs typeface="+mn-cs"/>
+              </a:defRPr>
+            </a:lvl3pPr>
+            <a:lvl4pPr marL="1600200" indent="-228600" algn="l" defTabSz="914400" rtl="0" eaLnBrk="1" latinLnBrk="0" hangingPunct="1">
+              <a:lnSpc>
+                <a:spcPct val="90000"/>
+              </a:lnSpc>
+              <a:spcBef>
+                <a:spcPts val="500"/>
+              </a:spcBef>
+              <a:buFont typeface="Arial" panose="020B0604020202020204" pitchFamily="34" charset="0"/>
+              <a:buChar char="•"/>
+              <a:defRPr sz="1800" kern="1200">
+                <a:solidFill>
+                  <a:schemeClr val="tx1"/>
+                </a:solidFill>
+                <a:latin typeface="+mn-lt"/>
+                <a:ea typeface="+mn-ea"/>
+                <a:cs typeface="+mn-cs"/>
+              </a:defRPr>
+            </a:lvl4pPr>
+            <a:lvl5pPr marL="2057400" indent="-228600" algn="l" defTabSz="914400" rtl="0" eaLnBrk="1" latinLnBrk="0" hangingPunct="1">
+              <a:lnSpc>
+                <a:spcPct val="90000"/>
+              </a:lnSpc>
+              <a:spcBef>
+                <a:spcPts val="500"/>
+              </a:spcBef>
+              <a:buFont typeface="Arial" panose="020B0604020202020204" pitchFamily="34" charset="0"/>
+              <a:buChar char="•"/>
+              <a:defRPr sz="1800" kern="1200">
+                <a:solidFill>
+                  <a:schemeClr val="tx1"/>
+                </a:solidFill>
+                <a:latin typeface="+mn-lt"/>
+                <a:ea typeface="+mn-ea"/>
+                <a:cs typeface="+mn-cs"/>
+              </a:defRPr>
+            </a:lvl5pPr>
+            <a:lvl6pPr marL="2514600" indent="-228600" algn="l" defTabSz="914400" rtl="0" eaLnBrk="1" latinLnBrk="0" hangingPunct="1">
+              <a:lnSpc>
+                <a:spcPct val="90000"/>
+              </a:lnSpc>
+              <a:spcBef>
+                <a:spcPts val="500"/>
+              </a:spcBef>
+              <a:buFont typeface="Arial" panose="020B0604020202020204" pitchFamily="34" charset="0"/>
+              <a:buChar char="•"/>
+              <a:defRPr sz="1800" kern="1200">
+                <a:solidFill>
+                  <a:schemeClr val="tx1"/>
+                </a:solidFill>
+                <a:latin typeface="+mn-lt"/>
+                <a:ea typeface="+mn-ea"/>
+                <a:cs typeface="+mn-cs"/>
+              </a:defRPr>
+            </a:lvl6pPr>
+            <a:lvl7pPr marL="2971800" indent="-228600" algn="l" defTabSz="914400" rtl="0" eaLnBrk="1" latinLnBrk="0" hangingPunct="1">
+              <a:lnSpc>
+                <a:spcPct val="90000"/>
+              </a:lnSpc>
+              <a:spcBef>
+                <a:spcPts val="500"/>
+              </a:spcBef>
+              <a:buFont typeface="Arial" panose="020B0604020202020204" pitchFamily="34" charset="0"/>
+              <a:buChar char="•"/>
+              <a:defRPr sz="1800" kern="1200">
+                <a:solidFill>
+                  <a:schemeClr val="tx1"/>
+                </a:solidFill>
+                <a:latin typeface="+mn-lt"/>
+                <a:ea typeface="+mn-ea"/>
+                <a:cs typeface="+mn-cs"/>
+              </a:defRPr>
+            </a:lvl7pPr>
+            <a:lvl8pPr marL="3429000" indent="-228600" algn="l" defTabSz="914400" rtl="0" eaLnBrk="1" latinLnBrk="0" hangingPunct="1">
+              <a:lnSpc>
+                <a:spcPct val="90000"/>
+              </a:lnSpc>
+              <a:spcBef>
+                <a:spcPts val="500"/>
+              </a:spcBef>
+              <a:buFont typeface="Arial" panose="020B0604020202020204" pitchFamily="34" charset="0"/>
+              <a:buChar char="•"/>
+              <a:defRPr sz="1800" kern="1200">
+                <a:solidFill>
+                  <a:schemeClr val="tx1"/>
+                </a:solidFill>
+                <a:latin typeface="+mn-lt"/>
+                <a:ea typeface="+mn-ea"/>
+                <a:cs typeface="+mn-cs"/>
+              </a:defRPr>
+            </a:lvl8pPr>
+            <a:lvl9pPr marL="3886200" indent="-228600" algn="l" defTabSz="914400" rtl="0" eaLnBrk="1" latinLnBrk="0" hangingPunct="1">
+              <a:lnSpc>
+                <a:spcPct val="90000"/>
+              </a:lnSpc>
+              <a:spcBef>
+                <a:spcPts val="500"/>
+              </a:spcBef>
+              <a:buFont typeface="Arial" panose="020B0604020202020204" pitchFamily="34" charset="0"/>
+              <a:buChar char="•"/>
+              <a:defRPr sz="1800" kern="1200">
+                <a:solidFill>
+                  <a:schemeClr val="tx1"/>
+                </a:solidFill>
+                <a:latin typeface="+mn-lt"/>
+                <a:ea typeface="+mn-ea"/>
+                <a:cs typeface="+mn-cs"/>
+              </a:defRPr>
+            </a:lvl9pPr>
+          </a:lstStyle>
+          <a:p>
+            <a:r>
+              <a:rPr lang="en-US" sz="3200" dirty="0" smtClean="0"/>
+              <a:t>UI picture and info here</a:t>
+            </a:r>
+            <a:endParaRPr lang="en-US" dirty="0" smtClean="0"/>
+          </a:p>
+          <a:p>
+            <a:endParaRPr lang="en-US" sz="3200" dirty="0"/>
+          </a:p>
+          <a:p>
+            <a:endParaRPr lang="en-US" sz="3200" dirty="0"/>
+          </a:p>
+          <a:p>
+            <a:endParaRPr lang="en-US" sz="3200" dirty="0"/>
+          </a:p>
+        </p:txBody>
+      </p:sp>
+    </p:spTree>
+    <p:extLst>
+      <p:ext uri="{BB962C8B-B14F-4D97-AF65-F5344CB8AC3E}">
+        <p14:creationId xmlns:p14="http://schemas.microsoft.com/office/powerpoint/2010/main" val="537571588"/>
+      </p:ext>
+    </p:extLst>
+  </p:cSld>
+  <p:clrMapOvr>
+    <a:masterClrMapping/>
+  </p:clrMapOvr>
+  <p:transition xmlns:p14="http://schemas.microsoft.com/office/powerpoint/2010/main">
+    <p:fade/>
+  </p:transition>
+  <p:timing>
+    <p:tnLst>
+      <p:par>
+        <p:cTn xmlns:p14="http://schemas.microsoft.com/office/powerpoint/2010/main" id="1" dur="indefinite" restart="never" nodeType="tmRoot"/>
+      </p:par>
+    </p:tnLst>
   </p:timing>
 </p:sld>
 </file>
@@ -5388,13 +7259,7 @@
       </p:grpSpPr>
       <p:sp>
         <p:nvSpPr>
-          <p:cNvPr id="2" name="Title 1">
-            <a:extLst>
-              <a:ext uri="{FF2B5EF4-FFF2-40B4-BE49-F238E27FC236}">
-                <a16:creationId xmlns:a16="http://schemas.microsoft.com/office/drawing/2014/main" id="{ADD42933-474B-384A-8DEB-7A70F87E4698}"/>
-              </a:ext>
-            </a:extLst>
-          </p:cNvPr>
+          <p:cNvPr id="2" name="Title 1"/>
           <p:cNvSpPr>
             <a:spLocks noGrp="1"/>
           </p:cNvSpPr>
@@ -5408,23 +7273,237 @@
           <a:lstStyle/>
           <a:p>
             <a:r>
-              <a:rPr lang="en-US" dirty="0"/>
-              <a:t>Project Structure</a:t>
-            </a:r>
+              <a:rPr lang="en-US" dirty="0" smtClean="0"/>
+              <a:t>Component Structure (Ryan)</a:t>
+            </a:r>
+            <a:endParaRPr lang="en-US" dirty="0"/>
+          </a:p>
+        </p:txBody>
+      </p:sp>
+      <p:sp>
+        <p:nvSpPr>
+          <p:cNvPr id="3" name="Content Placeholder 2">
+            <a:extLst>
+              <a:ext uri="{FF2B5EF4-FFF2-40B4-BE49-F238E27FC236}">
+                <a16:creationId xmlns:a16="http://schemas.microsoft.com/office/drawing/2014/main" xmlns="" id="{B6614BC7-F88E-854F-A078-E006F32764E1}"/>
+              </a:ext>
+            </a:extLst>
+          </p:cNvPr>
+          <p:cNvSpPr txBox="1">
+            <a:spLocks/>
+          </p:cNvSpPr>
+          <p:nvPr/>
+        </p:nvSpPr>
+        <p:spPr>
+          <a:xfrm>
+            <a:off x="268081" y="939452"/>
+            <a:ext cx="11085720" cy="5336088"/>
+          </a:xfrm>
+          <a:prstGeom prst="rect">
+            <a:avLst/>
+          </a:prstGeom>
+        </p:spPr>
+        <p:txBody>
+          <a:bodyPr>
+            <a:noAutofit/>
+          </a:bodyPr>
+          <a:lstStyle>
+            <a:lvl1pPr marL="228600" indent="-228600" algn="l" defTabSz="914400" rtl="0" eaLnBrk="1" latinLnBrk="0" hangingPunct="1">
+              <a:lnSpc>
+                <a:spcPct val="90000"/>
+              </a:lnSpc>
+              <a:spcBef>
+                <a:spcPts val="1000"/>
+              </a:spcBef>
+              <a:buFont typeface="Arial" panose="020B0604020202020204" pitchFamily="34" charset="0"/>
+              <a:buChar char="•"/>
+              <a:defRPr sz="2800" kern="1200">
+                <a:solidFill>
+                  <a:schemeClr val="tx1"/>
+                </a:solidFill>
+                <a:latin typeface="+mn-lt"/>
+                <a:ea typeface="+mn-ea"/>
+                <a:cs typeface="+mn-cs"/>
+              </a:defRPr>
+            </a:lvl1pPr>
+            <a:lvl2pPr marL="685800" indent="-228600" algn="l" defTabSz="914400" rtl="0" eaLnBrk="1" latinLnBrk="0" hangingPunct="1">
+              <a:lnSpc>
+                <a:spcPct val="90000"/>
+              </a:lnSpc>
+              <a:spcBef>
+                <a:spcPts val="500"/>
+              </a:spcBef>
+              <a:buFont typeface="Arial" panose="020B0604020202020204" pitchFamily="34" charset="0"/>
+              <a:buChar char="•"/>
+              <a:defRPr sz="2400" kern="1200">
+                <a:solidFill>
+                  <a:schemeClr val="tx1"/>
+                </a:solidFill>
+                <a:latin typeface="+mn-lt"/>
+                <a:ea typeface="+mn-ea"/>
+                <a:cs typeface="+mn-cs"/>
+              </a:defRPr>
+            </a:lvl2pPr>
+            <a:lvl3pPr marL="1143000" indent="-228600" algn="l" defTabSz="914400" rtl="0" eaLnBrk="1" latinLnBrk="0" hangingPunct="1">
+              <a:lnSpc>
+                <a:spcPct val="90000"/>
+              </a:lnSpc>
+              <a:spcBef>
+                <a:spcPts val="500"/>
+              </a:spcBef>
+              <a:buFont typeface="Arial" panose="020B0604020202020204" pitchFamily="34" charset="0"/>
+              <a:buChar char="•"/>
+              <a:defRPr sz="2000" kern="1200">
+                <a:solidFill>
+                  <a:schemeClr val="tx1"/>
+                </a:solidFill>
+                <a:latin typeface="+mn-lt"/>
+                <a:ea typeface="+mn-ea"/>
+                <a:cs typeface="+mn-cs"/>
+              </a:defRPr>
+            </a:lvl3pPr>
+            <a:lvl4pPr marL="1600200" indent="-228600" algn="l" defTabSz="914400" rtl="0" eaLnBrk="1" latinLnBrk="0" hangingPunct="1">
+              <a:lnSpc>
+                <a:spcPct val="90000"/>
+              </a:lnSpc>
+              <a:spcBef>
+                <a:spcPts val="500"/>
+              </a:spcBef>
+              <a:buFont typeface="Arial" panose="020B0604020202020204" pitchFamily="34" charset="0"/>
+              <a:buChar char="•"/>
+              <a:defRPr sz="1800" kern="1200">
+                <a:solidFill>
+                  <a:schemeClr val="tx1"/>
+                </a:solidFill>
+                <a:latin typeface="+mn-lt"/>
+                <a:ea typeface="+mn-ea"/>
+                <a:cs typeface="+mn-cs"/>
+              </a:defRPr>
+            </a:lvl4pPr>
+            <a:lvl5pPr marL="2057400" indent="-228600" algn="l" defTabSz="914400" rtl="0" eaLnBrk="1" latinLnBrk="0" hangingPunct="1">
+              <a:lnSpc>
+                <a:spcPct val="90000"/>
+              </a:lnSpc>
+              <a:spcBef>
+                <a:spcPts val="500"/>
+              </a:spcBef>
+              <a:buFont typeface="Arial" panose="020B0604020202020204" pitchFamily="34" charset="0"/>
+              <a:buChar char="•"/>
+              <a:defRPr sz="1800" kern="1200">
+                <a:solidFill>
+                  <a:schemeClr val="tx1"/>
+                </a:solidFill>
+                <a:latin typeface="+mn-lt"/>
+                <a:ea typeface="+mn-ea"/>
+                <a:cs typeface="+mn-cs"/>
+              </a:defRPr>
+            </a:lvl5pPr>
+            <a:lvl6pPr marL="2514600" indent="-228600" algn="l" defTabSz="914400" rtl="0" eaLnBrk="1" latinLnBrk="0" hangingPunct="1">
+              <a:lnSpc>
+                <a:spcPct val="90000"/>
+              </a:lnSpc>
+              <a:spcBef>
+                <a:spcPts val="500"/>
+              </a:spcBef>
+              <a:buFont typeface="Arial" panose="020B0604020202020204" pitchFamily="34" charset="0"/>
+              <a:buChar char="•"/>
+              <a:defRPr sz="1800" kern="1200">
+                <a:solidFill>
+                  <a:schemeClr val="tx1"/>
+                </a:solidFill>
+                <a:latin typeface="+mn-lt"/>
+                <a:ea typeface="+mn-ea"/>
+                <a:cs typeface="+mn-cs"/>
+              </a:defRPr>
+            </a:lvl6pPr>
+            <a:lvl7pPr marL="2971800" indent="-228600" algn="l" defTabSz="914400" rtl="0" eaLnBrk="1" latinLnBrk="0" hangingPunct="1">
+              <a:lnSpc>
+                <a:spcPct val="90000"/>
+              </a:lnSpc>
+              <a:spcBef>
+                <a:spcPts val="500"/>
+              </a:spcBef>
+              <a:buFont typeface="Arial" panose="020B0604020202020204" pitchFamily="34" charset="0"/>
+              <a:buChar char="•"/>
+              <a:defRPr sz="1800" kern="1200">
+                <a:solidFill>
+                  <a:schemeClr val="tx1"/>
+                </a:solidFill>
+                <a:latin typeface="+mn-lt"/>
+                <a:ea typeface="+mn-ea"/>
+                <a:cs typeface="+mn-cs"/>
+              </a:defRPr>
+            </a:lvl7pPr>
+            <a:lvl8pPr marL="3429000" indent="-228600" algn="l" defTabSz="914400" rtl="0" eaLnBrk="1" latinLnBrk="0" hangingPunct="1">
+              <a:lnSpc>
+                <a:spcPct val="90000"/>
+              </a:lnSpc>
+              <a:spcBef>
+                <a:spcPts val="500"/>
+              </a:spcBef>
+              <a:buFont typeface="Arial" panose="020B0604020202020204" pitchFamily="34" charset="0"/>
+              <a:buChar char="•"/>
+              <a:defRPr sz="1800" kern="1200">
+                <a:solidFill>
+                  <a:schemeClr val="tx1"/>
+                </a:solidFill>
+                <a:latin typeface="+mn-lt"/>
+                <a:ea typeface="+mn-ea"/>
+                <a:cs typeface="+mn-cs"/>
+              </a:defRPr>
+            </a:lvl8pPr>
+            <a:lvl9pPr marL="3886200" indent="-228600" algn="l" defTabSz="914400" rtl="0" eaLnBrk="1" latinLnBrk="0" hangingPunct="1">
+              <a:lnSpc>
+                <a:spcPct val="90000"/>
+              </a:lnSpc>
+              <a:spcBef>
+                <a:spcPts val="500"/>
+              </a:spcBef>
+              <a:buFont typeface="Arial" panose="020B0604020202020204" pitchFamily="34" charset="0"/>
+              <a:buChar char="•"/>
+              <a:defRPr sz="1800" kern="1200">
+                <a:solidFill>
+                  <a:schemeClr val="tx1"/>
+                </a:solidFill>
+                <a:latin typeface="+mn-lt"/>
+                <a:ea typeface="+mn-ea"/>
+                <a:cs typeface="+mn-cs"/>
+              </a:defRPr>
+            </a:lvl9pPr>
+          </a:lstStyle>
+          <a:p>
+            <a:r>
+              <a:rPr lang="en-US" sz="3200" dirty="0" smtClean="0"/>
+              <a:t>Simplifie</a:t>
+            </a:r>
+            <a:r>
+              <a:rPr lang="en-US" sz="3200" dirty="0" smtClean="0"/>
+              <a:t>d project diagram and info here</a:t>
+            </a:r>
+            <a:endParaRPr lang="en-US" dirty="0" smtClean="0"/>
+          </a:p>
+          <a:p>
+            <a:endParaRPr lang="en-US" sz="3200" dirty="0"/>
+          </a:p>
+          <a:p>
+            <a:endParaRPr lang="en-US" sz="3200" dirty="0"/>
+          </a:p>
+          <a:p>
+            <a:endParaRPr lang="en-US" sz="3200" dirty="0"/>
           </a:p>
         </p:txBody>
       </p:sp>
     </p:spTree>
     <p:extLst>
       <p:ext uri="{BB962C8B-B14F-4D97-AF65-F5344CB8AC3E}">
-        <p14:creationId xmlns:p14="http://schemas.microsoft.com/office/powerpoint/2010/main" val="2985815797"/>
+        <p14:creationId xmlns:p14="http://schemas.microsoft.com/office/powerpoint/2010/main" val="1415042592"/>
       </p:ext>
     </p:extLst>
   </p:cSld>
   <p:clrMapOvr>
     <a:masterClrMapping/>
   </p:clrMapOvr>
-  <p:transition>
+  <p:transition xmlns:p14="http://schemas.microsoft.com/office/powerpoint/2010/main">
     <p:fade/>
   </p:transition>
 </p:sld>
@@ -5449,13 +7528,7 @@
       </p:grpSpPr>
       <p:sp>
         <p:nvSpPr>
-          <p:cNvPr id="2" name="Title 1">
-            <a:extLst>
-              <a:ext uri="{FF2B5EF4-FFF2-40B4-BE49-F238E27FC236}">
-                <a16:creationId xmlns:a16="http://schemas.microsoft.com/office/drawing/2014/main" id="{2832AE9A-4189-544C-BFA8-D4CCD669F831}"/>
-              </a:ext>
-            </a:extLst>
-          </p:cNvPr>
+          <p:cNvPr id="2" name="Title 1"/>
           <p:cNvSpPr>
             <a:spLocks noGrp="1"/>
           </p:cNvSpPr>
@@ -5469,23 +7542,293 @@
           <a:lstStyle/>
           <a:p>
             <a:r>
-              <a:rPr lang="en-US" dirty="0"/>
-              <a:t>Future Work</a:t>
-            </a:r>
+              <a:rPr lang="en-US" dirty="0" err="1" smtClean="0"/>
+              <a:t>Git</a:t>
+            </a:r>
+            <a:r>
+              <a:rPr lang="en-US" dirty="0" smtClean="0"/>
+              <a:t> Repo Structure</a:t>
+            </a:r>
+            <a:endParaRPr lang="en-US" dirty="0"/>
+          </a:p>
+        </p:txBody>
+      </p:sp>
+      <p:sp>
+        <p:nvSpPr>
+          <p:cNvPr id="3" name="Content Placeholder 2">
+            <a:extLst>
+              <a:ext uri="{FF2B5EF4-FFF2-40B4-BE49-F238E27FC236}">
+                <a16:creationId xmlns:a16="http://schemas.microsoft.com/office/drawing/2014/main" xmlns="" id="{B6614BC7-F88E-854F-A078-E006F32764E1}"/>
+              </a:ext>
+            </a:extLst>
+          </p:cNvPr>
+          <p:cNvSpPr txBox="1">
+            <a:spLocks/>
+          </p:cNvSpPr>
+          <p:nvPr/>
+        </p:nvSpPr>
+        <p:spPr>
+          <a:xfrm>
+            <a:off x="268081" y="939452"/>
+            <a:ext cx="11085720" cy="5336088"/>
+          </a:xfrm>
+          <a:prstGeom prst="rect">
+            <a:avLst/>
+          </a:prstGeom>
+        </p:spPr>
+        <p:txBody>
+          <a:bodyPr>
+            <a:noAutofit/>
+          </a:bodyPr>
+          <a:lstStyle>
+            <a:lvl1pPr marL="228600" indent="-228600" algn="l" defTabSz="914400" rtl="0" eaLnBrk="1" latinLnBrk="0" hangingPunct="1">
+              <a:lnSpc>
+                <a:spcPct val="90000"/>
+              </a:lnSpc>
+              <a:spcBef>
+                <a:spcPts val="1000"/>
+              </a:spcBef>
+              <a:buFont typeface="Arial" panose="020B0604020202020204" pitchFamily="34" charset="0"/>
+              <a:buChar char="•"/>
+              <a:defRPr sz="2800" kern="1200">
+                <a:solidFill>
+                  <a:schemeClr val="tx1"/>
+                </a:solidFill>
+                <a:latin typeface="+mn-lt"/>
+                <a:ea typeface="+mn-ea"/>
+                <a:cs typeface="+mn-cs"/>
+              </a:defRPr>
+            </a:lvl1pPr>
+            <a:lvl2pPr marL="685800" indent="-228600" algn="l" defTabSz="914400" rtl="0" eaLnBrk="1" latinLnBrk="0" hangingPunct="1">
+              <a:lnSpc>
+                <a:spcPct val="90000"/>
+              </a:lnSpc>
+              <a:spcBef>
+                <a:spcPts val="500"/>
+              </a:spcBef>
+              <a:buFont typeface="Arial" panose="020B0604020202020204" pitchFamily="34" charset="0"/>
+              <a:buChar char="•"/>
+              <a:defRPr sz="2400" kern="1200">
+                <a:solidFill>
+                  <a:schemeClr val="tx1"/>
+                </a:solidFill>
+                <a:latin typeface="+mn-lt"/>
+                <a:ea typeface="+mn-ea"/>
+                <a:cs typeface="+mn-cs"/>
+              </a:defRPr>
+            </a:lvl2pPr>
+            <a:lvl3pPr marL="1143000" indent="-228600" algn="l" defTabSz="914400" rtl="0" eaLnBrk="1" latinLnBrk="0" hangingPunct="1">
+              <a:lnSpc>
+                <a:spcPct val="90000"/>
+              </a:lnSpc>
+              <a:spcBef>
+                <a:spcPts val="500"/>
+              </a:spcBef>
+              <a:buFont typeface="Arial" panose="020B0604020202020204" pitchFamily="34" charset="0"/>
+              <a:buChar char="•"/>
+              <a:defRPr sz="2000" kern="1200">
+                <a:solidFill>
+                  <a:schemeClr val="tx1"/>
+                </a:solidFill>
+                <a:latin typeface="+mn-lt"/>
+                <a:ea typeface="+mn-ea"/>
+                <a:cs typeface="+mn-cs"/>
+              </a:defRPr>
+            </a:lvl3pPr>
+            <a:lvl4pPr marL="1600200" indent="-228600" algn="l" defTabSz="914400" rtl="0" eaLnBrk="1" latinLnBrk="0" hangingPunct="1">
+              <a:lnSpc>
+                <a:spcPct val="90000"/>
+              </a:lnSpc>
+              <a:spcBef>
+                <a:spcPts val="500"/>
+              </a:spcBef>
+              <a:buFont typeface="Arial" panose="020B0604020202020204" pitchFamily="34" charset="0"/>
+              <a:buChar char="•"/>
+              <a:defRPr sz="1800" kern="1200">
+                <a:solidFill>
+                  <a:schemeClr val="tx1"/>
+                </a:solidFill>
+                <a:latin typeface="+mn-lt"/>
+                <a:ea typeface="+mn-ea"/>
+                <a:cs typeface="+mn-cs"/>
+              </a:defRPr>
+            </a:lvl4pPr>
+            <a:lvl5pPr marL="2057400" indent="-228600" algn="l" defTabSz="914400" rtl="0" eaLnBrk="1" latinLnBrk="0" hangingPunct="1">
+              <a:lnSpc>
+                <a:spcPct val="90000"/>
+              </a:lnSpc>
+              <a:spcBef>
+                <a:spcPts val="500"/>
+              </a:spcBef>
+              <a:buFont typeface="Arial" panose="020B0604020202020204" pitchFamily="34" charset="0"/>
+              <a:buChar char="•"/>
+              <a:defRPr sz="1800" kern="1200">
+                <a:solidFill>
+                  <a:schemeClr val="tx1"/>
+                </a:solidFill>
+                <a:latin typeface="+mn-lt"/>
+                <a:ea typeface="+mn-ea"/>
+                <a:cs typeface="+mn-cs"/>
+              </a:defRPr>
+            </a:lvl5pPr>
+            <a:lvl6pPr marL="2514600" indent="-228600" algn="l" defTabSz="914400" rtl="0" eaLnBrk="1" latinLnBrk="0" hangingPunct="1">
+              <a:lnSpc>
+                <a:spcPct val="90000"/>
+              </a:lnSpc>
+              <a:spcBef>
+                <a:spcPts val="500"/>
+              </a:spcBef>
+              <a:buFont typeface="Arial" panose="020B0604020202020204" pitchFamily="34" charset="0"/>
+              <a:buChar char="•"/>
+              <a:defRPr sz="1800" kern="1200">
+                <a:solidFill>
+                  <a:schemeClr val="tx1"/>
+                </a:solidFill>
+                <a:latin typeface="+mn-lt"/>
+                <a:ea typeface="+mn-ea"/>
+                <a:cs typeface="+mn-cs"/>
+              </a:defRPr>
+            </a:lvl6pPr>
+            <a:lvl7pPr marL="2971800" indent="-228600" algn="l" defTabSz="914400" rtl="0" eaLnBrk="1" latinLnBrk="0" hangingPunct="1">
+              <a:lnSpc>
+                <a:spcPct val="90000"/>
+              </a:lnSpc>
+              <a:spcBef>
+                <a:spcPts val="500"/>
+              </a:spcBef>
+              <a:buFont typeface="Arial" panose="020B0604020202020204" pitchFamily="34" charset="0"/>
+              <a:buChar char="•"/>
+              <a:defRPr sz="1800" kern="1200">
+                <a:solidFill>
+                  <a:schemeClr val="tx1"/>
+                </a:solidFill>
+                <a:latin typeface="+mn-lt"/>
+                <a:ea typeface="+mn-ea"/>
+                <a:cs typeface="+mn-cs"/>
+              </a:defRPr>
+            </a:lvl7pPr>
+            <a:lvl8pPr marL="3429000" indent="-228600" algn="l" defTabSz="914400" rtl="0" eaLnBrk="1" latinLnBrk="0" hangingPunct="1">
+              <a:lnSpc>
+                <a:spcPct val="90000"/>
+              </a:lnSpc>
+              <a:spcBef>
+                <a:spcPts val="500"/>
+              </a:spcBef>
+              <a:buFont typeface="Arial" panose="020B0604020202020204" pitchFamily="34" charset="0"/>
+              <a:buChar char="•"/>
+              <a:defRPr sz="1800" kern="1200">
+                <a:solidFill>
+                  <a:schemeClr val="tx1"/>
+                </a:solidFill>
+                <a:latin typeface="+mn-lt"/>
+                <a:ea typeface="+mn-ea"/>
+                <a:cs typeface="+mn-cs"/>
+              </a:defRPr>
+            </a:lvl8pPr>
+            <a:lvl9pPr marL="3886200" indent="-228600" algn="l" defTabSz="914400" rtl="0" eaLnBrk="1" latinLnBrk="0" hangingPunct="1">
+              <a:lnSpc>
+                <a:spcPct val="90000"/>
+              </a:lnSpc>
+              <a:spcBef>
+                <a:spcPts val="500"/>
+              </a:spcBef>
+              <a:buFont typeface="Arial" panose="020B0604020202020204" pitchFamily="34" charset="0"/>
+              <a:buChar char="•"/>
+              <a:defRPr sz="1800" kern="1200">
+                <a:solidFill>
+                  <a:schemeClr val="tx1"/>
+                </a:solidFill>
+                <a:latin typeface="+mn-lt"/>
+                <a:ea typeface="+mn-ea"/>
+                <a:cs typeface="+mn-cs"/>
+              </a:defRPr>
+            </a:lvl9pPr>
+          </a:lstStyle>
+          <a:p>
+            <a:r>
+              <a:rPr lang="en-US" sz="3200" dirty="0" smtClean="0"/>
+              <a:t>Repo structure tree here</a:t>
+            </a:r>
+            <a:endParaRPr lang="en-US" dirty="0" smtClean="0"/>
+          </a:p>
+          <a:p>
+            <a:endParaRPr lang="en-US" sz="3200" dirty="0"/>
+          </a:p>
+          <a:p>
+            <a:endParaRPr lang="en-US" sz="3200" dirty="0"/>
+          </a:p>
+          <a:p>
+            <a:endParaRPr lang="en-US" sz="3200" dirty="0"/>
           </a:p>
         </p:txBody>
       </p:sp>
     </p:spTree>
     <p:extLst>
       <p:ext uri="{BB962C8B-B14F-4D97-AF65-F5344CB8AC3E}">
-        <p14:creationId xmlns:p14="http://schemas.microsoft.com/office/powerpoint/2010/main" val="1503719038"/>
+        <p14:creationId xmlns:p14="http://schemas.microsoft.com/office/powerpoint/2010/main" val="700170963"/>
       </p:ext>
     </p:extLst>
   </p:cSld>
   <p:clrMapOvr>
     <a:masterClrMapping/>
   </p:clrMapOvr>
-  <p:transition>
+  <p:transition xmlns:p14="http://schemas.microsoft.com/office/powerpoint/2010/main">
+    <p:fade/>
+  </p:transition>
+</p:sld>
+</file>
+
+<file path=ppt/slides/slide9.xml><?xml version="1.0" encoding="utf-8"?>
+<p:sld xmlns:a="http://schemas.openxmlformats.org/drawingml/2006/main" xmlns:r="http://schemas.openxmlformats.org/officeDocument/2006/relationships" xmlns:p="http://schemas.openxmlformats.org/presentationml/2006/main">
+  <p:cSld>
+    <p:spTree>
+      <p:nvGrpSpPr>
+        <p:cNvPr id="1" name=""/>
+        <p:cNvGrpSpPr/>
+        <p:nvPr/>
+      </p:nvGrpSpPr>
+      <p:grpSpPr>
+        <a:xfrm>
+          <a:off x="0" y="0"/>
+          <a:ext cx="0" cy="0"/>
+          <a:chOff x="0" y="0"/>
+          <a:chExt cx="0" cy="0"/>
+        </a:xfrm>
+      </p:grpSpPr>
+      <p:sp>
+        <p:nvSpPr>
+          <p:cNvPr id="2" name="Title 1"/>
+          <p:cNvSpPr>
+            <a:spLocks noGrp="1"/>
+          </p:cNvSpPr>
+          <p:nvPr>
+            <p:ph type="title"/>
+          </p:nvPr>
+        </p:nvSpPr>
+        <p:spPr/>
+        <p:txBody>
+          <a:bodyPr/>
+          <a:lstStyle/>
+          <a:p>
+            <a:r>
+              <a:rPr lang="en-US" dirty="0" smtClean="0"/>
+              <a:t>Component 1: Preprocessor (Mo)</a:t>
+            </a:r>
+            <a:endParaRPr lang="en-US" dirty="0"/>
+          </a:p>
+        </p:txBody>
+      </p:sp>
+    </p:spTree>
+    <p:extLst>
+      <p:ext uri="{BB962C8B-B14F-4D97-AF65-F5344CB8AC3E}">
+        <p14:creationId xmlns:p14="http://schemas.microsoft.com/office/powerpoint/2010/main" val="2598822137"/>
+      </p:ext>
+    </p:extLst>
+  </p:cSld>
+  <p:clrMapOvr>
+    <a:masterClrMapping/>
+  </p:clrMapOvr>
+  <p:transition xmlns:p14="http://schemas.microsoft.com/office/powerpoint/2010/main">
     <p:fade/>
   </p:transition>
 </p:sld>
@@ -5534,7 +7877,7 @@
     </a:clrScheme>
     <a:fontScheme name="Office">
       <a:majorFont>
-        <a:latin typeface="Calibri Light" panose="020F0302020204030204"/>
+        <a:latin typeface="Calibri Light"/>
         <a:ea typeface=""/>
         <a:cs typeface=""/>
         <a:font script="Jpan" typeface="游ゴシック Light"/>
@@ -5586,7 +7929,7 @@
         <a:font script="Tfng" typeface="Ebrima"/>
       </a:majorFont>
       <a:minorFont>
-        <a:latin typeface="Calibri" panose="020F0502020204030204"/>
+        <a:latin typeface="Calibri"/>
         <a:ea typeface=""/>
         <a:cs typeface=""/>
         <a:font script="Jpan" typeface="游ゴシック"/>
@@ -5780,7 +8123,7 @@
   <a:extraClrSchemeLst/>
   <a:extLst>
     <a:ext uri="{05A4C25C-085E-4340-85A3-A5531E510DB2}">
-      <thm15:themeFamily xmlns:thm15="http://schemas.microsoft.com/office/thememl/2012/main" name="Office Theme" id="{62F939B6-93AF-4DB8-9C6B-D6C7DFDC589F}" vid="{4A3C46E8-61CC-4603-A589-7422A47A8E4A}"/>
+      <thm15:themeFamily xmlns:thm15="http://schemas.microsoft.com/office/thememl/2012/main" xmlns="" name="Office Theme" id="{62F939B6-93AF-4DB8-9C6B-D6C7DFDC589F}" vid="{4A3C46E8-61CC-4603-A589-7422A47A8E4A}"/>
     </a:ext>
   </a:extLst>
 </a:theme>
@@ -5829,7 +8172,7 @@
     </a:clrScheme>
     <a:fontScheme name="Office">
       <a:majorFont>
-        <a:latin typeface="Calibri Light" panose="020F0302020204030204"/>
+        <a:latin typeface="Calibri Light"/>
         <a:ea typeface=""/>
         <a:cs typeface=""/>
         <a:font script="Jpan" typeface="游ゴシック Light"/>
@@ -5881,7 +8224,7 @@
         <a:font script="Tfng" typeface="Ebrima"/>
       </a:majorFont>
       <a:minorFont>
-        <a:latin typeface="Calibri" panose="020F0502020204030204"/>
+        <a:latin typeface="Calibri"/>
         <a:ea typeface=""/>
         <a:cs typeface=""/>
         <a:font script="Jpan" typeface="游ゴシック"/>
@@ -6075,7 +8418,7 @@
   <a:extraClrSchemeLst/>
   <a:extLst>
     <a:ext uri="{05A4C25C-085E-4340-85A3-A5531E510DB2}">
-      <thm15:themeFamily xmlns:thm15="http://schemas.microsoft.com/office/thememl/2012/main" name="Office Theme" id="{62F939B6-93AF-4DB8-9C6B-D6C7DFDC589F}" vid="{4A3C46E8-61CC-4603-A589-7422A47A8E4A}"/>
+      <thm15:themeFamily xmlns:thm15="http://schemas.microsoft.com/office/thememl/2012/main" xmlns="" name="Office Theme" id="{62F939B6-93AF-4DB8-9C6B-D6C7DFDC589F}" vid="{4A3C46E8-61CC-4603-A589-7422A47A8E4A}"/>
     </a:ext>
   </a:extLst>
 </a:theme>

</xml_diff>